<commit_message>
docs: ✏️ arch. diagram - videos
</commit_message>
<xml_diff>
--- a/docs/README/diagram.pptx
+++ b/docs/README/diagram.pptx
@@ -6,6 +6,7 @@
   </p:sldMasterIdLst>
   <p:sldIdLst>
     <p:sldId id="256" r:id="rId2"/>
+    <p:sldId id="258" r:id="rId3"/>
   </p:sldIdLst>
   <p:sldSz cx="9144000" cy="6858000" type="screen4x3"/>
   <p:notesSz cx="6858000" cy="9144000"/>
@@ -288,7 +289,8 @@
           <a:p>
             <a:fld id="{6C456EFC-280F-4226-A86B-795CA61BECAE}" type="datetimeFigureOut">
               <a:rPr lang="en-US" smtClean="0"/>
-              <a:t>7/28/2024</a:t>
+              <a:pPr/>
+              <a:t>7/29/2024</a:t>
             </a:fld>
             <a:endParaRPr lang="en-US"/>
           </a:p>
@@ -330,6 +332,7 @@
           <a:p>
             <a:fld id="{055EF302-1BCD-4D16-835D-232A915B8A2F}" type="slidenum">
               <a:rPr lang="en-US" smtClean="0"/>
+              <a:pPr/>
               <a:t>‹N°›</a:t>
             </a:fld>
             <a:endParaRPr lang="en-US"/>
@@ -453,7 +456,8 @@
           <a:p>
             <a:fld id="{6C456EFC-280F-4226-A86B-795CA61BECAE}" type="datetimeFigureOut">
               <a:rPr lang="en-US" smtClean="0"/>
-              <a:t>7/28/2024</a:t>
+              <a:pPr/>
+              <a:t>7/29/2024</a:t>
             </a:fld>
             <a:endParaRPr lang="en-US"/>
           </a:p>
@@ -495,6 +499,7 @@
           <a:p>
             <a:fld id="{055EF302-1BCD-4D16-835D-232A915B8A2F}" type="slidenum">
               <a:rPr lang="en-US" smtClean="0"/>
+              <a:pPr/>
               <a:t>‹N°›</a:t>
             </a:fld>
             <a:endParaRPr lang="en-US"/>
@@ -628,7 +633,8 @@
           <a:p>
             <a:fld id="{6C456EFC-280F-4226-A86B-795CA61BECAE}" type="datetimeFigureOut">
               <a:rPr lang="en-US" smtClean="0"/>
-              <a:t>7/28/2024</a:t>
+              <a:pPr/>
+              <a:t>7/29/2024</a:t>
             </a:fld>
             <a:endParaRPr lang="en-US"/>
           </a:p>
@@ -670,6 +676,7 @@
           <a:p>
             <a:fld id="{055EF302-1BCD-4D16-835D-232A915B8A2F}" type="slidenum">
               <a:rPr lang="en-US" smtClean="0"/>
+              <a:pPr/>
               <a:t>‹N°›</a:t>
             </a:fld>
             <a:endParaRPr lang="en-US"/>
@@ -793,7 +800,8 @@
           <a:p>
             <a:fld id="{6C456EFC-280F-4226-A86B-795CA61BECAE}" type="datetimeFigureOut">
               <a:rPr lang="en-US" smtClean="0"/>
-              <a:t>7/28/2024</a:t>
+              <a:pPr/>
+              <a:t>7/29/2024</a:t>
             </a:fld>
             <a:endParaRPr lang="en-US"/>
           </a:p>
@@ -835,6 +843,7 @@
           <a:p>
             <a:fld id="{055EF302-1BCD-4D16-835D-232A915B8A2F}" type="slidenum">
               <a:rPr lang="en-US" smtClean="0"/>
+              <a:pPr/>
               <a:t>‹N°›</a:t>
             </a:fld>
             <a:endParaRPr lang="en-US"/>
@@ -1034,7 +1043,8 @@
           <a:p>
             <a:fld id="{6C456EFC-280F-4226-A86B-795CA61BECAE}" type="datetimeFigureOut">
               <a:rPr lang="en-US" smtClean="0"/>
-              <a:t>7/28/2024</a:t>
+              <a:pPr/>
+              <a:t>7/29/2024</a:t>
             </a:fld>
             <a:endParaRPr lang="en-US"/>
           </a:p>
@@ -1076,6 +1086,7 @@
           <a:p>
             <a:fld id="{055EF302-1BCD-4D16-835D-232A915B8A2F}" type="slidenum">
               <a:rPr lang="en-US" smtClean="0"/>
+              <a:pPr/>
               <a:t>‹N°›</a:t>
             </a:fld>
             <a:endParaRPr lang="en-US"/>
@@ -1317,7 +1328,8 @@
           <a:p>
             <a:fld id="{6C456EFC-280F-4226-A86B-795CA61BECAE}" type="datetimeFigureOut">
               <a:rPr lang="en-US" smtClean="0"/>
-              <a:t>7/28/2024</a:t>
+              <a:pPr/>
+              <a:t>7/29/2024</a:t>
             </a:fld>
             <a:endParaRPr lang="en-US"/>
           </a:p>
@@ -1359,6 +1371,7 @@
           <a:p>
             <a:fld id="{055EF302-1BCD-4D16-835D-232A915B8A2F}" type="slidenum">
               <a:rPr lang="en-US" smtClean="0"/>
+              <a:pPr/>
               <a:t>‹N°›</a:t>
             </a:fld>
             <a:endParaRPr lang="en-US"/>
@@ -1734,7 +1747,8 @@
           <a:p>
             <a:fld id="{6C456EFC-280F-4226-A86B-795CA61BECAE}" type="datetimeFigureOut">
               <a:rPr lang="en-US" smtClean="0"/>
-              <a:t>7/28/2024</a:t>
+              <a:pPr/>
+              <a:t>7/29/2024</a:t>
             </a:fld>
             <a:endParaRPr lang="en-US"/>
           </a:p>
@@ -1776,6 +1790,7 @@
           <a:p>
             <a:fld id="{055EF302-1BCD-4D16-835D-232A915B8A2F}" type="slidenum">
               <a:rPr lang="en-US" smtClean="0"/>
+              <a:pPr/>
               <a:t>‹N°›</a:t>
             </a:fld>
             <a:endParaRPr lang="en-US"/>
@@ -1847,7 +1862,8 @@
           <a:p>
             <a:fld id="{6C456EFC-280F-4226-A86B-795CA61BECAE}" type="datetimeFigureOut">
               <a:rPr lang="en-US" smtClean="0"/>
-              <a:t>7/28/2024</a:t>
+              <a:pPr/>
+              <a:t>7/29/2024</a:t>
             </a:fld>
             <a:endParaRPr lang="en-US"/>
           </a:p>
@@ -1889,6 +1905,7 @@
           <a:p>
             <a:fld id="{055EF302-1BCD-4D16-835D-232A915B8A2F}" type="slidenum">
               <a:rPr lang="en-US" smtClean="0"/>
+              <a:pPr/>
               <a:t>‹N°›</a:t>
             </a:fld>
             <a:endParaRPr lang="en-US"/>
@@ -1937,7 +1954,8 @@
           <a:p>
             <a:fld id="{6C456EFC-280F-4226-A86B-795CA61BECAE}" type="datetimeFigureOut">
               <a:rPr lang="en-US" smtClean="0"/>
-              <a:t>7/28/2024</a:t>
+              <a:pPr/>
+              <a:t>7/29/2024</a:t>
             </a:fld>
             <a:endParaRPr lang="en-US"/>
           </a:p>
@@ -1979,6 +1997,7 @@
           <a:p>
             <a:fld id="{055EF302-1BCD-4D16-835D-232A915B8A2F}" type="slidenum">
               <a:rPr lang="en-US" smtClean="0"/>
+              <a:pPr/>
               <a:t>‹N°›</a:t>
             </a:fld>
             <a:endParaRPr lang="en-US"/>
@@ -2209,7 +2228,8 @@
           <a:p>
             <a:fld id="{6C456EFC-280F-4226-A86B-795CA61BECAE}" type="datetimeFigureOut">
               <a:rPr lang="en-US" smtClean="0"/>
-              <a:t>7/28/2024</a:t>
+              <a:pPr/>
+              <a:t>7/29/2024</a:t>
             </a:fld>
             <a:endParaRPr lang="en-US"/>
           </a:p>
@@ -2251,6 +2271,7 @@
           <a:p>
             <a:fld id="{055EF302-1BCD-4D16-835D-232A915B8A2F}" type="slidenum">
               <a:rPr lang="en-US" smtClean="0"/>
+              <a:pPr/>
               <a:t>‹N°›</a:t>
             </a:fld>
             <a:endParaRPr lang="en-US"/>
@@ -2457,7 +2478,8 @@
           <a:p>
             <a:fld id="{6C456EFC-280F-4226-A86B-795CA61BECAE}" type="datetimeFigureOut">
               <a:rPr lang="en-US" smtClean="0"/>
-              <a:t>7/28/2024</a:t>
+              <a:pPr/>
+              <a:t>7/29/2024</a:t>
             </a:fld>
             <a:endParaRPr lang="en-US"/>
           </a:p>
@@ -2499,6 +2521,7 @@
           <a:p>
             <a:fld id="{055EF302-1BCD-4D16-835D-232A915B8A2F}" type="slidenum">
               <a:rPr lang="en-US" smtClean="0"/>
+              <a:pPr/>
               <a:t>‹N°›</a:t>
             </a:fld>
             <a:endParaRPr lang="en-US"/>
@@ -2665,7 +2688,8 @@
           <a:p>
             <a:fld id="{6C456EFC-280F-4226-A86B-795CA61BECAE}" type="datetimeFigureOut">
               <a:rPr lang="en-US" smtClean="0"/>
-              <a:t>7/28/2024</a:t>
+              <a:pPr/>
+              <a:t>7/29/2024</a:t>
             </a:fld>
             <a:endParaRPr lang="en-US"/>
           </a:p>
@@ -2743,6 +2767,7 @@
           <a:p>
             <a:fld id="{055EF302-1BCD-4D16-835D-232A915B8A2F}" type="slidenum">
               <a:rPr lang="en-US" smtClean="0"/>
+              <a:pPr/>
               <a:t>‹N°›</a:t>
             </a:fld>
             <a:endParaRPr lang="en-US"/>
@@ -3444,7 +3469,7 @@
         </p:blipFill>
         <p:spPr bwMode="auto">
           <a:xfrm>
-            <a:off x="3810000" y="5010150"/>
+            <a:off x="3810000" y="2590800"/>
             <a:ext cx="1283442" cy="1238250"/>
           </a:xfrm>
           <a:prstGeom prst="roundRect">
@@ -3493,7 +3518,7 @@
         </p:blipFill>
         <p:spPr bwMode="auto">
           <a:xfrm>
-            <a:off x="533400" y="2514600"/>
+            <a:off x="533400" y="228600"/>
             <a:ext cx="1228060" cy="1200150"/>
           </a:xfrm>
           <a:prstGeom prst="roundRect">
@@ -3542,7 +3567,7 @@
         </p:blipFill>
         <p:spPr bwMode="auto">
           <a:xfrm>
-            <a:off x="7291953" y="609600"/>
+            <a:off x="6553200" y="609600"/>
             <a:ext cx="457200" cy="457200"/>
           </a:xfrm>
           <a:prstGeom prst="rect">
@@ -3597,7 +3622,7 @@
         </p:blipFill>
         <p:spPr bwMode="auto">
           <a:xfrm>
-            <a:off x="7291953" y="1371600"/>
+            <a:off x="6553200" y="1371600"/>
             <a:ext cx="457200" cy="457200"/>
           </a:xfrm>
           <a:prstGeom prst="rect">
@@ -3652,7 +3677,7 @@
         </p:blipFill>
         <p:spPr bwMode="auto">
           <a:xfrm>
-            <a:off x="7291953" y="2133600"/>
+            <a:off x="6553200" y="2133600"/>
             <a:ext cx="457200" cy="457200"/>
           </a:xfrm>
           <a:prstGeom prst="rect">
@@ -3707,7 +3732,7 @@
         </p:blipFill>
         <p:spPr bwMode="auto">
           <a:xfrm>
-            <a:off x="7291953" y="2895600"/>
+            <a:off x="6553200" y="2895600"/>
             <a:ext cx="457200" cy="457200"/>
           </a:xfrm>
           <a:prstGeom prst="rect">
@@ -3762,7 +3787,7 @@
         </p:blipFill>
         <p:spPr bwMode="auto">
           <a:xfrm>
-            <a:off x="7291953" y="3657600"/>
+            <a:off x="6553200" y="3657600"/>
             <a:ext cx="457200" cy="457200"/>
           </a:xfrm>
           <a:prstGeom prst="rect">
@@ -3817,7 +3842,7 @@
         </p:blipFill>
         <p:spPr bwMode="auto">
           <a:xfrm>
-            <a:off x="7291953" y="4419600"/>
+            <a:off x="6553200" y="4419600"/>
             <a:ext cx="457200" cy="457200"/>
           </a:xfrm>
           <a:prstGeom prst="rect">
@@ -3872,7 +3897,7 @@
         </p:blipFill>
         <p:spPr bwMode="auto">
           <a:xfrm>
-            <a:off x="7291953" y="5181600"/>
+            <a:off x="6553200" y="5181600"/>
             <a:ext cx="457200" cy="457200"/>
           </a:xfrm>
           <a:prstGeom prst="rect">
@@ -3927,7 +3952,7 @@
         </p:blipFill>
         <p:spPr bwMode="auto">
           <a:xfrm>
-            <a:off x="7291953" y="5943600"/>
+            <a:off x="6553200" y="5943600"/>
             <a:ext cx="457200" cy="457200"/>
           </a:xfrm>
           <a:prstGeom prst="rect">
@@ -3982,7 +4007,7 @@
         </p:blipFill>
         <p:spPr bwMode="auto">
           <a:xfrm>
-            <a:off x="3877620" y="2514600"/>
+            <a:off x="3877620" y="228600"/>
             <a:ext cx="1092820" cy="1219200"/>
           </a:xfrm>
           <a:prstGeom prst="roundRect">
@@ -4022,8 +4047,8 @@
         </p:nvSpPr>
         <p:spPr>
           <a:xfrm>
-            <a:off x="5029200" y="2819400"/>
-            <a:ext cx="1981200" cy="533400"/>
+            <a:off x="5029200" y="533400"/>
+            <a:ext cx="1371600" cy="533400"/>
           </a:xfrm>
           <a:prstGeom prst="rightArrow">
             <a:avLst/>
@@ -4060,8 +4085,8 @@
         </p:nvSpPr>
         <p:spPr>
           <a:xfrm rot="5400000">
-            <a:off x="3771900" y="4076700"/>
-            <a:ext cx="1219200" cy="533400"/>
+            <a:off x="3810000" y="1752600"/>
+            <a:ext cx="1143000" cy="533400"/>
           </a:xfrm>
           <a:prstGeom prst="rightArrow">
             <a:avLst/>
@@ -4098,8 +4123,8 @@
         </p:nvSpPr>
         <p:spPr>
           <a:xfrm>
-            <a:off x="1371600" y="3505200"/>
-            <a:ext cx="1371600" cy="838200"/>
+            <a:off x="1371600" y="1219200"/>
+            <a:ext cx="1447800" cy="838200"/>
           </a:xfrm>
           <a:prstGeom prst="snip1Rect">
             <a:avLst/>
@@ -4130,7 +4155,7 @@
                 </a:solidFill>
                 <a:latin typeface="Consolas" pitchFamily="49" charset="0"/>
               </a:rPr>
-              <a:t>#script.py</a:t>
+              <a:t>#img-script.py</a:t>
             </a:r>
             <a:br>
               <a:rPr lang="en-US" sz="1200" b="1" dirty="0" smtClean="0">
@@ -4194,7 +4219,7 @@
         </p:nvSpPr>
         <p:spPr>
           <a:xfrm>
-            <a:off x="1828800" y="2819400"/>
+            <a:off x="1828800" y="533400"/>
             <a:ext cx="1981200" cy="533400"/>
           </a:xfrm>
           <a:prstGeom prst="rightArrow">
@@ -4241,7 +4266,7 @@
         </p:blipFill>
         <p:spPr bwMode="auto">
           <a:xfrm>
-            <a:off x="4724400" y="5715000"/>
+            <a:off x="4724400" y="3295650"/>
             <a:ext cx="838200" cy="838200"/>
           </a:xfrm>
           <a:prstGeom prst="rect">
@@ -4287,7 +4312,7 @@
         </p:nvSpPr>
         <p:spPr>
           <a:xfrm>
-            <a:off x="6400800" y="3581400"/>
+            <a:off x="7239000" y="3581400"/>
             <a:ext cx="609600" cy="533400"/>
           </a:xfrm>
           <a:prstGeom prst="rightArrow">
@@ -4325,7 +4350,7 @@
         </p:nvSpPr>
         <p:spPr>
           <a:xfrm>
-            <a:off x="6400800" y="4343400"/>
+            <a:off x="7239000" y="4343400"/>
             <a:ext cx="609600" cy="533400"/>
           </a:xfrm>
           <a:prstGeom prst="rightArrow">
@@ -4363,7 +4388,7 @@
         </p:nvSpPr>
         <p:spPr>
           <a:xfrm>
-            <a:off x="6400800" y="5105400"/>
+            <a:off x="7239000" y="5105400"/>
             <a:ext cx="609600" cy="533400"/>
           </a:xfrm>
           <a:prstGeom prst="rightArrow">
@@ -4401,7 +4426,7 @@
         </p:nvSpPr>
         <p:spPr>
           <a:xfrm>
-            <a:off x="6400800" y="5867400"/>
+            <a:off x="7239000" y="5867400"/>
             <a:ext cx="609600" cy="533400"/>
           </a:xfrm>
           <a:prstGeom prst="rightArrow">
@@ -4439,7 +4464,7 @@
         </p:nvSpPr>
         <p:spPr>
           <a:xfrm>
-            <a:off x="6400800" y="533400"/>
+            <a:off x="7239000" y="533400"/>
             <a:ext cx="609600" cy="533400"/>
           </a:xfrm>
           <a:prstGeom prst="rightArrow">
@@ -4477,7 +4502,7 @@
         </p:nvSpPr>
         <p:spPr>
           <a:xfrm>
-            <a:off x="6400800" y="1295400"/>
+            <a:off x="7239000" y="1295400"/>
             <a:ext cx="609600" cy="533400"/>
           </a:xfrm>
           <a:prstGeom prst="rightArrow">
@@ -4515,7 +4540,7 @@
         </p:nvSpPr>
         <p:spPr>
           <a:xfrm>
-            <a:off x="6400800" y="2057400"/>
+            <a:off x="7239000" y="2057400"/>
             <a:ext cx="609600" cy="533400"/>
           </a:xfrm>
           <a:prstGeom prst="rightArrow">
@@ -4545,6 +4570,1229 @@
           </a:p>
         </p:txBody>
       </p:sp>
+      <p:pic>
+        <p:nvPicPr>
+          <p:cNvPr id="1026" name="Picture 2"/>
+          <p:cNvPicPr>
+            <a:picLocks noChangeAspect="1" noChangeArrowheads="1"/>
+          </p:cNvPicPr>
+          <p:nvPr/>
+        </p:nvPicPr>
+        <p:blipFill>
+          <a:blip r:embed="rId15" cstate="print"/>
+          <a:srcRect/>
+          <a:stretch>
+            <a:fillRect/>
+          </a:stretch>
+        </p:blipFill>
+        <p:spPr bwMode="auto">
+          <a:xfrm>
+            <a:off x="3886200" y="3236913"/>
+            <a:ext cx="491007" cy="496887"/>
+          </a:xfrm>
+          <a:prstGeom prst="rect">
+            <a:avLst/>
+          </a:prstGeom>
+          <a:noFill/>
+          <a:ln w="9525">
+            <a:noFill/>
+            <a:miter lim="800000"/>
+            <a:headEnd/>
+            <a:tailEnd/>
+          </a:ln>
+          <a:effectLst/>
+        </p:spPr>
+      </p:pic>
+      <p:sp>
+        <p:nvSpPr>
+          <p:cNvPr id="34" name="Flèche droite 33"/>
+          <p:cNvSpPr/>
+          <p:nvPr/>
+        </p:nvSpPr>
+        <p:spPr>
+          <a:xfrm>
+            <a:off x="7239000" y="2819400"/>
+            <a:ext cx="609600" cy="533400"/>
+          </a:xfrm>
+          <a:prstGeom prst="rightArrow">
+            <a:avLst/>
+          </a:prstGeom>
+        </p:spPr>
+        <p:style>
+          <a:lnRef idx="1">
+            <a:schemeClr val="accent5"/>
+          </a:lnRef>
+          <a:fillRef idx="3">
+            <a:schemeClr val="accent5"/>
+          </a:fillRef>
+          <a:effectRef idx="2">
+            <a:schemeClr val="accent5"/>
+          </a:effectRef>
+          <a:fontRef idx="minor">
+            <a:schemeClr val="lt1"/>
+          </a:fontRef>
+        </p:style>
+        <p:txBody>
+          <a:bodyPr rtlCol="0" anchor="ctr"/>
+          <a:lstStyle/>
+          <a:p>
+            <a:pPr algn="ctr"/>
+            <a:endParaRPr lang="en-US"/>
+          </a:p>
+        </p:txBody>
+      </p:sp>
+      <p:pic>
+        <p:nvPicPr>
+          <p:cNvPr id="35" name="Picture 2"/>
+          <p:cNvPicPr>
+            <a:picLocks noChangeAspect="1" noChangeArrowheads="1"/>
+          </p:cNvPicPr>
+          <p:nvPr/>
+        </p:nvPicPr>
+        <p:blipFill>
+          <a:blip r:embed="rId15" cstate="print"/>
+          <a:srcRect/>
+          <a:stretch>
+            <a:fillRect/>
+          </a:stretch>
+        </p:blipFill>
+        <p:spPr bwMode="auto">
+          <a:xfrm>
+            <a:off x="457200" y="4550099"/>
+            <a:ext cx="1828800" cy="1850701"/>
+          </a:xfrm>
+          <a:prstGeom prst="rect">
+            <a:avLst/>
+          </a:prstGeom>
+          <a:solidFill>
+            <a:srgbClr val="FFFFFF">
+              <a:shade val="85000"/>
+            </a:srgbClr>
+          </a:solidFill>
+          <a:ln w="190500" cap="sq">
+            <a:solidFill>
+              <a:srgbClr val="FFFFFF"/>
+            </a:solidFill>
+            <a:miter lim="800000"/>
+          </a:ln>
+          <a:effectLst>
+            <a:outerShdw blurRad="55000" dist="18000" dir="5400000" algn="tl" rotWithShape="0">
+              <a:srgbClr val="000000">
+                <a:alpha val="40000"/>
+              </a:srgbClr>
+            </a:outerShdw>
+          </a:effectLst>
+          <a:scene3d>
+            <a:camera prst="orthographicFront"/>
+            <a:lightRig rig="twoPt" dir="t">
+              <a:rot lat="0" lon="0" rev="7200000"/>
+            </a:lightRig>
+          </a:scene3d>
+          <a:sp3d>
+            <a:bevelT w="25400" h="19050"/>
+            <a:contourClr>
+              <a:srgbClr val="FFFFFF"/>
+            </a:contourClr>
+          </a:sp3d>
+        </p:spPr>
+      </p:pic>
+    </p:spTree>
+  </p:cSld>
+  <p:clrMapOvr>
+    <a:masterClrMapping/>
+  </p:clrMapOvr>
+</p:sld>
+</file>
+
+<file path=ppt/slides/slide2.xml><?xml version="1.0" encoding="utf-8"?>
+<p:sld xmlns:a="http://schemas.openxmlformats.org/drawingml/2006/main" xmlns:r="http://schemas.openxmlformats.org/officeDocument/2006/relationships" xmlns:p="http://schemas.openxmlformats.org/presentationml/2006/main">
+  <p:cSld>
+    <p:spTree>
+      <p:nvGrpSpPr>
+        <p:cNvPr id="1" name=""/>
+        <p:cNvGrpSpPr/>
+        <p:nvPr/>
+      </p:nvGrpSpPr>
+      <p:grpSpPr>
+        <a:xfrm>
+          <a:off x="0" y="0"/>
+          <a:ext cx="0" cy="0"/>
+          <a:chOff x="0" y="0"/>
+          <a:chExt cx="0" cy="0"/>
+        </a:xfrm>
+      </p:grpSpPr>
+      <p:pic>
+        <p:nvPicPr>
+          <p:cNvPr id="37" name="Picture 3"/>
+          <p:cNvPicPr>
+            <a:picLocks noChangeAspect="1" noChangeArrowheads="1"/>
+          </p:cNvPicPr>
+          <p:nvPr/>
+        </p:nvPicPr>
+        <p:blipFill>
+          <a:blip r:embed="rId2" cstate="print"/>
+          <a:srcRect/>
+          <a:stretch>
+            <a:fillRect/>
+          </a:stretch>
+        </p:blipFill>
+        <p:spPr bwMode="auto">
+          <a:xfrm>
+            <a:off x="6629400" y="1306286"/>
+            <a:ext cx="304800" cy="522514"/>
+          </a:xfrm>
+          <a:prstGeom prst="roundRect">
+            <a:avLst>
+              <a:gd name="adj" fmla="val 4167"/>
+            </a:avLst>
+          </a:prstGeom>
+          <a:solidFill>
+            <a:srgbClr val="FFFFFF"/>
+          </a:solidFill>
+          <a:ln w="76200" cap="sq">
+            <a:solidFill>
+              <a:srgbClr val="292929"/>
+            </a:solidFill>
+            <a:miter lim="800000"/>
+          </a:ln>
+          <a:effectLst>
+            <a:reflection blurRad="12700" stA="28000" endPos="28000" dist="5000" dir="5400000" sy="-100000" algn="bl" rotWithShape="0"/>
+          </a:effectLst>
+          <a:scene3d>
+            <a:camera prst="orthographicFront"/>
+            <a:lightRig rig="threePt" dir="t">
+              <a:rot lat="0" lon="0" rev="2700000"/>
+            </a:lightRig>
+          </a:scene3d>
+          <a:sp3d>
+            <a:bevelT h="38100"/>
+            <a:contourClr>
+              <a:srgbClr val="C0C0C0"/>
+            </a:contourClr>
+          </a:sp3d>
+        </p:spPr>
+      </p:pic>
+      <p:pic>
+        <p:nvPicPr>
+          <p:cNvPr id="38" name="Picture 3"/>
+          <p:cNvPicPr>
+            <a:picLocks noChangeAspect="1" noChangeArrowheads="1"/>
+          </p:cNvPicPr>
+          <p:nvPr/>
+        </p:nvPicPr>
+        <p:blipFill>
+          <a:blip r:embed="rId2" cstate="print"/>
+          <a:srcRect/>
+          <a:stretch>
+            <a:fillRect/>
+          </a:stretch>
+        </p:blipFill>
+        <p:spPr bwMode="auto">
+          <a:xfrm>
+            <a:off x="6629400" y="544286"/>
+            <a:ext cx="304800" cy="522514"/>
+          </a:xfrm>
+          <a:prstGeom prst="roundRect">
+            <a:avLst>
+              <a:gd name="adj" fmla="val 4167"/>
+            </a:avLst>
+          </a:prstGeom>
+          <a:solidFill>
+            <a:srgbClr val="FFFFFF"/>
+          </a:solidFill>
+          <a:ln w="76200" cap="sq">
+            <a:solidFill>
+              <a:srgbClr val="292929"/>
+            </a:solidFill>
+            <a:miter lim="800000"/>
+          </a:ln>
+          <a:effectLst>
+            <a:reflection blurRad="12700" stA="28000" endPos="28000" dist="5000" dir="5400000" sy="-100000" algn="bl" rotWithShape="0"/>
+          </a:effectLst>
+          <a:scene3d>
+            <a:camera prst="orthographicFront"/>
+            <a:lightRig rig="threePt" dir="t">
+              <a:rot lat="0" lon="0" rev="2700000"/>
+            </a:lightRig>
+          </a:scene3d>
+          <a:sp3d>
+            <a:bevelT h="38100"/>
+            <a:contourClr>
+              <a:srgbClr val="C0C0C0"/>
+            </a:contourClr>
+          </a:sp3d>
+        </p:spPr>
+      </p:pic>
+      <p:pic>
+        <p:nvPicPr>
+          <p:cNvPr id="40" name="Picture 18"/>
+          <p:cNvPicPr>
+            <a:picLocks noChangeAspect="1" noChangeArrowheads="1"/>
+          </p:cNvPicPr>
+          <p:nvPr/>
+        </p:nvPicPr>
+        <p:blipFill>
+          <a:blip r:embed="rId3"/>
+          <a:srcRect/>
+          <a:stretch>
+            <a:fillRect/>
+          </a:stretch>
+        </p:blipFill>
+        <p:spPr bwMode="auto">
+          <a:xfrm>
+            <a:off x="3810000" y="2590800"/>
+            <a:ext cx="1283442" cy="1238250"/>
+          </a:xfrm>
+          <a:prstGeom prst="roundRect">
+            <a:avLst>
+              <a:gd name="adj" fmla="val 16667"/>
+            </a:avLst>
+          </a:prstGeom>
+          <a:ln>
+            <a:noFill/>
+          </a:ln>
+          <a:effectLst>
+            <a:outerShdw blurRad="76200" dist="38100" dir="7800000" algn="tl" rotWithShape="0">
+              <a:srgbClr val="000000">
+                <a:alpha val="40000"/>
+              </a:srgbClr>
+            </a:outerShdw>
+          </a:effectLst>
+          <a:scene3d>
+            <a:camera prst="orthographicFront"/>
+            <a:lightRig rig="contrasting" dir="t">
+              <a:rot lat="0" lon="0" rev="4200000"/>
+            </a:lightRig>
+          </a:scene3d>
+          <a:sp3d prstMaterial="plastic">
+            <a:bevelT w="381000" h="114300" prst="relaxedInset"/>
+            <a:contourClr>
+              <a:srgbClr val="969696"/>
+            </a:contourClr>
+          </a:sp3d>
+        </p:spPr>
+      </p:pic>
+      <p:pic>
+        <p:nvPicPr>
+          <p:cNvPr id="42" name="Picture 19"/>
+          <p:cNvPicPr>
+            <a:picLocks noChangeAspect="1" noChangeArrowheads="1"/>
+          </p:cNvPicPr>
+          <p:nvPr/>
+        </p:nvPicPr>
+        <p:blipFill>
+          <a:blip r:embed="rId4"/>
+          <a:srcRect/>
+          <a:stretch>
+            <a:fillRect/>
+          </a:stretch>
+        </p:blipFill>
+        <p:spPr bwMode="auto">
+          <a:xfrm>
+            <a:off x="533400" y="228600"/>
+            <a:ext cx="1228060" cy="1200150"/>
+          </a:xfrm>
+          <a:prstGeom prst="roundRect">
+            <a:avLst>
+              <a:gd name="adj" fmla="val 16667"/>
+            </a:avLst>
+          </a:prstGeom>
+          <a:ln>
+            <a:noFill/>
+          </a:ln>
+          <a:effectLst>
+            <a:outerShdw blurRad="76200" dist="38100" dir="7800000" algn="tl" rotWithShape="0">
+              <a:srgbClr val="000000">
+                <a:alpha val="40000"/>
+              </a:srgbClr>
+            </a:outerShdw>
+          </a:effectLst>
+          <a:scene3d>
+            <a:camera prst="orthographicFront"/>
+            <a:lightRig rig="contrasting" dir="t">
+              <a:rot lat="0" lon="0" rev="4200000"/>
+            </a:lightRig>
+          </a:scene3d>
+          <a:sp3d prstMaterial="plastic">
+            <a:bevelT w="381000" h="114300" prst="relaxedInset"/>
+            <a:contourClr>
+              <a:srgbClr val="969696"/>
+            </a:contourClr>
+          </a:sp3d>
+        </p:spPr>
+      </p:pic>
+      <p:pic>
+        <p:nvPicPr>
+          <p:cNvPr id="43" name="Picture 22"/>
+          <p:cNvPicPr>
+            <a:picLocks noChangeAspect="1" noChangeArrowheads="1"/>
+          </p:cNvPicPr>
+          <p:nvPr/>
+        </p:nvPicPr>
+        <p:blipFill>
+          <a:blip r:embed="rId5"/>
+          <a:srcRect/>
+          <a:stretch>
+            <a:fillRect/>
+          </a:stretch>
+        </p:blipFill>
+        <p:spPr bwMode="auto">
+          <a:xfrm>
+            <a:off x="3877620" y="228600"/>
+            <a:ext cx="1092820" cy="1219200"/>
+          </a:xfrm>
+          <a:prstGeom prst="roundRect">
+            <a:avLst>
+              <a:gd name="adj" fmla="val 16667"/>
+            </a:avLst>
+          </a:prstGeom>
+          <a:ln>
+            <a:noFill/>
+          </a:ln>
+          <a:effectLst>
+            <a:outerShdw blurRad="76200" dist="38100" dir="7800000" algn="tl" rotWithShape="0">
+              <a:srgbClr val="000000">
+                <a:alpha val="40000"/>
+              </a:srgbClr>
+            </a:outerShdw>
+          </a:effectLst>
+          <a:scene3d>
+            <a:camera prst="orthographicFront"/>
+            <a:lightRig rig="contrasting" dir="t">
+              <a:rot lat="0" lon="0" rev="4200000"/>
+            </a:lightRig>
+          </a:scene3d>
+          <a:sp3d prstMaterial="plastic">
+            <a:bevelT w="381000" h="114300" prst="relaxedInset"/>
+            <a:contourClr>
+              <a:srgbClr val="969696"/>
+            </a:contourClr>
+          </a:sp3d>
+        </p:spPr>
+      </p:pic>
+      <p:sp>
+        <p:nvSpPr>
+          <p:cNvPr id="51" name="Flèche droite 50"/>
+          <p:cNvSpPr/>
+          <p:nvPr/>
+        </p:nvSpPr>
+        <p:spPr>
+          <a:xfrm>
+            <a:off x="5029200" y="533400"/>
+            <a:ext cx="1371600" cy="533400"/>
+          </a:xfrm>
+          <a:prstGeom prst="rightArrow">
+            <a:avLst/>
+          </a:prstGeom>
+        </p:spPr>
+        <p:style>
+          <a:lnRef idx="1">
+            <a:schemeClr val="accent5"/>
+          </a:lnRef>
+          <a:fillRef idx="3">
+            <a:schemeClr val="accent5"/>
+          </a:fillRef>
+          <a:effectRef idx="2">
+            <a:schemeClr val="accent5"/>
+          </a:effectRef>
+          <a:fontRef idx="minor">
+            <a:schemeClr val="lt1"/>
+          </a:fontRef>
+        </p:style>
+        <p:txBody>
+          <a:bodyPr rtlCol="0" anchor="ctr"/>
+          <a:lstStyle/>
+          <a:p>
+            <a:pPr algn="ctr"/>
+            <a:endParaRPr lang="en-US"/>
+          </a:p>
+        </p:txBody>
+      </p:sp>
+      <p:sp>
+        <p:nvSpPr>
+          <p:cNvPr id="52" name="Flèche droite 51"/>
+          <p:cNvSpPr/>
+          <p:nvPr/>
+        </p:nvSpPr>
+        <p:spPr>
+          <a:xfrm rot="5400000">
+            <a:off x="3810000" y="1752600"/>
+            <a:ext cx="1143000" cy="533400"/>
+          </a:xfrm>
+          <a:prstGeom prst="rightArrow">
+            <a:avLst/>
+          </a:prstGeom>
+        </p:spPr>
+        <p:style>
+          <a:lnRef idx="1">
+            <a:schemeClr val="accent5"/>
+          </a:lnRef>
+          <a:fillRef idx="3">
+            <a:schemeClr val="accent5"/>
+          </a:fillRef>
+          <a:effectRef idx="2">
+            <a:schemeClr val="accent5"/>
+          </a:effectRef>
+          <a:fontRef idx="minor">
+            <a:schemeClr val="lt1"/>
+          </a:fontRef>
+        </p:style>
+        <p:txBody>
+          <a:bodyPr rtlCol="0" anchor="ctr"/>
+          <a:lstStyle/>
+          <a:p>
+            <a:pPr algn="ctr"/>
+            <a:endParaRPr lang="en-US"/>
+          </a:p>
+        </p:txBody>
+      </p:sp>
+      <p:sp>
+        <p:nvSpPr>
+          <p:cNvPr id="56" name="Flèche droite 55"/>
+          <p:cNvSpPr/>
+          <p:nvPr/>
+        </p:nvSpPr>
+        <p:spPr>
+          <a:xfrm>
+            <a:off x="1828800" y="533400"/>
+            <a:ext cx="1981200" cy="533400"/>
+          </a:xfrm>
+          <a:prstGeom prst="rightArrow">
+            <a:avLst/>
+          </a:prstGeom>
+        </p:spPr>
+        <p:style>
+          <a:lnRef idx="1">
+            <a:schemeClr val="accent5"/>
+          </a:lnRef>
+          <a:fillRef idx="3">
+            <a:schemeClr val="accent5"/>
+          </a:fillRef>
+          <a:effectRef idx="2">
+            <a:schemeClr val="accent5"/>
+          </a:effectRef>
+          <a:fontRef idx="minor">
+            <a:schemeClr val="lt1"/>
+          </a:fontRef>
+        </p:style>
+        <p:txBody>
+          <a:bodyPr rtlCol="0" anchor="ctr"/>
+          <a:lstStyle/>
+          <a:p>
+            <a:pPr algn="ctr"/>
+            <a:endParaRPr lang="en-US"/>
+          </a:p>
+        </p:txBody>
+      </p:sp>
+      <p:pic>
+        <p:nvPicPr>
+          <p:cNvPr id="57" name="Picture 7"/>
+          <p:cNvPicPr>
+            <a:picLocks noChangeAspect="1" noChangeArrowheads="1"/>
+          </p:cNvPicPr>
+          <p:nvPr/>
+        </p:nvPicPr>
+        <p:blipFill>
+          <a:blip r:embed="rId6" cstate="print"/>
+          <a:srcRect/>
+          <a:stretch>
+            <a:fillRect/>
+          </a:stretch>
+        </p:blipFill>
+        <p:spPr bwMode="auto">
+          <a:xfrm>
+            <a:off x="8021665" y="2057400"/>
+            <a:ext cx="588935" cy="548640"/>
+          </a:xfrm>
+          <a:prstGeom prst="roundRect">
+            <a:avLst>
+              <a:gd name="adj" fmla="val 16667"/>
+            </a:avLst>
+          </a:prstGeom>
+          <a:ln>
+            <a:noFill/>
+          </a:ln>
+          <a:effectLst>
+            <a:outerShdw blurRad="76200" dist="38100" dir="7800000" algn="tl" rotWithShape="0">
+              <a:srgbClr val="000000">
+                <a:alpha val="40000"/>
+              </a:srgbClr>
+            </a:outerShdw>
+          </a:effectLst>
+          <a:scene3d>
+            <a:camera prst="orthographicFront"/>
+            <a:lightRig rig="contrasting" dir="t">
+              <a:rot lat="0" lon="0" rev="4200000"/>
+            </a:lightRig>
+          </a:scene3d>
+          <a:sp3d prstMaterial="plastic">
+            <a:bevelT w="381000" h="114300" prst="relaxedInset"/>
+            <a:contourClr>
+              <a:srgbClr val="969696"/>
+            </a:contourClr>
+          </a:sp3d>
+        </p:spPr>
+      </p:pic>
+      <p:sp>
+        <p:nvSpPr>
+          <p:cNvPr id="63" name="Flèche droite 62"/>
+          <p:cNvSpPr/>
+          <p:nvPr/>
+        </p:nvSpPr>
+        <p:spPr>
+          <a:xfrm>
+            <a:off x="7239000" y="533400"/>
+            <a:ext cx="609600" cy="533400"/>
+          </a:xfrm>
+          <a:prstGeom prst="rightArrow">
+            <a:avLst/>
+          </a:prstGeom>
+        </p:spPr>
+        <p:style>
+          <a:lnRef idx="1">
+            <a:schemeClr val="accent5"/>
+          </a:lnRef>
+          <a:fillRef idx="3">
+            <a:schemeClr val="accent5"/>
+          </a:fillRef>
+          <a:effectRef idx="2">
+            <a:schemeClr val="accent5"/>
+          </a:effectRef>
+          <a:fontRef idx="minor">
+            <a:schemeClr val="lt1"/>
+          </a:fontRef>
+        </p:style>
+        <p:txBody>
+          <a:bodyPr rtlCol="0" anchor="ctr"/>
+          <a:lstStyle/>
+          <a:p>
+            <a:pPr algn="ctr"/>
+            <a:endParaRPr lang="en-US"/>
+          </a:p>
+        </p:txBody>
+      </p:sp>
+      <p:sp>
+        <p:nvSpPr>
+          <p:cNvPr id="64" name="Flèche droite 63"/>
+          <p:cNvSpPr/>
+          <p:nvPr/>
+        </p:nvSpPr>
+        <p:spPr>
+          <a:xfrm>
+            <a:off x="7239000" y="1295400"/>
+            <a:ext cx="609600" cy="533400"/>
+          </a:xfrm>
+          <a:prstGeom prst="rightArrow">
+            <a:avLst/>
+          </a:prstGeom>
+        </p:spPr>
+        <p:style>
+          <a:lnRef idx="1">
+            <a:schemeClr val="accent5"/>
+          </a:lnRef>
+          <a:fillRef idx="3">
+            <a:schemeClr val="accent5"/>
+          </a:fillRef>
+          <a:effectRef idx="2">
+            <a:schemeClr val="accent5"/>
+          </a:effectRef>
+          <a:fontRef idx="minor">
+            <a:schemeClr val="lt1"/>
+          </a:fontRef>
+        </p:style>
+        <p:txBody>
+          <a:bodyPr rtlCol="0" anchor="ctr"/>
+          <a:lstStyle/>
+          <a:p>
+            <a:pPr algn="ctr"/>
+            <a:endParaRPr lang="en-US"/>
+          </a:p>
+        </p:txBody>
+      </p:sp>
+      <p:sp>
+        <p:nvSpPr>
+          <p:cNvPr id="65" name="Flèche droite 64"/>
+          <p:cNvSpPr/>
+          <p:nvPr/>
+        </p:nvSpPr>
+        <p:spPr>
+          <a:xfrm>
+            <a:off x="7239000" y="2057400"/>
+            <a:ext cx="609600" cy="533400"/>
+          </a:xfrm>
+          <a:prstGeom prst="rightArrow">
+            <a:avLst/>
+          </a:prstGeom>
+        </p:spPr>
+        <p:style>
+          <a:lnRef idx="1">
+            <a:schemeClr val="accent5"/>
+          </a:lnRef>
+          <a:fillRef idx="3">
+            <a:schemeClr val="accent5"/>
+          </a:fillRef>
+          <a:effectRef idx="2">
+            <a:schemeClr val="accent5"/>
+          </a:effectRef>
+          <a:fontRef idx="minor">
+            <a:schemeClr val="lt1"/>
+          </a:fontRef>
+        </p:style>
+        <p:txBody>
+          <a:bodyPr rtlCol="0" anchor="ctr"/>
+          <a:lstStyle/>
+          <a:p>
+            <a:pPr algn="ctr"/>
+            <a:endParaRPr lang="en-US"/>
+          </a:p>
+        </p:txBody>
+      </p:sp>
+      <p:pic>
+        <p:nvPicPr>
+          <p:cNvPr id="2051" name="Picture 3"/>
+          <p:cNvPicPr>
+            <a:picLocks noChangeAspect="1" noChangeArrowheads="1"/>
+          </p:cNvPicPr>
+          <p:nvPr/>
+        </p:nvPicPr>
+        <p:blipFill>
+          <a:blip r:embed="rId7" cstate="print"/>
+          <a:srcRect/>
+          <a:stretch>
+            <a:fillRect/>
+          </a:stretch>
+        </p:blipFill>
+        <p:spPr bwMode="auto">
+          <a:xfrm>
+            <a:off x="4724400" y="3200400"/>
+            <a:ext cx="533400" cy="914400"/>
+          </a:xfrm>
+          <a:prstGeom prst="roundRect">
+            <a:avLst>
+              <a:gd name="adj" fmla="val 4167"/>
+            </a:avLst>
+          </a:prstGeom>
+          <a:solidFill>
+            <a:srgbClr val="FFFFFF"/>
+          </a:solidFill>
+          <a:ln w="76200" cap="sq">
+            <a:solidFill>
+              <a:srgbClr val="292929"/>
+            </a:solidFill>
+            <a:miter lim="800000"/>
+          </a:ln>
+          <a:effectLst>
+            <a:reflection blurRad="12700" stA="28000" endPos="28000" dist="5000" dir="5400000" sy="-100000" algn="bl" rotWithShape="0"/>
+          </a:effectLst>
+          <a:scene3d>
+            <a:camera prst="orthographicFront"/>
+            <a:lightRig rig="threePt" dir="t">
+              <a:rot lat="0" lon="0" rev="2700000"/>
+            </a:lightRig>
+          </a:scene3d>
+          <a:sp3d>
+            <a:bevelT h="38100"/>
+            <a:contourClr>
+              <a:srgbClr val="C0C0C0"/>
+            </a:contourClr>
+          </a:sp3d>
+        </p:spPr>
+      </p:pic>
+      <p:sp>
+        <p:nvSpPr>
+          <p:cNvPr id="44" name="Rogner un rectangle à un seul coin 43"/>
+          <p:cNvSpPr/>
+          <p:nvPr/>
+        </p:nvSpPr>
+        <p:spPr>
+          <a:xfrm>
+            <a:off x="1371600" y="1219200"/>
+            <a:ext cx="1447800" cy="838200"/>
+          </a:xfrm>
+          <a:prstGeom prst="snip1Rect">
+            <a:avLst/>
+          </a:prstGeom>
+        </p:spPr>
+        <p:style>
+          <a:lnRef idx="1">
+            <a:schemeClr val="dk1"/>
+          </a:lnRef>
+          <a:fillRef idx="3">
+            <a:schemeClr val="dk1"/>
+          </a:fillRef>
+          <a:effectRef idx="2">
+            <a:schemeClr val="dk1"/>
+          </a:effectRef>
+          <a:fontRef idx="minor">
+            <a:schemeClr val="lt1"/>
+          </a:fontRef>
+        </p:style>
+        <p:txBody>
+          <a:bodyPr rtlCol="0" anchor="ctr"/>
+          <a:lstStyle/>
+          <a:p>
+            <a:r>
+              <a:rPr lang="en-US" sz="1200" b="1" dirty="0" smtClean="0">
+                <a:solidFill>
+                  <a:srgbClr val="00B050"/>
+                </a:solidFill>
+                <a:latin typeface="Consolas" pitchFamily="49" charset="0"/>
+              </a:rPr>
+              <a:t>#vid-script.py</a:t>
+            </a:r>
+            <a:br>
+              <a:rPr lang="en-US" sz="1200" b="1" dirty="0" smtClean="0">
+                <a:solidFill>
+                  <a:srgbClr val="00B050"/>
+                </a:solidFill>
+                <a:latin typeface="Consolas" pitchFamily="49" charset="0"/>
+              </a:rPr>
+            </a:br>
+            <a:r>
+              <a:rPr lang="en-US" sz="1200" b="1" dirty="0" smtClean="0">
+                <a:solidFill>
+                  <a:srgbClr val="00B050"/>
+                </a:solidFill>
+                <a:latin typeface="Consolas" pitchFamily="49" charset="0"/>
+              </a:rPr>
+              <a:t>TXT=‘blabla…’</a:t>
+            </a:r>
+          </a:p>
+          <a:p>
+            <a:r>
+              <a:rPr lang="en-US" sz="1200" b="1" dirty="0" smtClean="0">
+                <a:solidFill>
+                  <a:srgbClr val="00B050"/>
+                </a:solidFill>
+                <a:latin typeface="Consolas" pitchFamily="49" charset="0"/>
+              </a:rPr>
+              <a:t>IMG=‘bla.mp4’</a:t>
+            </a:r>
+            <a:br>
+              <a:rPr lang="en-US" sz="1200" b="1" dirty="0" smtClean="0">
+                <a:solidFill>
+                  <a:srgbClr val="00B050"/>
+                </a:solidFill>
+                <a:latin typeface="Consolas" pitchFamily="49" charset="0"/>
+              </a:rPr>
+            </a:br>
+            <a:r>
+              <a:rPr lang="en-US" sz="1200" b="1" dirty="0" smtClean="0">
+                <a:solidFill>
+                  <a:srgbClr val="00B050"/>
+                </a:solidFill>
+                <a:latin typeface="Consolas" pitchFamily="49" charset="0"/>
+              </a:rPr>
+              <a:t>…</a:t>
+            </a:r>
+            <a:endParaRPr lang="en-US" sz="1200" b="1" dirty="0">
+              <a:solidFill>
+                <a:srgbClr val="00B050"/>
+              </a:solidFill>
+              <a:latin typeface="Consolas" pitchFamily="49" charset="0"/>
+            </a:endParaRPr>
+          </a:p>
+        </p:txBody>
+      </p:sp>
+      <p:pic>
+        <p:nvPicPr>
+          <p:cNvPr id="69" name="Picture 3"/>
+          <p:cNvPicPr>
+            <a:picLocks noChangeAspect="1" noChangeArrowheads="1"/>
+          </p:cNvPicPr>
+          <p:nvPr/>
+        </p:nvPicPr>
+        <p:blipFill>
+          <a:blip r:embed="rId2" cstate="print"/>
+          <a:srcRect/>
+          <a:stretch>
+            <a:fillRect/>
+          </a:stretch>
+        </p:blipFill>
+        <p:spPr bwMode="auto">
+          <a:xfrm>
+            <a:off x="6629400" y="2057400"/>
+            <a:ext cx="304800" cy="522514"/>
+          </a:xfrm>
+          <a:prstGeom prst="roundRect">
+            <a:avLst>
+              <a:gd name="adj" fmla="val 4167"/>
+            </a:avLst>
+          </a:prstGeom>
+          <a:solidFill>
+            <a:srgbClr val="FFFFFF"/>
+          </a:solidFill>
+          <a:ln w="76200" cap="sq">
+            <a:solidFill>
+              <a:srgbClr val="292929"/>
+            </a:solidFill>
+            <a:miter lim="800000"/>
+          </a:ln>
+          <a:effectLst>
+            <a:reflection blurRad="12700" stA="28000" endPos="28000" dist="5000" dir="5400000" sy="-100000" algn="bl" rotWithShape="0"/>
+          </a:effectLst>
+          <a:scene3d>
+            <a:camera prst="orthographicFront"/>
+            <a:lightRig rig="threePt" dir="t">
+              <a:rot lat="0" lon="0" rev="2700000"/>
+            </a:lightRig>
+          </a:scene3d>
+          <a:sp3d>
+            <a:bevelT h="38100"/>
+            <a:contourClr>
+              <a:srgbClr val="C0C0C0"/>
+            </a:contourClr>
+          </a:sp3d>
+        </p:spPr>
+      </p:pic>
+      <p:pic>
+        <p:nvPicPr>
+          <p:cNvPr id="2053" name="Picture 5"/>
+          <p:cNvPicPr>
+            <a:picLocks noChangeAspect="1" noChangeArrowheads="1"/>
+          </p:cNvPicPr>
+          <p:nvPr/>
+        </p:nvPicPr>
+        <p:blipFill>
+          <a:blip r:embed="rId8"/>
+          <a:srcRect/>
+          <a:stretch>
+            <a:fillRect/>
+          </a:stretch>
+        </p:blipFill>
+        <p:spPr bwMode="auto">
+          <a:xfrm>
+            <a:off x="8001000" y="1264920"/>
+            <a:ext cx="605945" cy="640080"/>
+          </a:xfrm>
+          <a:prstGeom prst="roundRect">
+            <a:avLst>
+              <a:gd name="adj" fmla="val 16667"/>
+            </a:avLst>
+          </a:prstGeom>
+          <a:ln>
+            <a:noFill/>
+          </a:ln>
+          <a:effectLst>
+            <a:outerShdw blurRad="76200" dist="38100" dir="7800000" algn="tl" rotWithShape="0">
+              <a:srgbClr val="000000">
+                <a:alpha val="40000"/>
+              </a:srgbClr>
+            </a:outerShdw>
+          </a:effectLst>
+          <a:scene3d>
+            <a:camera prst="orthographicFront"/>
+            <a:lightRig rig="contrasting" dir="t">
+              <a:rot lat="0" lon="0" rev="4200000"/>
+            </a:lightRig>
+          </a:scene3d>
+          <a:sp3d prstMaterial="plastic">
+            <a:bevelT w="381000" h="114300" prst="relaxedInset"/>
+            <a:contourClr>
+              <a:srgbClr val="969696"/>
+            </a:contourClr>
+          </a:sp3d>
+        </p:spPr>
+      </p:pic>
+      <p:pic>
+        <p:nvPicPr>
+          <p:cNvPr id="70" name="Picture 8"/>
+          <p:cNvPicPr>
+            <a:picLocks noChangeAspect="1" noChangeArrowheads="1"/>
+          </p:cNvPicPr>
+          <p:nvPr/>
+        </p:nvPicPr>
+        <p:blipFill>
+          <a:blip r:embed="rId9"/>
+          <a:srcRect/>
+          <a:stretch>
+            <a:fillRect/>
+          </a:stretch>
+        </p:blipFill>
+        <p:spPr bwMode="auto">
+          <a:xfrm>
+            <a:off x="8030791" y="2804160"/>
+            <a:ext cx="567030" cy="548640"/>
+          </a:xfrm>
+          <a:prstGeom prst="roundRect">
+            <a:avLst>
+              <a:gd name="adj" fmla="val 16667"/>
+            </a:avLst>
+          </a:prstGeom>
+          <a:ln>
+            <a:noFill/>
+          </a:ln>
+          <a:effectLst>
+            <a:outerShdw blurRad="76200" dist="38100" dir="7800000" algn="tl" rotWithShape="0">
+              <a:srgbClr val="000000">
+                <a:alpha val="40000"/>
+              </a:srgbClr>
+            </a:outerShdw>
+          </a:effectLst>
+          <a:scene3d>
+            <a:camera prst="orthographicFront"/>
+            <a:lightRig rig="contrasting" dir="t">
+              <a:rot lat="0" lon="0" rev="4200000"/>
+            </a:lightRig>
+          </a:scene3d>
+          <a:sp3d prstMaterial="plastic">
+            <a:bevelT w="381000" h="114300" prst="relaxedInset"/>
+            <a:contourClr>
+              <a:srgbClr val="969696"/>
+            </a:contourClr>
+          </a:sp3d>
+        </p:spPr>
+      </p:pic>
+      <p:sp>
+        <p:nvSpPr>
+          <p:cNvPr id="71" name="Flèche droite 70"/>
+          <p:cNvSpPr/>
+          <p:nvPr/>
+        </p:nvSpPr>
+        <p:spPr>
+          <a:xfrm>
+            <a:off x="7239000" y="2804160"/>
+            <a:ext cx="609600" cy="533400"/>
+          </a:xfrm>
+          <a:prstGeom prst="rightArrow">
+            <a:avLst/>
+          </a:prstGeom>
+        </p:spPr>
+        <p:style>
+          <a:lnRef idx="1">
+            <a:schemeClr val="accent5"/>
+          </a:lnRef>
+          <a:fillRef idx="3">
+            <a:schemeClr val="accent5"/>
+          </a:fillRef>
+          <a:effectRef idx="2">
+            <a:schemeClr val="accent5"/>
+          </a:effectRef>
+          <a:fontRef idx="minor">
+            <a:schemeClr val="lt1"/>
+          </a:fontRef>
+        </p:style>
+        <p:txBody>
+          <a:bodyPr rtlCol="0" anchor="ctr"/>
+          <a:lstStyle/>
+          <a:p>
+            <a:pPr algn="ctr"/>
+            <a:endParaRPr lang="en-US"/>
+          </a:p>
+        </p:txBody>
+      </p:sp>
+      <p:pic>
+        <p:nvPicPr>
+          <p:cNvPr id="72" name="Picture 3"/>
+          <p:cNvPicPr>
+            <a:picLocks noChangeAspect="1" noChangeArrowheads="1"/>
+          </p:cNvPicPr>
+          <p:nvPr/>
+        </p:nvPicPr>
+        <p:blipFill>
+          <a:blip r:embed="rId2" cstate="print"/>
+          <a:srcRect/>
+          <a:stretch>
+            <a:fillRect/>
+          </a:stretch>
+        </p:blipFill>
+        <p:spPr bwMode="auto">
+          <a:xfrm>
+            <a:off x="6629400" y="2804160"/>
+            <a:ext cx="304800" cy="522514"/>
+          </a:xfrm>
+          <a:prstGeom prst="roundRect">
+            <a:avLst>
+              <a:gd name="adj" fmla="val 4167"/>
+            </a:avLst>
+          </a:prstGeom>
+          <a:solidFill>
+            <a:srgbClr val="FFFFFF"/>
+          </a:solidFill>
+          <a:ln w="76200" cap="sq">
+            <a:solidFill>
+              <a:srgbClr val="292929"/>
+            </a:solidFill>
+            <a:miter lim="800000"/>
+          </a:ln>
+          <a:effectLst>
+            <a:reflection blurRad="12700" stA="28000" endPos="28000" dist="5000" dir="5400000" sy="-100000" algn="bl" rotWithShape="0"/>
+          </a:effectLst>
+          <a:scene3d>
+            <a:camera prst="orthographicFront"/>
+            <a:lightRig rig="threePt" dir="t">
+              <a:rot lat="0" lon="0" rev="2700000"/>
+            </a:lightRig>
+          </a:scene3d>
+          <a:sp3d>
+            <a:bevelT h="38100"/>
+            <a:contourClr>
+              <a:srgbClr val="C0C0C0"/>
+            </a:contourClr>
+          </a:sp3d>
+        </p:spPr>
+      </p:pic>
+      <p:pic>
+        <p:nvPicPr>
+          <p:cNvPr id="2055" name="Picture 7"/>
+          <p:cNvPicPr>
+            <a:picLocks noChangeAspect="1" noChangeArrowheads="1"/>
+          </p:cNvPicPr>
+          <p:nvPr/>
+        </p:nvPicPr>
+        <p:blipFill>
+          <a:blip r:embed="rId10" cstate="print"/>
+          <a:srcRect/>
+          <a:stretch>
+            <a:fillRect/>
+          </a:stretch>
+        </p:blipFill>
+        <p:spPr bwMode="auto">
+          <a:xfrm>
+            <a:off x="8001001" y="518160"/>
+            <a:ext cx="609599" cy="548640"/>
+          </a:xfrm>
+          <a:prstGeom prst="roundRect">
+            <a:avLst>
+              <a:gd name="adj" fmla="val 16667"/>
+            </a:avLst>
+          </a:prstGeom>
+          <a:ln>
+            <a:noFill/>
+          </a:ln>
+          <a:effectLst>
+            <a:outerShdw blurRad="76200" dist="38100" dir="7800000" algn="tl" rotWithShape="0">
+              <a:srgbClr val="000000">
+                <a:alpha val="40000"/>
+              </a:srgbClr>
+            </a:outerShdw>
+          </a:effectLst>
+          <a:scene3d>
+            <a:camera prst="orthographicFront"/>
+            <a:lightRig rig="contrasting" dir="t">
+              <a:rot lat="0" lon="0" rev="4200000"/>
+            </a:lightRig>
+          </a:scene3d>
+          <a:sp3d prstMaterial="plastic">
+            <a:bevelT w="381000" h="114300" prst="relaxedInset"/>
+            <a:contourClr>
+              <a:srgbClr val="969696"/>
+            </a:contourClr>
+          </a:sp3d>
+        </p:spPr>
+      </p:pic>
+      <p:pic>
+        <p:nvPicPr>
+          <p:cNvPr id="26" name="Picture 2"/>
+          <p:cNvPicPr>
+            <a:picLocks noChangeAspect="1" noChangeArrowheads="1"/>
+          </p:cNvPicPr>
+          <p:nvPr/>
+        </p:nvPicPr>
+        <p:blipFill>
+          <a:blip r:embed="rId11"/>
+          <a:srcRect/>
+          <a:stretch>
+            <a:fillRect/>
+          </a:stretch>
+        </p:blipFill>
+        <p:spPr bwMode="auto">
+          <a:xfrm>
+            <a:off x="457200" y="4628771"/>
+            <a:ext cx="1752599" cy="1772029"/>
+          </a:xfrm>
+          <a:prstGeom prst="roundRect">
+            <a:avLst>
+              <a:gd name="adj" fmla="val 4167"/>
+            </a:avLst>
+          </a:prstGeom>
+          <a:solidFill>
+            <a:srgbClr val="FFFFFF"/>
+          </a:solidFill>
+          <a:ln w="127000" cap="sq">
+            <a:solidFill>
+              <a:srgbClr val="292929"/>
+            </a:solidFill>
+            <a:miter lim="800000"/>
+          </a:ln>
+          <a:effectLst>
+            <a:reflection blurRad="12700" stA="28000" endPos="28000" dist="5000" dir="5400000" sy="-100000" algn="bl" rotWithShape="0"/>
+          </a:effectLst>
+          <a:scene3d>
+            <a:camera prst="orthographicFront"/>
+            <a:lightRig rig="threePt" dir="t">
+              <a:rot lat="0" lon="0" rev="2700000"/>
+            </a:lightRig>
+          </a:scene3d>
+          <a:sp3d>
+            <a:bevelT h="38100"/>
+            <a:contourClr>
+              <a:srgbClr val="C0C0C0"/>
+            </a:contourClr>
+          </a:sp3d>
+        </p:spPr>
+      </p:pic>
+      <p:pic>
+        <p:nvPicPr>
+          <p:cNvPr id="27" name="Picture 2"/>
+          <p:cNvPicPr>
+            <a:picLocks noChangeAspect="1" noChangeArrowheads="1"/>
+          </p:cNvPicPr>
+          <p:nvPr/>
+        </p:nvPicPr>
+        <p:blipFill>
+          <a:blip r:embed="rId12" cstate="print"/>
+          <a:stretch>
+            <a:fillRect/>
+          </a:stretch>
+        </p:blipFill>
+        <p:spPr bwMode="auto">
+          <a:xfrm>
+            <a:off x="3886200" y="3271531"/>
+            <a:ext cx="457200" cy="462269"/>
+          </a:xfrm>
+          <a:prstGeom prst="rect">
+            <a:avLst/>
+          </a:prstGeom>
+          <a:noFill/>
+          <a:ln>
+            <a:noFill/>
+          </a:ln>
+        </p:spPr>
+      </p:pic>
+      <p:pic>
+        <p:nvPicPr>
+          <p:cNvPr id="2056" name="Picture 8"/>
+          <p:cNvPicPr>
+            <a:picLocks noChangeAspect="1" noChangeArrowheads="1"/>
+          </p:cNvPicPr>
+          <p:nvPr/>
+        </p:nvPicPr>
+        <p:blipFill>
+          <a:blip r:embed="rId13"/>
+          <a:srcRect/>
+          <a:stretch>
+            <a:fillRect/>
+          </a:stretch>
+        </p:blipFill>
+        <p:spPr bwMode="auto">
+          <a:xfrm rot="2121903">
+            <a:off x="-1220796" y="2702925"/>
+            <a:ext cx="11698904" cy="1617663"/>
+          </a:xfrm>
+          <a:prstGeom prst="rect">
+            <a:avLst/>
+          </a:prstGeom>
+          <a:noFill/>
+          <a:ln w="9525">
+            <a:noFill/>
+            <a:miter lim="800000"/>
+            <a:headEnd/>
+            <a:tailEnd/>
+          </a:ln>
+          <a:effectLst/>
+        </p:spPr>
+      </p:pic>
     </p:spTree>
   </p:cSld>
   <p:clrMapOvr>

</xml_diff>

<commit_message>
docs: ✏️ readme - added comp. diagram
</commit_message>
<xml_diff>
--- a/docs/README/diagram.pptx
+++ b/docs/README/diagram.pptx
@@ -6,7 +6,9 @@
   </p:sldMasterIdLst>
   <p:sldIdLst>
     <p:sldId id="256" r:id="rId2"/>
-    <p:sldId id="258" r:id="rId3"/>
+    <p:sldId id="259" r:id="rId3"/>
+    <p:sldId id="258" r:id="rId4"/>
+    <p:sldId id="261" r:id="rId5"/>
   </p:sldIdLst>
   <p:sldSz cx="9144000" cy="6858000" type="screen4x3"/>
   <p:notesSz cx="6858000" cy="9144000"/>
@@ -4266,8 +4268,8 @@
         </p:blipFill>
         <p:spPr bwMode="auto">
           <a:xfrm>
-            <a:off x="4724400" y="3295650"/>
-            <a:ext cx="838200" cy="838200"/>
+            <a:off x="4648200" y="3295650"/>
+            <a:ext cx="1047750" cy="1047750"/>
           </a:xfrm>
           <a:prstGeom prst="rect">
             <a:avLst/>
@@ -4696,6 +4698,484 @@
           </a:sp3d>
         </p:spPr>
       </p:pic>
+      <p:sp>
+        <p:nvSpPr>
+          <p:cNvPr id="36" name="Rectangle 35"/>
+          <p:cNvSpPr/>
+          <p:nvPr/>
+        </p:nvSpPr>
+        <p:spPr>
+          <a:xfrm>
+            <a:off x="9296400" y="533400"/>
+            <a:ext cx="609600" cy="609600"/>
+          </a:xfrm>
+          <a:prstGeom prst="rect">
+            <a:avLst/>
+          </a:prstGeom>
+          <a:solidFill>
+            <a:schemeClr val="accent2">
+              <a:lumMod val="60000"/>
+              <a:lumOff val="40000"/>
+            </a:schemeClr>
+          </a:solidFill>
+          <a:ln>
+            <a:solidFill>
+              <a:schemeClr val="tx1"/>
+            </a:solidFill>
+          </a:ln>
+        </p:spPr>
+        <p:style>
+          <a:lnRef idx="2">
+            <a:schemeClr val="accent1">
+              <a:shade val="50000"/>
+            </a:schemeClr>
+          </a:lnRef>
+          <a:fillRef idx="1">
+            <a:schemeClr val="accent1"/>
+          </a:fillRef>
+          <a:effectRef idx="0">
+            <a:schemeClr val="accent1"/>
+          </a:effectRef>
+          <a:fontRef idx="minor">
+            <a:schemeClr val="lt1"/>
+          </a:fontRef>
+        </p:style>
+        <p:txBody>
+          <a:bodyPr rtlCol="0" anchor="ctr"/>
+          <a:lstStyle/>
+          <a:p>
+            <a:pPr algn="ctr"/>
+            <a:r>
+              <a:rPr lang="en-US" sz="2000" b="1" dirty="0" smtClean="0">
+                <a:solidFill>
+                  <a:schemeClr val="tx1"/>
+                </a:solidFill>
+              </a:rPr>
+              <a:t>S</a:t>
+            </a:r>
+            <a:endParaRPr lang="en-US" sz="2000" b="1" dirty="0">
+              <a:solidFill>
+                <a:schemeClr val="tx1"/>
+              </a:solidFill>
+            </a:endParaRPr>
+          </a:p>
+        </p:txBody>
+      </p:sp>
+      <p:sp>
+        <p:nvSpPr>
+          <p:cNvPr id="37" name="Rectangle 36"/>
+          <p:cNvSpPr/>
+          <p:nvPr/>
+        </p:nvSpPr>
+        <p:spPr>
+          <a:xfrm>
+            <a:off x="9296400" y="1295400"/>
+            <a:ext cx="609600" cy="609600"/>
+          </a:xfrm>
+          <a:prstGeom prst="rect">
+            <a:avLst/>
+          </a:prstGeom>
+          <a:solidFill>
+            <a:schemeClr val="accent6">
+              <a:lumMod val="60000"/>
+              <a:lumOff val="40000"/>
+            </a:schemeClr>
+          </a:solidFill>
+          <a:ln>
+            <a:solidFill>
+              <a:schemeClr val="tx1"/>
+            </a:solidFill>
+          </a:ln>
+        </p:spPr>
+        <p:style>
+          <a:lnRef idx="2">
+            <a:schemeClr val="accent1">
+              <a:shade val="50000"/>
+            </a:schemeClr>
+          </a:lnRef>
+          <a:fillRef idx="1">
+            <a:schemeClr val="accent1"/>
+          </a:fillRef>
+          <a:effectRef idx="0">
+            <a:schemeClr val="accent1"/>
+          </a:effectRef>
+          <a:fontRef idx="minor">
+            <a:schemeClr val="lt1"/>
+          </a:fontRef>
+        </p:style>
+        <p:txBody>
+          <a:bodyPr rtlCol="0" anchor="ctr"/>
+          <a:lstStyle/>
+          <a:p>
+            <a:pPr algn="ctr"/>
+            <a:r>
+              <a:rPr lang="en-US" sz="2000" b="1" dirty="0" smtClean="0">
+                <a:solidFill>
+                  <a:schemeClr val="tx1"/>
+                </a:solidFill>
+              </a:rPr>
+              <a:t>A</a:t>
+            </a:r>
+            <a:endParaRPr lang="en-US" sz="2000" b="1" dirty="0">
+              <a:solidFill>
+                <a:schemeClr val="tx1"/>
+              </a:solidFill>
+            </a:endParaRPr>
+          </a:p>
+        </p:txBody>
+      </p:sp>
+      <p:sp>
+        <p:nvSpPr>
+          <p:cNvPr id="38" name="Rectangle 37"/>
+          <p:cNvSpPr/>
+          <p:nvPr/>
+        </p:nvSpPr>
+        <p:spPr>
+          <a:xfrm>
+            <a:off x="9296400" y="2057400"/>
+            <a:ext cx="609600" cy="609600"/>
+          </a:xfrm>
+          <a:prstGeom prst="rect">
+            <a:avLst/>
+          </a:prstGeom>
+          <a:solidFill>
+            <a:srgbClr val="FFFF99"/>
+          </a:solidFill>
+          <a:ln>
+            <a:solidFill>
+              <a:schemeClr val="tx1"/>
+            </a:solidFill>
+          </a:ln>
+        </p:spPr>
+        <p:style>
+          <a:lnRef idx="2">
+            <a:schemeClr val="accent1">
+              <a:shade val="50000"/>
+            </a:schemeClr>
+          </a:lnRef>
+          <a:fillRef idx="1">
+            <a:schemeClr val="accent1"/>
+          </a:fillRef>
+          <a:effectRef idx="0">
+            <a:schemeClr val="accent1"/>
+          </a:effectRef>
+          <a:fontRef idx="minor">
+            <a:schemeClr val="lt1"/>
+          </a:fontRef>
+        </p:style>
+        <p:txBody>
+          <a:bodyPr rtlCol="0" anchor="ctr"/>
+          <a:lstStyle/>
+          <a:p>
+            <a:pPr algn="ctr"/>
+            <a:r>
+              <a:rPr lang="en-US" sz="2000" b="1" dirty="0" smtClean="0">
+                <a:solidFill>
+                  <a:schemeClr val="tx1"/>
+                </a:solidFill>
+              </a:rPr>
+              <a:t>B</a:t>
+            </a:r>
+            <a:endParaRPr lang="en-US" sz="2000" b="1" dirty="0">
+              <a:solidFill>
+                <a:schemeClr val="tx1"/>
+              </a:solidFill>
+            </a:endParaRPr>
+          </a:p>
+        </p:txBody>
+      </p:sp>
+      <p:sp>
+        <p:nvSpPr>
+          <p:cNvPr id="40" name="Rectangle 39"/>
+          <p:cNvSpPr/>
+          <p:nvPr/>
+        </p:nvSpPr>
+        <p:spPr>
+          <a:xfrm>
+            <a:off x="9296400" y="4343400"/>
+            <a:ext cx="609600" cy="609600"/>
+          </a:xfrm>
+          <a:prstGeom prst="rect">
+            <a:avLst/>
+          </a:prstGeom>
+          <a:solidFill>
+            <a:srgbClr val="9999FF"/>
+          </a:solidFill>
+          <a:ln>
+            <a:solidFill>
+              <a:schemeClr val="tx1"/>
+            </a:solidFill>
+          </a:ln>
+        </p:spPr>
+        <p:style>
+          <a:lnRef idx="2">
+            <a:schemeClr val="accent1">
+              <a:shade val="50000"/>
+            </a:schemeClr>
+          </a:lnRef>
+          <a:fillRef idx="1">
+            <a:schemeClr val="accent1"/>
+          </a:fillRef>
+          <a:effectRef idx="0">
+            <a:schemeClr val="accent1"/>
+          </a:effectRef>
+          <a:fontRef idx="minor">
+            <a:schemeClr val="lt1"/>
+          </a:fontRef>
+        </p:style>
+        <p:txBody>
+          <a:bodyPr rtlCol="0" anchor="ctr"/>
+          <a:lstStyle/>
+          <a:p>
+            <a:pPr algn="ctr"/>
+            <a:r>
+              <a:rPr lang="en-US" sz="2000" b="1" dirty="0" smtClean="0">
+                <a:solidFill>
+                  <a:schemeClr val="tx1"/>
+                </a:solidFill>
+              </a:rPr>
+              <a:t>E</a:t>
+            </a:r>
+            <a:endParaRPr lang="en-US" sz="2000" b="1" dirty="0">
+              <a:solidFill>
+                <a:schemeClr val="tx1"/>
+              </a:solidFill>
+            </a:endParaRPr>
+          </a:p>
+        </p:txBody>
+      </p:sp>
+      <p:sp>
+        <p:nvSpPr>
+          <p:cNvPr id="42" name="Rectangle 41"/>
+          <p:cNvSpPr/>
+          <p:nvPr/>
+        </p:nvSpPr>
+        <p:spPr>
+          <a:xfrm>
+            <a:off x="9296400" y="5029200"/>
+            <a:ext cx="609600" cy="1447800"/>
+          </a:xfrm>
+          <a:prstGeom prst="rect">
+            <a:avLst/>
+          </a:prstGeom>
+          <a:solidFill>
+            <a:srgbClr val="FF99FF"/>
+          </a:solidFill>
+          <a:ln>
+            <a:solidFill>
+              <a:schemeClr val="tx1"/>
+            </a:solidFill>
+          </a:ln>
+        </p:spPr>
+        <p:style>
+          <a:lnRef idx="2">
+            <a:schemeClr val="accent1">
+              <a:shade val="50000"/>
+            </a:schemeClr>
+          </a:lnRef>
+          <a:fillRef idx="1">
+            <a:schemeClr val="accent1"/>
+          </a:fillRef>
+          <a:effectRef idx="0">
+            <a:schemeClr val="accent1"/>
+          </a:effectRef>
+          <a:fontRef idx="minor">
+            <a:schemeClr val="lt1"/>
+          </a:fontRef>
+        </p:style>
+        <p:txBody>
+          <a:bodyPr rtlCol="0" anchor="ctr"/>
+          <a:lstStyle/>
+          <a:p>
+            <a:pPr algn="ctr"/>
+            <a:r>
+              <a:rPr lang="en-US" sz="2000" b="1" dirty="0" smtClean="0">
+                <a:solidFill>
+                  <a:schemeClr val="tx1"/>
+                </a:solidFill>
+              </a:rPr>
+              <a:t>F</a:t>
+            </a:r>
+            <a:endParaRPr lang="en-US" sz="2000" b="1" dirty="0">
+              <a:solidFill>
+                <a:schemeClr val="tx1"/>
+              </a:solidFill>
+            </a:endParaRPr>
+          </a:p>
+        </p:txBody>
+      </p:sp>
+      <p:sp>
+        <p:nvSpPr>
+          <p:cNvPr id="43" name="Rectangle 42"/>
+          <p:cNvSpPr/>
+          <p:nvPr/>
+        </p:nvSpPr>
+        <p:spPr>
+          <a:xfrm>
+            <a:off x="9296400" y="2819400"/>
+            <a:ext cx="609600" cy="609600"/>
+          </a:xfrm>
+          <a:prstGeom prst="rect">
+            <a:avLst/>
+          </a:prstGeom>
+          <a:solidFill>
+            <a:srgbClr val="92D050"/>
+          </a:solidFill>
+          <a:ln>
+            <a:solidFill>
+              <a:schemeClr val="tx1"/>
+            </a:solidFill>
+          </a:ln>
+        </p:spPr>
+        <p:style>
+          <a:lnRef idx="2">
+            <a:schemeClr val="accent1">
+              <a:shade val="50000"/>
+            </a:schemeClr>
+          </a:lnRef>
+          <a:fillRef idx="1">
+            <a:schemeClr val="accent1"/>
+          </a:fillRef>
+          <a:effectRef idx="0">
+            <a:schemeClr val="accent1"/>
+          </a:effectRef>
+          <a:fontRef idx="minor">
+            <a:schemeClr val="lt1"/>
+          </a:fontRef>
+        </p:style>
+        <p:txBody>
+          <a:bodyPr rtlCol="0" anchor="ctr"/>
+          <a:lstStyle/>
+          <a:p>
+            <a:pPr algn="ctr"/>
+            <a:r>
+              <a:rPr lang="en-US" sz="2000" b="1" dirty="0" smtClean="0">
+                <a:solidFill>
+                  <a:schemeClr val="tx1"/>
+                </a:solidFill>
+              </a:rPr>
+              <a:t>C</a:t>
+            </a:r>
+            <a:endParaRPr lang="en-US" sz="2000" b="1" dirty="0">
+              <a:solidFill>
+                <a:schemeClr val="tx1"/>
+              </a:solidFill>
+            </a:endParaRPr>
+          </a:p>
+        </p:txBody>
+      </p:sp>
+      <p:sp>
+        <p:nvSpPr>
+          <p:cNvPr id="51" name="Rectangle 50"/>
+          <p:cNvSpPr/>
+          <p:nvPr/>
+        </p:nvSpPr>
+        <p:spPr>
+          <a:xfrm>
+            <a:off x="9296400" y="3581400"/>
+            <a:ext cx="609600" cy="609600"/>
+          </a:xfrm>
+          <a:prstGeom prst="rect">
+            <a:avLst/>
+          </a:prstGeom>
+          <a:solidFill>
+            <a:schemeClr val="accent5">
+              <a:lumMod val="60000"/>
+              <a:lumOff val="40000"/>
+            </a:schemeClr>
+          </a:solidFill>
+          <a:ln>
+            <a:solidFill>
+              <a:schemeClr val="tx1"/>
+            </a:solidFill>
+          </a:ln>
+        </p:spPr>
+        <p:style>
+          <a:lnRef idx="2">
+            <a:schemeClr val="accent1">
+              <a:shade val="50000"/>
+            </a:schemeClr>
+          </a:lnRef>
+          <a:fillRef idx="1">
+            <a:schemeClr val="accent1"/>
+          </a:fillRef>
+          <a:effectRef idx="0">
+            <a:schemeClr val="accent1"/>
+          </a:effectRef>
+          <a:fontRef idx="minor">
+            <a:schemeClr val="lt1"/>
+          </a:fontRef>
+        </p:style>
+        <p:txBody>
+          <a:bodyPr rtlCol="0" anchor="ctr"/>
+          <a:lstStyle/>
+          <a:p>
+            <a:pPr algn="ctr"/>
+            <a:r>
+              <a:rPr lang="en-US" sz="2000" b="1" dirty="0" smtClean="0">
+                <a:solidFill>
+                  <a:schemeClr val="tx1"/>
+                </a:solidFill>
+              </a:rPr>
+              <a:t>D</a:t>
+            </a:r>
+            <a:endParaRPr lang="en-US" sz="2000" b="1" dirty="0">
+              <a:solidFill>
+                <a:schemeClr val="tx1"/>
+              </a:solidFill>
+            </a:endParaRPr>
+          </a:p>
+        </p:txBody>
+      </p:sp>
+      <p:sp>
+        <p:nvSpPr>
+          <p:cNvPr id="52" name="Rectangle 51"/>
+          <p:cNvSpPr/>
+          <p:nvPr/>
+        </p:nvSpPr>
+        <p:spPr>
+          <a:xfrm>
+            <a:off x="2379493" y="6488668"/>
+            <a:ext cx="4160883" cy="369332"/>
+          </a:xfrm>
+          <a:prstGeom prst="rect">
+            <a:avLst/>
+          </a:prstGeom>
+        </p:spPr>
+        <p:txBody>
+          <a:bodyPr wrap="none">
+            <a:spAutoFit/>
+          </a:bodyPr>
+          <a:lstStyle/>
+          <a:p>
+            <a:r>
+              <a:rPr lang="en-US" b="1" dirty="0" smtClean="0"/>
+              <a:t>social-</a:t>
+            </a:r>
+            <a:r>
+              <a:rPr lang="en-US" b="1" dirty="0" err="1" smtClean="0"/>
+              <a:t>bot</a:t>
+            </a:r>
+            <a:r>
+              <a:rPr lang="en-US" b="1" dirty="0" smtClean="0"/>
+              <a:t>-@</a:t>
+            </a:r>
+            <a:r>
+              <a:rPr lang="en-US" b="1" dirty="0" err="1" smtClean="0"/>
+              <a:t>frimoussethecat</a:t>
+            </a:r>
+            <a:r>
+              <a:rPr lang="en-US" b="1" dirty="0" smtClean="0"/>
+              <a:t>-post-</a:t>
+            </a:r>
+            <a:r>
+              <a:rPr lang="en-US" b="1" dirty="0" err="1" smtClean="0"/>
+              <a:t>pics.py</a:t>
+            </a:r>
+            <a:endParaRPr lang="en-US" b="1" dirty="0"/>
+          </a:p>
+        </p:txBody>
+      </p:sp>
     </p:spTree>
   </p:cSld>
   <p:clrMapOvr>
@@ -4723,14 +5203,14 @@
       </p:grpSpPr>
       <p:pic>
         <p:nvPicPr>
-          <p:cNvPr id="37" name="Picture 3"/>
+          <p:cNvPr id="40" name="Picture 18"/>
           <p:cNvPicPr>
             <a:picLocks noChangeAspect="1" noChangeArrowheads="1"/>
           </p:cNvPicPr>
           <p:nvPr/>
         </p:nvPicPr>
         <p:blipFill>
-          <a:blip r:embed="rId2" cstate="print"/>
+          <a:blip r:embed="rId2"/>
           <a:srcRect/>
           <a:stretch>
             <a:fillRect/>
@@ -4738,8 +5218,1045 @@
         </p:blipFill>
         <p:spPr bwMode="auto">
           <a:xfrm>
-            <a:off x="6629400" y="1306286"/>
-            <a:ext cx="304800" cy="522514"/>
+            <a:off x="3810000" y="2590800"/>
+            <a:ext cx="1283442" cy="1238250"/>
+          </a:xfrm>
+          <a:prstGeom prst="roundRect">
+            <a:avLst>
+              <a:gd name="adj" fmla="val 16667"/>
+            </a:avLst>
+          </a:prstGeom>
+          <a:ln>
+            <a:noFill/>
+          </a:ln>
+          <a:effectLst>
+            <a:outerShdw blurRad="76200" dist="38100" dir="7800000" algn="tl" rotWithShape="0">
+              <a:srgbClr val="000000">
+                <a:alpha val="40000"/>
+              </a:srgbClr>
+            </a:outerShdw>
+          </a:effectLst>
+          <a:scene3d>
+            <a:camera prst="orthographicFront"/>
+            <a:lightRig rig="contrasting" dir="t">
+              <a:rot lat="0" lon="0" rev="4200000"/>
+            </a:lightRig>
+          </a:scene3d>
+          <a:sp3d prstMaterial="plastic">
+            <a:bevelT w="381000" h="114300" prst="relaxedInset"/>
+            <a:contourClr>
+              <a:srgbClr val="969696"/>
+            </a:contourClr>
+          </a:sp3d>
+        </p:spPr>
+      </p:pic>
+      <p:pic>
+        <p:nvPicPr>
+          <p:cNvPr id="42" name="Picture 19"/>
+          <p:cNvPicPr>
+            <a:picLocks noChangeAspect="1" noChangeArrowheads="1"/>
+          </p:cNvPicPr>
+          <p:nvPr/>
+        </p:nvPicPr>
+        <p:blipFill>
+          <a:blip r:embed="rId3"/>
+          <a:srcRect/>
+          <a:stretch>
+            <a:fillRect/>
+          </a:stretch>
+        </p:blipFill>
+        <p:spPr bwMode="auto">
+          <a:xfrm>
+            <a:off x="533400" y="228600"/>
+            <a:ext cx="1228060" cy="1200150"/>
+          </a:xfrm>
+          <a:prstGeom prst="roundRect">
+            <a:avLst>
+              <a:gd name="adj" fmla="val 16667"/>
+            </a:avLst>
+          </a:prstGeom>
+          <a:ln>
+            <a:noFill/>
+          </a:ln>
+          <a:effectLst>
+            <a:outerShdw blurRad="76200" dist="38100" dir="7800000" algn="tl" rotWithShape="0">
+              <a:srgbClr val="000000">
+                <a:alpha val="40000"/>
+              </a:srgbClr>
+            </a:outerShdw>
+          </a:effectLst>
+          <a:scene3d>
+            <a:camera prst="orthographicFront"/>
+            <a:lightRig rig="contrasting" dir="t">
+              <a:rot lat="0" lon="0" rev="4200000"/>
+            </a:lightRig>
+          </a:scene3d>
+          <a:sp3d prstMaterial="plastic">
+            <a:bevelT w="381000" h="114300" prst="relaxedInset"/>
+            <a:contourClr>
+              <a:srgbClr val="969696"/>
+            </a:contourClr>
+          </a:sp3d>
+        </p:spPr>
+      </p:pic>
+      <p:pic>
+        <p:nvPicPr>
+          <p:cNvPr id="43" name="Picture 22"/>
+          <p:cNvPicPr>
+            <a:picLocks noChangeAspect="1" noChangeArrowheads="1"/>
+          </p:cNvPicPr>
+          <p:nvPr/>
+        </p:nvPicPr>
+        <p:blipFill>
+          <a:blip r:embed="rId4"/>
+          <a:srcRect/>
+          <a:stretch>
+            <a:fillRect/>
+          </a:stretch>
+        </p:blipFill>
+        <p:spPr bwMode="auto">
+          <a:xfrm>
+            <a:off x="3877620" y="228600"/>
+            <a:ext cx="1092820" cy="1219200"/>
+          </a:xfrm>
+          <a:prstGeom prst="roundRect">
+            <a:avLst>
+              <a:gd name="adj" fmla="val 16667"/>
+            </a:avLst>
+          </a:prstGeom>
+          <a:ln>
+            <a:noFill/>
+          </a:ln>
+          <a:effectLst>
+            <a:outerShdw blurRad="76200" dist="38100" dir="7800000" algn="tl" rotWithShape="0">
+              <a:srgbClr val="000000">
+                <a:alpha val="40000"/>
+              </a:srgbClr>
+            </a:outerShdw>
+          </a:effectLst>
+          <a:scene3d>
+            <a:camera prst="orthographicFront"/>
+            <a:lightRig rig="contrasting" dir="t">
+              <a:rot lat="0" lon="0" rev="4200000"/>
+            </a:lightRig>
+          </a:scene3d>
+          <a:sp3d prstMaterial="plastic">
+            <a:bevelT w="381000" h="114300" prst="relaxedInset"/>
+            <a:contourClr>
+              <a:srgbClr val="969696"/>
+            </a:contourClr>
+          </a:sp3d>
+        </p:spPr>
+      </p:pic>
+      <p:sp>
+        <p:nvSpPr>
+          <p:cNvPr id="51" name="Flèche droite 50"/>
+          <p:cNvSpPr/>
+          <p:nvPr/>
+        </p:nvSpPr>
+        <p:spPr>
+          <a:xfrm>
+            <a:off x="5029200" y="533400"/>
+            <a:ext cx="1371600" cy="533400"/>
+          </a:xfrm>
+          <a:prstGeom prst="rightArrow">
+            <a:avLst/>
+          </a:prstGeom>
+        </p:spPr>
+        <p:style>
+          <a:lnRef idx="1">
+            <a:schemeClr val="accent5"/>
+          </a:lnRef>
+          <a:fillRef idx="3">
+            <a:schemeClr val="accent5"/>
+          </a:fillRef>
+          <a:effectRef idx="2">
+            <a:schemeClr val="accent5"/>
+          </a:effectRef>
+          <a:fontRef idx="minor">
+            <a:schemeClr val="lt1"/>
+          </a:fontRef>
+        </p:style>
+        <p:txBody>
+          <a:bodyPr rtlCol="0" anchor="ctr"/>
+          <a:lstStyle/>
+          <a:p>
+            <a:pPr algn="ctr"/>
+            <a:endParaRPr lang="en-US"/>
+          </a:p>
+        </p:txBody>
+      </p:sp>
+      <p:sp>
+        <p:nvSpPr>
+          <p:cNvPr id="52" name="Flèche droite 51"/>
+          <p:cNvSpPr/>
+          <p:nvPr/>
+        </p:nvSpPr>
+        <p:spPr>
+          <a:xfrm rot="5400000">
+            <a:off x="3810000" y="1752600"/>
+            <a:ext cx="1143000" cy="533400"/>
+          </a:xfrm>
+          <a:prstGeom prst="rightArrow">
+            <a:avLst/>
+          </a:prstGeom>
+        </p:spPr>
+        <p:style>
+          <a:lnRef idx="1">
+            <a:schemeClr val="accent5"/>
+          </a:lnRef>
+          <a:fillRef idx="3">
+            <a:schemeClr val="accent5"/>
+          </a:fillRef>
+          <a:effectRef idx="2">
+            <a:schemeClr val="accent5"/>
+          </a:effectRef>
+          <a:fontRef idx="minor">
+            <a:schemeClr val="lt1"/>
+          </a:fontRef>
+        </p:style>
+        <p:txBody>
+          <a:bodyPr rtlCol="0" anchor="ctr"/>
+          <a:lstStyle/>
+          <a:p>
+            <a:pPr algn="ctr"/>
+            <a:endParaRPr lang="en-US"/>
+          </a:p>
+        </p:txBody>
+      </p:sp>
+      <p:sp>
+        <p:nvSpPr>
+          <p:cNvPr id="56" name="Flèche droite 55"/>
+          <p:cNvSpPr/>
+          <p:nvPr/>
+        </p:nvSpPr>
+        <p:spPr>
+          <a:xfrm>
+            <a:off x="1828800" y="533400"/>
+            <a:ext cx="1981200" cy="533400"/>
+          </a:xfrm>
+          <a:prstGeom prst="rightArrow">
+            <a:avLst/>
+          </a:prstGeom>
+        </p:spPr>
+        <p:style>
+          <a:lnRef idx="1">
+            <a:schemeClr val="accent5"/>
+          </a:lnRef>
+          <a:fillRef idx="3">
+            <a:schemeClr val="accent5"/>
+          </a:fillRef>
+          <a:effectRef idx="2">
+            <a:schemeClr val="accent5"/>
+          </a:effectRef>
+          <a:fontRef idx="minor">
+            <a:schemeClr val="lt1"/>
+          </a:fontRef>
+        </p:style>
+        <p:txBody>
+          <a:bodyPr rtlCol="0" anchor="ctr"/>
+          <a:lstStyle/>
+          <a:p>
+            <a:pPr algn="ctr"/>
+            <a:endParaRPr lang="en-US"/>
+          </a:p>
+        </p:txBody>
+      </p:sp>
+      <p:pic>
+        <p:nvPicPr>
+          <p:cNvPr id="57" name="Picture 7"/>
+          <p:cNvPicPr>
+            <a:picLocks noChangeAspect="1" noChangeArrowheads="1"/>
+          </p:cNvPicPr>
+          <p:nvPr/>
+        </p:nvPicPr>
+        <p:blipFill>
+          <a:blip r:embed="rId5" cstate="print"/>
+          <a:srcRect/>
+          <a:stretch>
+            <a:fillRect/>
+          </a:stretch>
+        </p:blipFill>
+        <p:spPr bwMode="auto">
+          <a:xfrm>
+            <a:off x="8021665" y="1295400"/>
+            <a:ext cx="588935" cy="548640"/>
+          </a:xfrm>
+          <a:prstGeom prst="roundRect">
+            <a:avLst>
+              <a:gd name="adj" fmla="val 16667"/>
+            </a:avLst>
+          </a:prstGeom>
+          <a:ln>
+            <a:noFill/>
+          </a:ln>
+          <a:effectLst>
+            <a:outerShdw blurRad="76200" dist="38100" dir="7800000" algn="tl" rotWithShape="0">
+              <a:srgbClr val="000000">
+                <a:alpha val="40000"/>
+              </a:srgbClr>
+            </a:outerShdw>
+          </a:effectLst>
+          <a:scene3d>
+            <a:camera prst="orthographicFront"/>
+            <a:lightRig rig="contrasting" dir="t">
+              <a:rot lat="0" lon="0" rev="4200000"/>
+            </a:lightRig>
+          </a:scene3d>
+          <a:sp3d prstMaterial="plastic">
+            <a:bevelT w="381000" h="114300" prst="relaxedInset"/>
+            <a:contourClr>
+              <a:srgbClr val="969696"/>
+            </a:contourClr>
+          </a:sp3d>
+        </p:spPr>
+      </p:pic>
+      <p:sp>
+        <p:nvSpPr>
+          <p:cNvPr id="63" name="Flèche droite 62"/>
+          <p:cNvSpPr/>
+          <p:nvPr/>
+        </p:nvSpPr>
+        <p:spPr>
+          <a:xfrm>
+            <a:off x="7239000" y="533400"/>
+            <a:ext cx="609600" cy="533400"/>
+          </a:xfrm>
+          <a:prstGeom prst="rightArrow">
+            <a:avLst/>
+          </a:prstGeom>
+        </p:spPr>
+        <p:style>
+          <a:lnRef idx="1">
+            <a:schemeClr val="accent5"/>
+          </a:lnRef>
+          <a:fillRef idx="3">
+            <a:schemeClr val="accent5"/>
+          </a:fillRef>
+          <a:effectRef idx="2">
+            <a:schemeClr val="accent5"/>
+          </a:effectRef>
+          <a:fontRef idx="minor">
+            <a:schemeClr val="lt1"/>
+          </a:fontRef>
+        </p:style>
+        <p:txBody>
+          <a:bodyPr rtlCol="0" anchor="ctr"/>
+          <a:lstStyle/>
+          <a:p>
+            <a:pPr algn="ctr"/>
+            <a:endParaRPr lang="en-US"/>
+          </a:p>
+        </p:txBody>
+      </p:sp>
+      <p:sp>
+        <p:nvSpPr>
+          <p:cNvPr id="64" name="Flèche droite 63"/>
+          <p:cNvSpPr/>
+          <p:nvPr/>
+        </p:nvSpPr>
+        <p:spPr>
+          <a:xfrm>
+            <a:off x="7239000" y="1295400"/>
+            <a:ext cx="609600" cy="533400"/>
+          </a:xfrm>
+          <a:prstGeom prst="rightArrow">
+            <a:avLst/>
+          </a:prstGeom>
+        </p:spPr>
+        <p:style>
+          <a:lnRef idx="1">
+            <a:schemeClr val="accent5"/>
+          </a:lnRef>
+          <a:fillRef idx="3">
+            <a:schemeClr val="accent5"/>
+          </a:fillRef>
+          <a:effectRef idx="2">
+            <a:schemeClr val="accent5"/>
+          </a:effectRef>
+          <a:fontRef idx="minor">
+            <a:schemeClr val="lt1"/>
+          </a:fontRef>
+        </p:style>
+        <p:txBody>
+          <a:bodyPr rtlCol="0" anchor="ctr"/>
+          <a:lstStyle/>
+          <a:p>
+            <a:pPr algn="ctr"/>
+            <a:endParaRPr lang="en-US"/>
+          </a:p>
+        </p:txBody>
+      </p:sp>
+      <p:sp>
+        <p:nvSpPr>
+          <p:cNvPr id="65" name="Flèche droite 64"/>
+          <p:cNvSpPr/>
+          <p:nvPr/>
+        </p:nvSpPr>
+        <p:spPr>
+          <a:xfrm>
+            <a:off x="7239000" y="2057400"/>
+            <a:ext cx="609600" cy="533400"/>
+          </a:xfrm>
+          <a:prstGeom prst="rightArrow">
+            <a:avLst/>
+          </a:prstGeom>
+        </p:spPr>
+        <p:style>
+          <a:lnRef idx="1">
+            <a:schemeClr val="accent5"/>
+          </a:lnRef>
+          <a:fillRef idx="3">
+            <a:schemeClr val="accent5"/>
+          </a:fillRef>
+          <a:effectRef idx="2">
+            <a:schemeClr val="accent5"/>
+          </a:effectRef>
+          <a:fontRef idx="minor">
+            <a:schemeClr val="lt1"/>
+          </a:fontRef>
+        </p:style>
+        <p:txBody>
+          <a:bodyPr rtlCol="0" anchor="ctr"/>
+          <a:lstStyle/>
+          <a:p>
+            <a:pPr algn="ctr"/>
+            <a:endParaRPr lang="en-US"/>
+          </a:p>
+        </p:txBody>
+      </p:sp>
+      <p:sp>
+        <p:nvSpPr>
+          <p:cNvPr id="44" name="Rogner un rectangle à un seul coin 43"/>
+          <p:cNvSpPr/>
+          <p:nvPr/>
+        </p:nvSpPr>
+        <p:spPr>
+          <a:xfrm>
+            <a:off x="1371600" y="1219200"/>
+            <a:ext cx="1447800" cy="838200"/>
+          </a:xfrm>
+          <a:prstGeom prst="snip1Rect">
+            <a:avLst/>
+          </a:prstGeom>
+        </p:spPr>
+        <p:style>
+          <a:lnRef idx="1">
+            <a:schemeClr val="dk1"/>
+          </a:lnRef>
+          <a:fillRef idx="3">
+            <a:schemeClr val="dk1"/>
+          </a:fillRef>
+          <a:effectRef idx="2">
+            <a:schemeClr val="dk1"/>
+          </a:effectRef>
+          <a:fontRef idx="minor">
+            <a:schemeClr val="lt1"/>
+          </a:fontRef>
+        </p:style>
+        <p:txBody>
+          <a:bodyPr rtlCol="0" anchor="ctr"/>
+          <a:lstStyle/>
+          <a:p>
+            <a:r>
+              <a:rPr lang="en-US" sz="1200" b="1" dirty="0" smtClean="0">
+                <a:solidFill>
+                  <a:srgbClr val="00B050"/>
+                </a:solidFill>
+                <a:latin typeface="Consolas" pitchFamily="49" charset="0"/>
+              </a:rPr>
+              <a:t>#vid-script.py</a:t>
+            </a:r>
+            <a:br>
+              <a:rPr lang="en-US" sz="1200" b="1" dirty="0" smtClean="0">
+                <a:solidFill>
+                  <a:srgbClr val="00B050"/>
+                </a:solidFill>
+                <a:latin typeface="Consolas" pitchFamily="49" charset="0"/>
+              </a:rPr>
+            </a:br>
+            <a:r>
+              <a:rPr lang="en-US" sz="1200" b="1" dirty="0" smtClean="0">
+                <a:solidFill>
+                  <a:srgbClr val="00B050"/>
+                </a:solidFill>
+                <a:latin typeface="Consolas" pitchFamily="49" charset="0"/>
+              </a:rPr>
+              <a:t>TXT=‘blabla…’</a:t>
+            </a:r>
+          </a:p>
+          <a:p>
+            <a:r>
+              <a:rPr lang="en-US" sz="1200" b="1" dirty="0" smtClean="0">
+                <a:solidFill>
+                  <a:srgbClr val="00B050"/>
+                </a:solidFill>
+                <a:latin typeface="Consolas" pitchFamily="49" charset="0"/>
+              </a:rPr>
+              <a:t>IMG=‘bla.mp4’</a:t>
+            </a:r>
+            <a:br>
+              <a:rPr lang="en-US" sz="1200" b="1" dirty="0" smtClean="0">
+                <a:solidFill>
+                  <a:srgbClr val="00B050"/>
+                </a:solidFill>
+                <a:latin typeface="Consolas" pitchFamily="49" charset="0"/>
+              </a:rPr>
+            </a:br>
+            <a:r>
+              <a:rPr lang="en-US" sz="1200" b="1" dirty="0" smtClean="0">
+                <a:solidFill>
+                  <a:srgbClr val="00B050"/>
+                </a:solidFill>
+                <a:latin typeface="Consolas" pitchFamily="49" charset="0"/>
+              </a:rPr>
+              <a:t>…</a:t>
+            </a:r>
+            <a:endParaRPr lang="en-US" sz="1200" b="1" dirty="0">
+              <a:solidFill>
+                <a:srgbClr val="00B050"/>
+              </a:solidFill>
+              <a:latin typeface="Consolas" pitchFamily="49" charset="0"/>
+            </a:endParaRPr>
+          </a:p>
+        </p:txBody>
+      </p:sp>
+      <p:pic>
+        <p:nvPicPr>
+          <p:cNvPr id="70" name="Picture 8"/>
+          <p:cNvPicPr>
+            <a:picLocks noChangeAspect="1" noChangeArrowheads="1"/>
+          </p:cNvPicPr>
+          <p:nvPr/>
+        </p:nvPicPr>
+        <p:blipFill>
+          <a:blip r:embed="rId6"/>
+          <a:srcRect/>
+          <a:stretch>
+            <a:fillRect/>
+          </a:stretch>
+        </p:blipFill>
+        <p:spPr bwMode="auto">
+          <a:xfrm>
+            <a:off x="8030791" y="2042160"/>
+            <a:ext cx="567030" cy="548640"/>
+          </a:xfrm>
+          <a:prstGeom prst="roundRect">
+            <a:avLst>
+              <a:gd name="adj" fmla="val 16667"/>
+            </a:avLst>
+          </a:prstGeom>
+          <a:ln>
+            <a:noFill/>
+          </a:ln>
+          <a:effectLst>
+            <a:outerShdw blurRad="76200" dist="38100" dir="7800000" algn="tl" rotWithShape="0">
+              <a:srgbClr val="000000">
+                <a:alpha val="40000"/>
+              </a:srgbClr>
+            </a:outerShdw>
+          </a:effectLst>
+          <a:scene3d>
+            <a:camera prst="orthographicFront"/>
+            <a:lightRig rig="contrasting" dir="t">
+              <a:rot lat="0" lon="0" rev="4200000"/>
+            </a:lightRig>
+          </a:scene3d>
+          <a:sp3d prstMaterial="plastic">
+            <a:bevelT w="381000" h="114300" prst="relaxedInset"/>
+            <a:contourClr>
+              <a:srgbClr val="969696"/>
+            </a:contourClr>
+          </a:sp3d>
+        </p:spPr>
+      </p:pic>
+      <p:sp>
+        <p:nvSpPr>
+          <p:cNvPr id="71" name="Flèche droite 70"/>
+          <p:cNvSpPr/>
+          <p:nvPr/>
+        </p:nvSpPr>
+        <p:spPr>
+          <a:xfrm>
+            <a:off x="7239000" y="2804160"/>
+            <a:ext cx="609600" cy="533400"/>
+          </a:xfrm>
+          <a:prstGeom prst="rightArrow">
+            <a:avLst/>
+          </a:prstGeom>
+          <a:solidFill>
+            <a:srgbClr val="FFC000"/>
+          </a:solidFill>
+        </p:spPr>
+        <p:style>
+          <a:lnRef idx="1">
+            <a:schemeClr val="accent5"/>
+          </a:lnRef>
+          <a:fillRef idx="3">
+            <a:schemeClr val="accent5"/>
+          </a:fillRef>
+          <a:effectRef idx="2">
+            <a:schemeClr val="accent5"/>
+          </a:effectRef>
+          <a:fontRef idx="minor">
+            <a:schemeClr val="lt1"/>
+          </a:fontRef>
+        </p:style>
+        <p:txBody>
+          <a:bodyPr rtlCol="0" anchor="ctr"/>
+          <a:lstStyle/>
+          <a:p>
+            <a:pPr algn="ctr"/>
+            <a:endParaRPr lang="en-US"/>
+          </a:p>
+        </p:txBody>
+      </p:sp>
+      <p:pic>
+        <p:nvPicPr>
+          <p:cNvPr id="2055" name="Picture 7"/>
+          <p:cNvPicPr>
+            <a:picLocks noChangeAspect="1" noChangeArrowheads="1"/>
+          </p:cNvPicPr>
+          <p:nvPr/>
+        </p:nvPicPr>
+        <p:blipFill>
+          <a:blip r:embed="rId7" cstate="print"/>
+          <a:srcRect/>
+          <a:stretch>
+            <a:fillRect/>
+          </a:stretch>
+        </p:blipFill>
+        <p:spPr bwMode="auto">
+          <a:xfrm>
+            <a:off x="8001001" y="518160"/>
+            <a:ext cx="609599" cy="548640"/>
+          </a:xfrm>
+          <a:prstGeom prst="roundRect">
+            <a:avLst>
+              <a:gd name="adj" fmla="val 16667"/>
+            </a:avLst>
+          </a:prstGeom>
+          <a:ln>
+            <a:noFill/>
+          </a:ln>
+          <a:effectLst>
+            <a:outerShdw blurRad="76200" dist="38100" dir="7800000" algn="tl" rotWithShape="0">
+              <a:srgbClr val="000000">
+                <a:alpha val="40000"/>
+              </a:srgbClr>
+            </a:outerShdw>
+          </a:effectLst>
+          <a:scene3d>
+            <a:camera prst="orthographicFront"/>
+            <a:lightRig rig="contrasting" dir="t">
+              <a:rot lat="0" lon="0" rev="4200000"/>
+            </a:lightRig>
+          </a:scene3d>
+          <a:sp3d prstMaterial="plastic">
+            <a:bevelT w="381000" h="114300" prst="relaxedInset"/>
+            <a:contourClr>
+              <a:srgbClr val="969696"/>
+            </a:contourClr>
+          </a:sp3d>
+        </p:spPr>
+      </p:pic>
+      <p:pic>
+        <p:nvPicPr>
+          <p:cNvPr id="26" name="Picture 2"/>
+          <p:cNvPicPr>
+            <a:picLocks noChangeAspect="1" noChangeArrowheads="1"/>
+          </p:cNvPicPr>
+          <p:nvPr/>
+        </p:nvPicPr>
+        <p:blipFill>
+          <a:blip r:embed="rId8">
+            <a:grayscl/>
+          </a:blip>
+          <a:srcRect/>
+          <a:stretch>
+            <a:fillRect/>
+          </a:stretch>
+        </p:blipFill>
+        <p:spPr bwMode="auto">
+          <a:xfrm>
+            <a:off x="457200" y="4628771"/>
+            <a:ext cx="1981200" cy="1772029"/>
+          </a:xfrm>
+          <a:prstGeom prst="roundRect">
+            <a:avLst>
+              <a:gd name="adj" fmla="val 4167"/>
+            </a:avLst>
+          </a:prstGeom>
+          <a:solidFill>
+            <a:srgbClr val="FFFFFF"/>
+          </a:solidFill>
+          <a:ln w="127000" cap="sq">
+            <a:solidFill>
+              <a:srgbClr val="292929"/>
+            </a:solidFill>
+            <a:miter lim="800000"/>
+          </a:ln>
+          <a:effectLst>
+            <a:reflection blurRad="12700" stA="28000" endPos="28000" dist="5000" dir="5400000" sy="-100000" algn="bl" rotWithShape="0"/>
+          </a:effectLst>
+          <a:scene3d>
+            <a:camera prst="orthographicFront"/>
+            <a:lightRig rig="threePt" dir="t">
+              <a:rot lat="0" lon="0" rev="2700000"/>
+            </a:lightRig>
+          </a:scene3d>
+          <a:sp3d>
+            <a:bevelT h="38100"/>
+            <a:contourClr>
+              <a:srgbClr val="C0C0C0"/>
+            </a:contourClr>
+          </a:sp3d>
+        </p:spPr>
+      </p:pic>
+      <p:pic>
+        <p:nvPicPr>
+          <p:cNvPr id="27" name="Picture 2"/>
+          <p:cNvPicPr>
+            <a:picLocks noChangeAspect="1" noChangeArrowheads="1"/>
+          </p:cNvPicPr>
+          <p:nvPr/>
+        </p:nvPicPr>
+        <p:blipFill>
+          <a:blip r:embed="rId9" cstate="print">
+            <a:grayscl/>
+          </a:blip>
+          <a:stretch>
+            <a:fillRect/>
+          </a:stretch>
+        </p:blipFill>
+        <p:spPr bwMode="auto">
+          <a:xfrm>
+            <a:off x="3886200" y="3271531"/>
+            <a:ext cx="457200" cy="462269"/>
+          </a:xfrm>
+          <a:prstGeom prst="rect">
+            <a:avLst/>
+          </a:prstGeom>
+          <a:noFill/>
+          <a:ln>
+            <a:noFill/>
+          </a:ln>
+        </p:spPr>
+      </p:pic>
+      <p:sp>
+        <p:nvSpPr>
+          <p:cNvPr id="25" name="Rectangle 24"/>
+          <p:cNvSpPr/>
+          <p:nvPr/>
+        </p:nvSpPr>
+        <p:spPr>
+          <a:xfrm>
+            <a:off x="9296400" y="533400"/>
+            <a:ext cx="609600" cy="609600"/>
+          </a:xfrm>
+          <a:prstGeom prst="rect">
+            <a:avLst/>
+          </a:prstGeom>
+          <a:solidFill>
+            <a:schemeClr val="accent2">
+              <a:lumMod val="60000"/>
+              <a:lumOff val="40000"/>
+            </a:schemeClr>
+          </a:solidFill>
+          <a:ln>
+            <a:solidFill>
+              <a:schemeClr val="tx1"/>
+            </a:solidFill>
+          </a:ln>
+        </p:spPr>
+        <p:style>
+          <a:lnRef idx="2">
+            <a:schemeClr val="accent1">
+              <a:shade val="50000"/>
+            </a:schemeClr>
+          </a:lnRef>
+          <a:fillRef idx="1">
+            <a:schemeClr val="accent1"/>
+          </a:fillRef>
+          <a:effectRef idx="0">
+            <a:schemeClr val="accent1"/>
+          </a:effectRef>
+          <a:fontRef idx="minor">
+            <a:schemeClr val="lt1"/>
+          </a:fontRef>
+        </p:style>
+        <p:txBody>
+          <a:bodyPr rtlCol="0" anchor="ctr"/>
+          <a:lstStyle/>
+          <a:p>
+            <a:pPr algn="ctr"/>
+            <a:r>
+              <a:rPr lang="en-US" sz="2000" b="1" dirty="0" smtClean="0">
+                <a:solidFill>
+                  <a:schemeClr val="tx1"/>
+                </a:solidFill>
+              </a:rPr>
+              <a:t>S</a:t>
+            </a:r>
+            <a:endParaRPr lang="en-US" sz="2000" b="1" dirty="0">
+              <a:solidFill>
+                <a:schemeClr val="tx1"/>
+              </a:solidFill>
+            </a:endParaRPr>
+          </a:p>
+        </p:txBody>
+      </p:sp>
+      <p:sp>
+        <p:nvSpPr>
+          <p:cNvPr id="28" name="Rectangle 27"/>
+          <p:cNvSpPr/>
+          <p:nvPr/>
+        </p:nvSpPr>
+        <p:spPr>
+          <a:xfrm>
+            <a:off x="9296400" y="1295400"/>
+            <a:ext cx="609600" cy="609600"/>
+          </a:xfrm>
+          <a:prstGeom prst="rect">
+            <a:avLst/>
+          </a:prstGeom>
+          <a:solidFill>
+            <a:schemeClr val="accent6">
+              <a:lumMod val="60000"/>
+              <a:lumOff val="40000"/>
+            </a:schemeClr>
+          </a:solidFill>
+          <a:ln>
+            <a:solidFill>
+              <a:schemeClr val="tx1"/>
+            </a:solidFill>
+          </a:ln>
+        </p:spPr>
+        <p:style>
+          <a:lnRef idx="2">
+            <a:schemeClr val="accent1">
+              <a:shade val="50000"/>
+            </a:schemeClr>
+          </a:lnRef>
+          <a:fillRef idx="1">
+            <a:schemeClr val="accent1"/>
+          </a:fillRef>
+          <a:effectRef idx="0">
+            <a:schemeClr val="accent1"/>
+          </a:effectRef>
+          <a:fontRef idx="minor">
+            <a:schemeClr val="lt1"/>
+          </a:fontRef>
+        </p:style>
+        <p:txBody>
+          <a:bodyPr rtlCol="0" anchor="ctr"/>
+          <a:lstStyle/>
+          <a:p>
+            <a:pPr algn="ctr"/>
+            <a:r>
+              <a:rPr lang="en-US" sz="2000" b="1" dirty="0" smtClean="0">
+                <a:solidFill>
+                  <a:schemeClr val="tx1"/>
+                </a:solidFill>
+              </a:rPr>
+              <a:t>A</a:t>
+            </a:r>
+            <a:endParaRPr lang="en-US" sz="2000" b="1" dirty="0">
+              <a:solidFill>
+                <a:schemeClr val="tx1"/>
+              </a:solidFill>
+            </a:endParaRPr>
+          </a:p>
+        </p:txBody>
+      </p:sp>
+      <p:sp>
+        <p:nvSpPr>
+          <p:cNvPr id="29" name="Rectangle 28"/>
+          <p:cNvSpPr/>
+          <p:nvPr/>
+        </p:nvSpPr>
+        <p:spPr>
+          <a:xfrm>
+            <a:off x="9296400" y="2057400"/>
+            <a:ext cx="609600" cy="609600"/>
+          </a:xfrm>
+          <a:prstGeom prst="rect">
+            <a:avLst/>
+          </a:prstGeom>
+          <a:solidFill>
+            <a:srgbClr val="FFFF99"/>
+          </a:solidFill>
+          <a:ln>
+            <a:solidFill>
+              <a:schemeClr val="tx1"/>
+            </a:solidFill>
+          </a:ln>
+        </p:spPr>
+        <p:style>
+          <a:lnRef idx="2">
+            <a:schemeClr val="accent1">
+              <a:shade val="50000"/>
+            </a:schemeClr>
+          </a:lnRef>
+          <a:fillRef idx="1">
+            <a:schemeClr val="accent1"/>
+          </a:fillRef>
+          <a:effectRef idx="0">
+            <a:schemeClr val="accent1"/>
+          </a:effectRef>
+          <a:fontRef idx="minor">
+            <a:schemeClr val="lt1"/>
+          </a:fontRef>
+        </p:style>
+        <p:txBody>
+          <a:bodyPr rtlCol="0" anchor="ctr"/>
+          <a:lstStyle/>
+          <a:p>
+            <a:pPr algn="ctr"/>
+            <a:r>
+              <a:rPr lang="en-US" sz="2000" b="1" dirty="0" smtClean="0">
+                <a:solidFill>
+                  <a:schemeClr val="tx1"/>
+                </a:solidFill>
+              </a:rPr>
+              <a:t>B</a:t>
+            </a:r>
+            <a:endParaRPr lang="en-US" sz="2000" b="1" dirty="0">
+              <a:solidFill>
+                <a:schemeClr val="tx1"/>
+              </a:solidFill>
+            </a:endParaRPr>
+          </a:p>
+        </p:txBody>
+      </p:sp>
+      <p:pic>
+        <p:nvPicPr>
+          <p:cNvPr id="1026" name="Picture 2"/>
+          <p:cNvPicPr>
+            <a:picLocks noChangeAspect="1" noChangeArrowheads="1"/>
+          </p:cNvPicPr>
+          <p:nvPr/>
+        </p:nvPicPr>
+        <p:blipFill>
+          <a:blip r:embed="rId10" cstate="print"/>
+          <a:srcRect/>
+          <a:stretch>
+            <a:fillRect/>
+          </a:stretch>
+        </p:blipFill>
+        <p:spPr bwMode="auto">
+          <a:xfrm>
+            <a:off x="8001000" y="2819400"/>
+            <a:ext cx="609600" cy="548640"/>
+          </a:xfrm>
+          <a:prstGeom prst="roundRect">
+            <a:avLst>
+              <a:gd name="adj" fmla="val 16667"/>
+            </a:avLst>
+          </a:prstGeom>
+          <a:ln>
+            <a:noFill/>
+          </a:ln>
+          <a:effectLst>
+            <a:outerShdw blurRad="76200" dist="38100" dir="7800000" algn="tl" rotWithShape="0">
+              <a:srgbClr val="000000">
+                <a:alpha val="40000"/>
+              </a:srgbClr>
+            </a:outerShdw>
+          </a:effectLst>
+          <a:scene3d>
+            <a:camera prst="orthographicFront"/>
+            <a:lightRig rig="contrasting" dir="t">
+              <a:rot lat="0" lon="0" rev="4200000"/>
+            </a:lightRig>
+          </a:scene3d>
+          <a:sp3d prstMaterial="plastic">
+            <a:bevelT w="381000" h="114300" prst="relaxedInset"/>
+            <a:contourClr>
+              <a:srgbClr val="969696"/>
+            </a:contourClr>
+          </a:sp3d>
+        </p:spPr>
+      </p:pic>
+      <p:sp>
+        <p:nvSpPr>
+          <p:cNvPr id="39" name="Rectangle 38"/>
+          <p:cNvSpPr/>
+          <p:nvPr/>
+        </p:nvSpPr>
+        <p:spPr>
+          <a:xfrm>
+            <a:off x="9296400" y="2819400"/>
+            <a:ext cx="609600" cy="609600"/>
+          </a:xfrm>
+          <a:prstGeom prst="rect">
+            <a:avLst/>
+          </a:prstGeom>
+          <a:solidFill>
+            <a:srgbClr val="FF99FF"/>
+          </a:solidFill>
+          <a:ln>
+            <a:solidFill>
+              <a:schemeClr val="tx1"/>
+            </a:solidFill>
+          </a:ln>
+        </p:spPr>
+        <p:style>
+          <a:lnRef idx="2">
+            <a:schemeClr val="accent1">
+              <a:shade val="50000"/>
+            </a:schemeClr>
+          </a:lnRef>
+          <a:fillRef idx="1">
+            <a:schemeClr val="accent1"/>
+          </a:fillRef>
+          <a:effectRef idx="0">
+            <a:schemeClr val="accent1"/>
+          </a:effectRef>
+          <a:fontRef idx="minor">
+            <a:schemeClr val="lt1"/>
+          </a:fontRef>
+        </p:style>
+        <p:txBody>
+          <a:bodyPr rtlCol="0" anchor="ctr"/>
+          <a:lstStyle/>
+          <a:p>
+            <a:pPr algn="ctr"/>
+            <a:r>
+              <a:rPr lang="en-US" sz="2000" b="1" dirty="0" smtClean="0">
+                <a:solidFill>
+                  <a:schemeClr val="tx1"/>
+                </a:solidFill>
+              </a:rPr>
+              <a:t>F</a:t>
+            </a:r>
+            <a:endParaRPr lang="en-US" sz="2000" b="1" dirty="0">
+              <a:solidFill>
+                <a:schemeClr val="tx1"/>
+              </a:solidFill>
+            </a:endParaRPr>
+          </a:p>
+        </p:txBody>
+      </p:sp>
+      <p:pic>
+        <p:nvPicPr>
+          <p:cNvPr id="2" name="Picture 2"/>
+          <p:cNvPicPr>
+            <a:picLocks noChangeAspect="1" noChangeArrowheads="1"/>
+          </p:cNvPicPr>
+          <p:nvPr/>
+        </p:nvPicPr>
+        <p:blipFill>
+          <a:blip r:embed="rId11" cstate="print"/>
+          <a:srcRect/>
+          <a:stretch>
+            <a:fillRect/>
+          </a:stretch>
+        </p:blipFill>
+        <p:spPr bwMode="auto">
+          <a:xfrm>
+            <a:off x="4648200" y="3429000"/>
+            <a:ext cx="1219200" cy="860982"/>
           </a:xfrm>
           <a:prstGeom prst="roundRect">
             <a:avLst>
@@ -4774,14 +6291,14 @@
       </p:pic>
       <p:pic>
         <p:nvPicPr>
-          <p:cNvPr id="38" name="Picture 3"/>
+          <p:cNvPr id="34" name="Picture 2"/>
           <p:cNvPicPr>
             <a:picLocks noChangeAspect="1" noChangeArrowheads="1"/>
           </p:cNvPicPr>
           <p:nvPr/>
         </p:nvPicPr>
         <p:blipFill>
-          <a:blip r:embed="rId2" cstate="print"/>
+          <a:blip r:embed="rId12" cstate="print"/>
           <a:srcRect/>
           <a:stretch>
             <a:fillRect/>
@@ -4789,8 +6306,8 @@
         </p:blipFill>
         <p:spPr bwMode="auto">
           <a:xfrm>
-            <a:off x="6629400" y="544286"/>
-            <a:ext cx="304800" cy="522514"/>
+            <a:off x="6537960" y="1376785"/>
+            <a:ext cx="548640" cy="387441"/>
           </a:xfrm>
           <a:prstGeom prst="roundRect">
             <a:avLst>
@@ -4825,14 +6342,14 @@
       </p:pic>
       <p:pic>
         <p:nvPicPr>
-          <p:cNvPr id="40" name="Picture 18"/>
+          <p:cNvPr id="45" name="Picture 2"/>
           <p:cNvPicPr>
             <a:picLocks noChangeAspect="1" noChangeArrowheads="1"/>
           </p:cNvPicPr>
           <p:nvPr/>
         </p:nvPicPr>
         <p:blipFill>
-          <a:blip r:embed="rId3"/>
+          <a:blip r:embed="rId12" cstate="print"/>
           <a:srcRect/>
           <a:stretch>
             <a:fillRect/>
@@ -4840,432 +6357,8 @@
         </p:blipFill>
         <p:spPr bwMode="auto">
           <a:xfrm>
-            <a:off x="3810000" y="2590800"/>
-            <a:ext cx="1283442" cy="1238250"/>
-          </a:xfrm>
-          <a:prstGeom prst="roundRect">
-            <a:avLst>
-              <a:gd name="adj" fmla="val 16667"/>
-            </a:avLst>
-          </a:prstGeom>
-          <a:ln>
-            <a:noFill/>
-          </a:ln>
-          <a:effectLst>
-            <a:outerShdw blurRad="76200" dist="38100" dir="7800000" algn="tl" rotWithShape="0">
-              <a:srgbClr val="000000">
-                <a:alpha val="40000"/>
-              </a:srgbClr>
-            </a:outerShdw>
-          </a:effectLst>
-          <a:scene3d>
-            <a:camera prst="orthographicFront"/>
-            <a:lightRig rig="contrasting" dir="t">
-              <a:rot lat="0" lon="0" rev="4200000"/>
-            </a:lightRig>
-          </a:scene3d>
-          <a:sp3d prstMaterial="plastic">
-            <a:bevelT w="381000" h="114300" prst="relaxedInset"/>
-            <a:contourClr>
-              <a:srgbClr val="969696"/>
-            </a:contourClr>
-          </a:sp3d>
-        </p:spPr>
-      </p:pic>
-      <p:pic>
-        <p:nvPicPr>
-          <p:cNvPr id="42" name="Picture 19"/>
-          <p:cNvPicPr>
-            <a:picLocks noChangeAspect="1" noChangeArrowheads="1"/>
-          </p:cNvPicPr>
-          <p:nvPr/>
-        </p:nvPicPr>
-        <p:blipFill>
-          <a:blip r:embed="rId4"/>
-          <a:srcRect/>
-          <a:stretch>
-            <a:fillRect/>
-          </a:stretch>
-        </p:blipFill>
-        <p:spPr bwMode="auto">
-          <a:xfrm>
-            <a:off x="533400" y="228600"/>
-            <a:ext cx="1228060" cy="1200150"/>
-          </a:xfrm>
-          <a:prstGeom prst="roundRect">
-            <a:avLst>
-              <a:gd name="adj" fmla="val 16667"/>
-            </a:avLst>
-          </a:prstGeom>
-          <a:ln>
-            <a:noFill/>
-          </a:ln>
-          <a:effectLst>
-            <a:outerShdw blurRad="76200" dist="38100" dir="7800000" algn="tl" rotWithShape="0">
-              <a:srgbClr val="000000">
-                <a:alpha val="40000"/>
-              </a:srgbClr>
-            </a:outerShdw>
-          </a:effectLst>
-          <a:scene3d>
-            <a:camera prst="orthographicFront"/>
-            <a:lightRig rig="contrasting" dir="t">
-              <a:rot lat="0" lon="0" rev="4200000"/>
-            </a:lightRig>
-          </a:scene3d>
-          <a:sp3d prstMaterial="plastic">
-            <a:bevelT w="381000" h="114300" prst="relaxedInset"/>
-            <a:contourClr>
-              <a:srgbClr val="969696"/>
-            </a:contourClr>
-          </a:sp3d>
-        </p:spPr>
-      </p:pic>
-      <p:pic>
-        <p:nvPicPr>
-          <p:cNvPr id="43" name="Picture 22"/>
-          <p:cNvPicPr>
-            <a:picLocks noChangeAspect="1" noChangeArrowheads="1"/>
-          </p:cNvPicPr>
-          <p:nvPr/>
-        </p:nvPicPr>
-        <p:blipFill>
-          <a:blip r:embed="rId5"/>
-          <a:srcRect/>
-          <a:stretch>
-            <a:fillRect/>
-          </a:stretch>
-        </p:blipFill>
-        <p:spPr bwMode="auto">
-          <a:xfrm>
-            <a:off x="3877620" y="228600"/>
-            <a:ext cx="1092820" cy="1219200"/>
-          </a:xfrm>
-          <a:prstGeom prst="roundRect">
-            <a:avLst>
-              <a:gd name="adj" fmla="val 16667"/>
-            </a:avLst>
-          </a:prstGeom>
-          <a:ln>
-            <a:noFill/>
-          </a:ln>
-          <a:effectLst>
-            <a:outerShdw blurRad="76200" dist="38100" dir="7800000" algn="tl" rotWithShape="0">
-              <a:srgbClr val="000000">
-                <a:alpha val="40000"/>
-              </a:srgbClr>
-            </a:outerShdw>
-          </a:effectLst>
-          <a:scene3d>
-            <a:camera prst="orthographicFront"/>
-            <a:lightRig rig="contrasting" dir="t">
-              <a:rot lat="0" lon="0" rev="4200000"/>
-            </a:lightRig>
-          </a:scene3d>
-          <a:sp3d prstMaterial="plastic">
-            <a:bevelT w="381000" h="114300" prst="relaxedInset"/>
-            <a:contourClr>
-              <a:srgbClr val="969696"/>
-            </a:contourClr>
-          </a:sp3d>
-        </p:spPr>
-      </p:pic>
-      <p:sp>
-        <p:nvSpPr>
-          <p:cNvPr id="51" name="Flèche droite 50"/>
-          <p:cNvSpPr/>
-          <p:nvPr/>
-        </p:nvSpPr>
-        <p:spPr>
-          <a:xfrm>
-            <a:off x="5029200" y="533400"/>
-            <a:ext cx="1371600" cy="533400"/>
-          </a:xfrm>
-          <a:prstGeom prst="rightArrow">
-            <a:avLst/>
-          </a:prstGeom>
-        </p:spPr>
-        <p:style>
-          <a:lnRef idx="1">
-            <a:schemeClr val="accent5"/>
-          </a:lnRef>
-          <a:fillRef idx="3">
-            <a:schemeClr val="accent5"/>
-          </a:fillRef>
-          <a:effectRef idx="2">
-            <a:schemeClr val="accent5"/>
-          </a:effectRef>
-          <a:fontRef idx="minor">
-            <a:schemeClr val="lt1"/>
-          </a:fontRef>
-        </p:style>
-        <p:txBody>
-          <a:bodyPr rtlCol="0" anchor="ctr"/>
-          <a:lstStyle/>
-          <a:p>
-            <a:pPr algn="ctr"/>
-            <a:endParaRPr lang="en-US"/>
-          </a:p>
-        </p:txBody>
-      </p:sp>
-      <p:sp>
-        <p:nvSpPr>
-          <p:cNvPr id="52" name="Flèche droite 51"/>
-          <p:cNvSpPr/>
-          <p:nvPr/>
-        </p:nvSpPr>
-        <p:spPr>
-          <a:xfrm rot="5400000">
-            <a:off x="3810000" y="1752600"/>
-            <a:ext cx="1143000" cy="533400"/>
-          </a:xfrm>
-          <a:prstGeom prst="rightArrow">
-            <a:avLst/>
-          </a:prstGeom>
-        </p:spPr>
-        <p:style>
-          <a:lnRef idx="1">
-            <a:schemeClr val="accent5"/>
-          </a:lnRef>
-          <a:fillRef idx="3">
-            <a:schemeClr val="accent5"/>
-          </a:fillRef>
-          <a:effectRef idx="2">
-            <a:schemeClr val="accent5"/>
-          </a:effectRef>
-          <a:fontRef idx="minor">
-            <a:schemeClr val="lt1"/>
-          </a:fontRef>
-        </p:style>
-        <p:txBody>
-          <a:bodyPr rtlCol="0" anchor="ctr"/>
-          <a:lstStyle/>
-          <a:p>
-            <a:pPr algn="ctr"/>
-            <a:endParaRPr lang="en-US"/>
-          </a:p>
-        </p:txBody>
-      </p:sp>
-      <p:sp>
-        <p:nvSpPr>
-          <p:cNvPr id="56" name="Flèche droite 55"/>
-          <p:cNvSpPr/>
-          <p:nvPr/>
-        </p:nvSpPr>
-        <p:spPr>
-          <a:xfrm>
-            <a:off x="1828800" y="533400"/>
-            <a:ext cx="1981200" cy="533400"/>
-          </a:xfrm>
-          <a:prstGeom prst="rightArrow">
-            <a:avLst/>
-          </a:prstGeom>
-        </p:spPr>
-        <p:style>
-          <a:lnRef idx="1">
-            <a:schemeClr val="accent5"/>
-          </a:lnRef>
-          <a:fillRef idx="3">
-            <a:schemeClr val="accent5"/>
-          </a:fillRef>
-          <a:effectRef idx="2">
-            <a:schemeClr val="accent5"/>
-          </a:effectRef>
-          <a:fontRef idx="minor">
-            <a:schemeClr val="lt1"/>
-          </a:fontRef>
-        </p:style>
-        <p:txBody>
-          <a:bodyPr rtlCol="0" anchor="ctr"/>
-          <a:lstStyle/>
-          <a:p>
-            <a:pPr algn="ctr"/>
-            <a:endParaRPr lang="en-US"/>
-          </a:p>
-        </p:txBody>
-      </p:sp>
-      <p:pic>
-        <p:nvPicPr>
-          <p:cNvPr id="57" name="Picture 7"/>
-          <p:cNvPicPr>
-            <a:picLocks noChangeAspect="1" noChangeArrowheads="1"/>
-          </p:cNvPicPr>
-          <p:nvPr/>
-        </p:nvPicPr>
-        <p:blipFill>
-          <a:blip r:embed="rId6" cstate="print"/>
-          <a:srcRect/>
-          <a:stretch>
-            <a:fillRect/>
-          </a:stretch>
-        </p:blipFill>
-        <p:spPr bwMode="auto">
-          <a:xfrm>
-            <a:off x="8021665" y="2057400"/>
-            <a:ext cx="588935" cy="548640"/>
-          </a:xfrm>
-          <a:prstGeom prst="roundRect">
-            <a:avLst>
-              <a:gd name="adj" fmla="val 16667"/>
-            </a:avLst>
-          </a:prstGeom>
-          <a:ln>
-            <a:noFill/>
-          </a:ln>
-          <a:effectLst>
-            <a:outerShdw blurRad="76200" dist="38100" dir="7800000" algn="tl" rotWithShape="0">
-              <a:srgbClr val="000000">
-                <a:alpha val="40000"/>
-              </a:srgbClr>
-            </a:outerShdw>
-          </a:effectLst>
-          <a:scene3d>
-            <a:camera prst="orthographicFront"/>
-            <a:lightRig rig="contrasting" dir="t">
-              <a:rot lat="0" lon="0" rev="4200000"/>
-            </a:lightRig>
-          </a:scene3d>
-          <a:sp3d prstMaterial="plastic">
-            <a:bevelT w="381000" h="114300" prst="relaxedInset"/>
-            <a:contourClr>
-              <a:srgbClr val="969696"/>
-            </a:contourClr>
-          </a:sp3d>
-        </p:spPr>
-      </p:pic>
-      <p:sp>
-        <p:nvSpPr>
-          <p:cNvPr id="63" name="Flèche droite 62"/>
-          <p:cNvSpPr/>
-          <p:nvPr/>
-        </p:nvSpPr>
-        <p:spPr>
-          <a:xfrm>
-            <a:off x="7239000" y="533400"/>
-            <a:ext cx="609600" cy="533400"/>
-          </a:xfrm>
-          <a:prstGeom prst="rightArrow">
-            <a:avLst/>
-          </a:prstGeom>
-        </p:spPr>
-        <p:style>
-          <a:lnRef idx="1">
-            <a:schemeClr val="accent5"/>
-          </a:lnRef>
-          <a:fillRef idx="3">
-            <a:schemeClr val="accent5"/>
-          </a:fillRef>
-          <a:effectRef idx="2">
-            <a:schemeClr val="accent5"/>
-          </a:effectRef>
-          <a:fontRef idx="minor">
-            <a:schemeClr val="lt1"/>
-          </a:fontRef>
-        </p:style>
-        <p:txBody>
-          <a:bodyPr rtlCol="0" anchor="ctr"/>
-          <a:lstStyle/>
-          <a:p>
-            <a:pPr algn="ctr"/>
-            <a:endParaRPr lang="en-US"/>
-          </a:p>
-        </p:txBody>
-      </p:sp>
-      <p:sp>
-        <p:nvSpPr>
-          <p:cNvPr id="64" name="Flèche droite 63"/>
-          <p:cNvSpPr/>
-          <p:nvPr/>
-        </p:nvSpPr>
-        <p:spPr>
-          <a:xfrm>
-            <a:off x="7239000" y="1295400"/>
-            <a:ext cx="609600" cy="533400"/>
-          </a:xfrm>
-          <a:prstGeom prst="rightArrow">
-            <a:avLst/>
-          </a:prstGeom>
-        </p:spPr>
-        <p:style>
-          <a:lnRef idx="1">
-            <a:schemeClr val="accent5"/>
-          </a:lnRef>
-          <a:fillRef idx="3">
-            <a:schemeClr val="accent5"/>
-          </a:fillRef>
-          <a:effectRef idx="2">
-            <a:schemeClr val="accent5"/>
-          </a:effectRef>
-          <a:fontRef idx="minor">
-            <a:schemeClr val="lt1"/>
-          </a:fontRef>
-        </p:style>
-        <p:txBody>
-          <a:bodyPr rtlCol="0" anchor="ctr"/>
-          <a:lstStyle/>
-          <a:p>
-            <a:pPr algn="ctr"/>
-            <a:endParaRPr lang="en-US"/>
-          </a:p>
-        </p:txBody>
-      </p:sp>
-      <p:sp>
-        <p:nvSpPr>
-          <p:cNvPr id="65" name="Flèche droite 64"/>
-          <p:cNvSpPr/>
-          <p:nvPr/>
-        </p:nvSpPr>
-        <p:spPr>
-          <a:xfrm>
-            <a:off x="7239000" y="2057400"/>
-            <a:ext cx="609600" cy="533400"/>
-          </a:xfrm>
-          <a:prstGeom prst="rightArrow">
-            <a:avLst/>
-          </a:prstGeom>
-        </p:spPr>
-        <p:style>
-          <a:lnRef idx="1">
-            <a:schemeClr val="accent5"/>
-          </a:lnRef>
-          <a:fillRef idx="3">
-            <a:schemeClr val="accent5"/>
-          </a:fillRef>
-          <a:effectRef idx="2">
-            <a:schemeClr val="accent5"/>
-          </a:effectRef>
-          <a:fontRef idx="minor">
-            <a:schemeClr val="lt1"/>
-          </a:fontRef>
-        </p:style>
-        <p:txBody>
-          <a:bodyPr rtlCol="0" anchor="ctr"/>
-          <a:lstStyle/>
-          <a:p>
-            <a:pPr algn="ctr"/>
-            <a:endParaRPr lang="en-US"/>
-          </a:p>
-        </p:txBody>
-      </p:sp>
-      <p:pic>
-        <p:nvPicPr>
-          <p:cNvPr id="2051" name="Picture 3"/>
-          <p:cNvPicPr>
-            <a:picLocks noChangeAspect="1" noChangeArrowheads="1"/>
-          </p:cNvPicPr>
-          <p:nvPr/>
-        </p:nvPicPr>
-        <p:blipFill>
-          <a:blip r:embed="rId7" cstate="print"/>
-          <a:srcRect/>
-          <a:stretch>
-            <a:fillRect/>
-          </a:stretch>
-        </p:blipFill>
-        <p:spPr bwMode="auto">
-          <a:xfrm>
-            <a:off x="4724400" y="3200400"/>
-            <a:ext cx="533400" cy="914400"/>
+            <a:off x="6531286" y="614785"/>
+            <a:ext cx="548640" cy="387441"/>
           </a:xfrm>
           <a:prstGeom prst="roundRect">
             <a:avLst>
@@ -5298,112 +6391,16 @@
           </a:sp3d>
         </p:spPr>
       </p:pic>
-      <p:sp>
-        <p:nvSpPr>
-          <p:cNvPr id="44" name="Rogner un rectangle à un seul coin 43"/>
-          <p:cNvSpPr/>
-          <p:nvPr/>
-        </p:nvSpPr>
-        <p:spPr>
-          <a:xfrm>
-            <a:off x="1371600" y="1219200"/>
-            <a:ext cx="1447800" cy="838200"/>
-          </a:xfrm>
-          <a:prstGeom prst="snip1Rect">
-            <a:avLst/>
-          </a:prstGeom>
-        </p:spPr>
-        <p:style>
-          <a:lnRef idx="1">
-            <a:schemeClr val="dk1"/>
-          </a:lnRef>
-          <a:fillRef idx="3">
-            <a:schemeClr val="dk1"/>
-          </a:fillRef>
-          <a:effectRef idx="2">
-            <a:schemeClr val="dk1"/>
-          </a:effectRef>
-          <a:fontRef idx="minor">
-            <a:schemeClr val="lt1"/>
-          </a:fontRef>
-        </p:style>
-        <p:txBody>
-          <a:bodyPr rtlCol="0" anchor="ctr"/>
-          <a:lstStyle/>
-          <a:p>
-            <a:r>
-              <a:rPr lang="en-US" sz="1200" b="1" dirty="0" smtClean="0">
-                <a:solidFill>
-                  <a:srgbClr val="00B050"/>
-                </a:solidFill>
-                <a:latin typeface="Consolas" pitchFamily="49" charset="0"/>
-              </a:rPr>
-              <a:t>#vid-script.py</a:t>
-            </a:r>
-            <a:br>
-              <a:rPr lang="en-US" sz="1200" b="1" dirty="0" smtClean="0">
-                <a:solidFill>
-                  <a:srgbClr val="00B050"/>
-                </a:solidFill>
-                <a:latin typeface="Consolas" pitchFamily="49" charset="0"/>
-              </a:rPr>
-            </a:br>
-            <a:r>
-              <a:rPr lang="en-US" sz="1200" b="1" dirty="0" smtClean="0">
-                <a:solidFill>
-                  <a:srgbClr val="00B050"/>
-                </a:solidFill>
-                <a:latin typeface="Consolas" pitchFamily="49" charset="0"/>
-              </a:rPr>
-              <a:t>TXT=‘blabla…’</a:t>
-            </a:r>
-          </a:p>
-          <a:p>
-            <a:r>
-              <a:rPr lang="en-US" sz="1200" b="1" dirty="0" smtClean="0">
-                <a:solidFill>
-                  <a:srgbClr val="00B050"/>
-                </a:solidFill>
-                <a:latin typeface="Consolas" pitchFamily="49" charset="0"/>
-              </a:rPr>
-              <a:t>IMG=‘bla.mp4’</a:t>
-            </a:r>
-            <a:br>
-              <a:rPr lang="en-US" sz="1200" b="1" dirty="0" smtClean="0">
-                <a:solidFill>
-                  <a:srgbClr val="00B050"/>
-                </a:solidFill>
-                <a:latin typeface="Consolas" pitchFamily="49" charset="0"/>
-              </a:rPr>
-            </a:br>
-            <a:r>
-              <a:rPr lang="en-US" sz="1200" b="1" dirty="0" smtClean="0">
-                <a:solidFill>
-                  <a:srgbClr val="00B050"/>
-                </a:solidFill>
-                <a:latin typeface="Consolas" pitchFamily="49" charset="0"/>
-              </a:rPr>
-              <a:t>…</a:t>
-            </a:r>
-            <a:endParaRPr lang="en-US" sz="1200" b="1" dirty="0">
-              <a:solidFill>
-                <a:srgbClr val="00B050"/>
-              </a:solidFill>
-              <a:latin typeface="Consolas" pitchFamily="49" charset="0"/>
-            </a:endParaRPr>
-          </a:p>
-        </p:txBody>
-      </p:sp>
       <p:pic>
         <p:nvPicPr>
-          <p:cNvPr id="69" name="Picture 3"/>
+          <p:cNvPr id="46" name="Picture 2"/>
           <p:cNvPicPr>
             <a:picLocks noChangeAspect="1" noChangeArrowheads="1"/>
           </p:cNvPicPr>
           <p:nvPr/>
         </p:nvPicPr>
         <p:blipFill>
-          <a:blip r:embed="rId2" cstate="print"/>
+          <a:blip r:embed="rId12" cstate="print"/>
           <a:srcRect/>
           <a:stretch>
             <a:fillRect/>
@@ -5411,8 +6408,8 @@
         </p:blipFill>
         <p:spPr bwMode="auto">
           <a:xfrm>
-            <a:off x="6629400" y="2057400"/>
-            <a:ext cx="304800" cy="522514"/>
+            <a:off x="6531286" y="2138785"/>
+            <a:ext cx="548640" cy="387441"/>
           </a:xfrm>
           <a:prstGeom prst="roundRect">
             <a:avLst>
@@ -5447,14 +6444,14 @@
       </p:pic>
       <p:pic>
         <p:nvPicPr>
-          <p:cNvPr id="2053" name="Picture 5"/>
+          <p:cNvPr id="47" name="Picture 2"/>
           <p:cNvPicPr>
             <a:picLocks noChangeAspect="1" noChangeArrowheads="1"/>
           </p:cNvPicPr>
           <p:nvPr/>
         </p:nvPicPr>
         <p:blipFill>
-          <a:blip r:embed="rId8"/>
+          <a:blip r:embed="rId12" cstate="print"/>
           <a:srcRect/>
           <a:stretch>
             <a:fillRect/>
@@ -5462,144 +6459,8 @@
         </p:blipFill>
         <p:spPr bwMode="auto">
           <a:xfrm>
-            <a:off x="8001000" y="1264920"/>
-            <a:ext cx="605945" cy="640080"/>
-          </a:xfrm>
-          <a:prstGeom prst="roundRect">
-            <a:avLst>
-              <a:gd name="adj" fmla="val 16667"/>
-            </a:avLst>
-          </a:prstGeom>
-          <a:ln>
-            <a:noFill/>
-          </a:ln>
-          <a:effectLst>
-            <a:outerShdw blurRad="76200" dist="38100" dir="7800000" algn="tl" rotWithShape="0">
-              <a:srgbClr val="000000">
-                <a:alpha val="40000"/>
-              </a:srgbClr>
-            </a:outerShdw>
-          </a:effectLst>
-          <a:scene3d>
-            <a:camera prst="orthographicFront"/>
-            <a:lightRig rig="contrasting" dir="t">
-              <a:rot lat="0" lon="0" rev="4200000"/>
-            </a:lightRig>
-          </a:scene3d>
-          <a:sp3d prstMaterial="plastic">
-            <a:bevelT w="381000" h="114300" prst="relaxedInset"/>
-            <a:contourClr>
-              <a:srgbClr val="969696"/>
-            </a:contourClr>
-          </a:sp3d>
-        </p:spPr>
-      </p:pic>
-      <p:pic>
-        <p:nvPicPr>
-          <p:cNvPr id="70" name="Picture 8"/>
-          <p:cNvPicPr>
-            <a:picLocks noChangeAspect="1" noChangeArrowheads="1"/>
-          </p:cNvPicPr>
-          <p:nvPr/>
-        </p:nvPicPr>
-        <p:blipFill>
-          <a:blip r:embed="rId9"/>
-          <a:srcRect/>
-          <a:stretch>
-            <a:fillRect/>
-          </a:stretch>
-        </p:blipFill>
-        <p:spPr bwMode="auto">
-          <a:xfrm>
-            <a:off x="8030791" y="2804160"/>
-            <a:ext cx="567030" cy="548640"/>
-          </a:xfrm>
-          <a:prstGeom prst="roundRect">
-            <a:avLst>
-              <a:gd name="adj" fmla="val 16667"/>
-            </a:avLst>
-          </a:prstGeom>
-          <a:ln>
-            <a:noFill/>
-          </a:ln>
-          <a:effectLst>
-            <a:outerShdw blurRad="76200" dist="38100" dir="7800000" algn="tl" rotWithShape="0">
-              <a:srgbClr val="000000">
-                <a:alpha val="40000"/>
-              </a:srgbClr>
-            </a:outerShdw>
-          </a:effectLst>
-          <a:scene3d>
-            <a:camera prst="orthographicFront"/>
-            <a:lightRig rig="contrasting" dir="t">
-              <a:rot lat="0" lon="0" rev="4200000"/>
-            </a:lightRig>
-          </a:scene3d>
-          <a:sp3d prstMaterial="plastic">
-            <a:bevelT w="381000" h="114300" prst="relaxedInset"/>
-            <a:contourClr>
-              <a:srgbClr val="969696"/>
-            </a:contourClr>
-          </a:sp3d>
-        </p:spPr>
-      </p:pic>
-      <p:sp>
-        <p:nvSpPr>
-          <p:cNvPr id="71" name="Flèche droite 70"/>
-          <p:cNvSpPr/>
-          <p:nvPr/>
-        </p:nvSpPr>
-        <p:spPr>
-          <a:xfrm>
-            <a:off x="7239000" y="2804160"/>
-            <a:ext cx="609600" cy="533400"/>
-          </a:xfrm>
-          <a:prstGeom prst="rightArrow">
-            <a:avLst/>
-          </a:prstGeom>
-        </p:spPr>
-        <p:style>
-          <a:lnRef idx="1">
-            <a:schemeClr val="accent5"/>
-          </a:lnRef>
-          <a:fillRef idx="3">
-            <a:schemeClr val="accent5"/>
-          </a:fillRef>
-          <a:effectRef idx="2">
-            <a:schemeClr val="accent5"/>
-          </a:effectRef>
-          <a:fontRef idx="minor">
-            <a:schemeClr val="lt1"/>
-          </a:fontRef>
-        </p:style>
-        <p:txBody>
-          <a:bodyPr rtlCol="0" anchor="ctr"/>
-          <a:lstStyle/>
-          <a:p>
-            <a:pPr algn="ctr"/>
-            <a:endParaRPr lang="en-US"/>
-          </a:p>
-        </p:txBody>
-      </p:sp>
-      <p:pic>
-        <p:nvPicPr>
-          <p:cNvPr id="72" name="Picture 3"/>
-          <p:cNvPicPr>
-            <a:picLocks noChangeAspect="1" noChangeArrowheads="1"/>
-          </p:cNvPicPr>
-          <p:nvPr/>
-        </p:nvPicPr>
-        <p:blipFill>
-          <a:blip r:embed="rId2" cstate="print"/>
-          <a:srcRect/>
-          <a:stretch>
-            <a:fillRect/>
-          </a:stretch>
-        </p:blipFill>
-        <p:spPr bwMode="auto">
-          <a:xfrm>
-            <a:off x="6629400" y="2804160"/>
-            <a:ext cx="304800" cy="522514"/>
+            <a:off x="6531286" y="2900785"/>
+            <a:ext cx="548640" cy="387441"/>
           </a:xfrm>
           <a:prstGeom prst="roundRect">
             <a:avLst>
@@ -5634,23 +6495,232 @@
       </p:pic>
       <p:pic>
         <p:nvPicPr>
-          <p:cNvPr id="2055" name="Picture 7"/>
+          <p:cNvPr id="48" name="Picture 8"/>
           <p:cNvPicPr>
             <a:picLocks noChangeAspect="1" noChangeArrowheads="1"/>
           </p:cNvPicPr>
           <p:nvPr/>
         </p:nvPicPr>
         <p:blipFill>
-          <a:blip r:embed="rId10" cstate="print"/>
+          <a:blip r:embed="rId13"/>
           <a:srcRect/>
           <a:stretch>
             <a:fillRect/>
           </a:stretch>
         </p:blipFill>
         <p:spPr bwMode="auto">
-          <a:xfrm>
-            <a:off x="8001001" y="518160"/>
-            <a:ext cx="609599" cy="548640"/>
+          <a:xfrm rot="2121903">
+            <a:off x="-1220796" y="2702925"/>
+            <a:ext cx="11698904" cy="1617663"/>
+          </a:xfrm>
+          <a:prstGeom prst="rect">
+            <a:avLst/>
+          </a:prstGeom>
+          <a:noFill/>
+          <a:ln w="9525">
+            <a:noFill/>
+            <a:miter lim="800000"/>
+            <a:headEnd/>
+            <a:tailEnd/>
+          </a:ln>
+          <a:effectLst/>
+        </p:spPr>
+      </p:pic>
+      <p:sp>
+        <p:nvSpPr>
+          <p:cNvPr id="50" name="Rectangle 49"/>
+          <p:cNvSpPr/>
+          <p:nvPr/>
+        </p:nvSpPr>
+        <p:spPr>
+          <a:xfrm>
+            <a:off x="2379493" y="6488668"/>
+            <a:ext cx="4173707" cy="369332"/>
+          </a:xfrm>
+          <a:prstGeom prst="rect">
+            <a:avLst/>
+          </a:prstGeom>
+        </p:spPr>
+        <p:txBody>
+          <a:bodyPr wrap="none">
+            <a:spAutoFit/>
+          </a:bodyPr>
+          <a:lstStyle/>
+          <a:p>
+            <a:r>
+              <a:rPr lang="en-US" b="1" dirty="0" smtClean="0"/>
+              <a:t>social-</a:t>
+            </a:r>
+            <a:r>
+              <a:rPr lang="en-US" b="1" dirty="0" err="1" smtClean="0"/>
+              <a:t>bot</a:t>
+            </a:r>
+            <a:r>
+              <a:rPr lang="en-US" b="1" dirty="0" smtClean="0"/>
+              <a:t>-@</a:t>
+            </a:r>
+            <a:r>
+              <a:rPr lang="en-US" b="1" dirty="0" err="1" smtClean="0"/>
+              <a:t>frimoussethecat</a:t>
+            </a:r>
+            <a:r>
+              <a:rPr lang="en-US" b="1" dirty="0" smtClean="0"/>
+              <a:t>-post-</a:t>
+            </a:r>
+            <a:r>
+              <a:rPr lang="en-US" b="1" dirty="0" err="1" smtClean="0"/>
+              <a:t>vids.py</a:t>
+            </a:r>
+            <a:endParaRPr lang="en-US" b="1" dirty="0"/>
+          </a:p>
+        </p:txBody>
+      </p:sp>
+    </p:spTree>
+  </p:cSld>
+  <p:clrMapOvr>
+    <a:masterClrMapping/>
+  </p:clrMapOvr>
+</p:sld>
+</file>
+
+<file path=ppt/slides/slide3.xml><?xml version="1.0" encoding="utf-8"?>
+<p:sld xmlns:a="http://schemas.openxmlformats.org/drawingml/2006/main" xmlns:r="http://schemas.openxmlformats.org/officeDocument/2006/relationships" xmlns:p="http://schemas.openxmlformats.org/presentationml/2006/main">
+  <p:cSld>
+    <p:spTree>
+      <p:nvGrpSpPr>
+        <p:cNvPr id="1" name=""/>
+        <p:cNvGrpSpPr/>
+        <p:nvPr/>
+      </p:nvGrpSpPr>
+      <p:grpSpPr>
+        <a:xfrm>
+          <a:off x="0" y="0"/>
+          <a:ext cx="0" cy="0"/>
+          <a:chOff x="0" y="0"/>
+          <a:chExt cx="0" cy="0"/>
+        </a:xfrm>
+      </p:grpSpPr>
+      <p:pic>
+        <p:nvPicPr>
+          <p:cNvPr id="37" name="Picture 3"/>
+          <p:cNvPicPr>
+            <a:picLocks noChangeAspect="1" noChangeArrowheads="1"/>
+          </p:cNvPicPr>
+          <p:nvPr/>
+        </p:nvPicPr>
+        <p:blipFill>
+          <a:blip r:embed="rId2" cstate="print"/>
+          <a:srcRect/>
+          <a:stretch>
+            <a:fillRect/>
+          </a:stretch>
+        </p:blipFill>
+        <p:spPr bwMode="auto">
+          <a:xfrm>
+            <a:off x="6629400" y="1306286"/>
+            <a:ext cx="304800" cy="522514"/>
+          </a:xfrm>
+          <a:prstGeom prst="roundRect">
+            <a:avLst>
+              <a:gd name="adj" fmla="val 4167"/>
+            </a:avLst>
+          </a:prstGeom>
+          <a:solidFill>
+            <a:srgbClr val="FFFFFF"/>
+          </a:solidFill>
+          <a:ln w="76200" cap="sq">
+            <a:solidFill>
+              <a:srgbClr val="292929"/>
+            </a:solidFill>
+            <a:miter lim="800000"/>
+          </a:ln>
+          <a:effectLst>
+            <a:reflection blurRad="12700" stA="28000" endPos="28000" dist="5000" dir="5400000" sy="-100000" algn="bl" rotWithShape="0"/>
+          </a:effectLst>
+          <a:scene3d>
+            <a:camera prst="orthographicFront"/>
+            <a:lightRig rig="threePt" dir="t">
+              <a:rot lat="0" lon="0" rev="2700000"/>
+            </a:lightRig>
+          </a:scene3d>
+          <a:sp3d>
+            <a:bevelT h="38100"/>
+            <a:contourClr>
+              <a:srgbClr val="C0C0C0"/>
+            </a:contourClr>
+          </a:sp3d>
+        </p:spPr>
+      </p:pic>
+      <p:pic>
+        <p:nvPicPr>
+          <p:cNvPr id="38" name="Picture 3"/>
+          <p:cNvPicPr>
+            <a:picLocks noChangeAspect="1" noChangeArrowheads="1"/>
+          </p:cNvPicPr>
+          <p:nvPr/>
+        </p:nvPicPr>
+        <p:blipFill>
+          <a:blip r:embed="rId2" cstate="print"/>
+          <a:srcRect/>
+          <a:stretch>
+            <a:fillRect/>
+          </a:stretch>
+        </p:blipFill>
+        <p:spPr bwMode="auto">
+          <a:xfrm>
+            <a:off x="6629400" y="544286"/>
+            <a:ext cx="304800" cy="522514"/>
+          </a:xfrm>
+          <a:prstGeom prst="roundRect">
+            <a:avLst>
+              <a:gd name="adj" fmla="val 4167"/>
+            </a:avLst>
+          </a:prstGeom>
+          <a:solidFill>
+            <a:srgbClr val="FFFFFF"/>
+          </a:solidFill>
+          <a:ln w="76200" cap="sq">
+            <a:solidFill>
+              <a:srgbClr val="292929"/>
+            </a:solidFill>
+            <a:miter lim="800000"/>
+          </a:ln>
+          <a:effectLst>
+            <a:reflection blurRad="12700" stA="28000" endPos="28000" dist="5000" dir="5400000" sy="-100000" algn="bl" rotWithShape="0"/>
+          </a:effectLst>
+          <a:scene3d>
+            <a:camera prst="orthographicFront"/>
+            <a:lightRig rig="threePt" dir="t">
+              <a:rot lat="0" lon="0" rev="2700000"/>
+            </a:lightRig>
+          </a:scene3d>
+          <a:sp3d>
+            <a:bevelT h="38100"/>
+            <a:contourClr>
+              <a:srgbClr val="C0C0C0"/>
+            </a:contourClr>
+          </a:sp3d>
+        </p:spPr>
+      </p:pic>
+      <p:pic>
+        <p:nvPicPr>
+          <p:cNvPr id="40" name="Picture 18"/>
+          <p:cNvPicPr>
+            <a:picLocks noChangeAspect="1" noChangeArrowheads="1"/>
+          </p:cNvPicPr>
+          <p:nvPr/>
+        </p:nvPicPr>
+        <p:blipFill>
+          <a:blip r:embed="rId3"/>
+          <a:srcRect/>
+          <a:stretch>
+            <a:fillRect/>
+          </a:stretch>
+        </p:blipFill>
+        <p:spPr bwMode="auto">
+          <a:xfrm>
+            <a:off x="3810000" y="2590800"/>
+            <a:ext cx="1283442" cy="1238250"/>
           </a:xfrm>
           <a:prstGeom prst="roundRect">
             <a:avLst>
@@ -5683,14 +6753,14 @@
       </p:pic>
       <p:pic>
         <p:nvPicPr>
-          <p:cNvPr id="26" name="Picture 2"/>
+          <p:cNvPr id="42" name="Picture 19"/>
           <p:cNvPicPr>
             <a:picLocks noChangeAspect="1" noChangeArrowheads="1"/>
           </p:cNvPicPr>
           <p:nvPr/>
         </p:nvPicPr>
         <p:blipFill>
-          <a:blip r:embed="rId11"/>
+          <a:blip r:embed="rId4"/>
           <a:srcRect/>
           <a:stretch>
             <a:fillRect/>
@@ -5698,8 +6768,555 @@
         </p:blipFill>
         <p:spPr bwMode="auto">
           <a:xfrm>
-            <a:off x="457200" y="4628771"/>
-            <a:ext cx="1752599" cy="1772029"/>
+            <a:off x="533400" y="228600"/>
+            <a:ext cx="1228060" cy="1200150"/>
+          </a:xfrm>
+          <a:prstGeom prst="roundRect">
+            <a:avLst>
+              <a:gd name="adj" fmla="val 16667"/>
+            </a:avLst>
+          </a:prstGeom>
+          <a:ln>
+            <a:noFill/>
+          </a:ln>
+          <a:effectLst>
+            <a:outerShdw blurRad="76200" dist="38100" dir="7800000" algn="tl" rotWithShape="0">
+              <a:srgbClr val="000000">
+                <a:alpha val="40000"/>
+              </a:srgbClr>
+            </a:outerShdw>
+          </a:effectLst>
+          <a:scene3d>
+            <a:camera prst="orthographicFront"/>
+            <a:lightRig rig="contrasting" dir="t">
+              <a:rot lat="0" lon="0" rev="4200000"/>
+            </a:lightRig>
+          </a:scene3d>
+          <a:sp3d prstMaterial="plastic">
+            <a:bevelT w="381000" h="114300" prst="relaxedInset"/>
+            <a:contourClr>
+              <a:srgbClr val="969696"/>
+            </a:contourClr>
+          </a:sp3d>
+        </p:spPr>
+      </p:pic>
+      <p:pic>
+        <p:nvPicPr>
+          <p:cNvPr id="43" name="Picture 22"/>
+          <p:cNvPicPr>
+            <a:picLocks noChangeAspect="1" noChangeArrowheads="1"/>
+          </p:cNvPicPr>
+          <p:nvPr/>
+        </p:nvPicPr>
+        <p:blipFill>
+          <a:blip r:embed="rId5"/>
+          <a:srcRect/>
+          <a:stretch>
+            <a:fillRect/>
+          </a:stretch>
+        </p:blipFill>
+        <p:spPr bwMode="auto">
+          <a:xfrm>
+            <a:off x="3877620" y="228600"/>
+            <a:ext cx="1092820" cy="1219200"/>
+          </a:xfrm>
+          <a:prstGeom prst="roundRect">
+            <a:avLst>
+              <a:gd name="adj" fmla="val 16667"/>
+            </a:avLst>
+          </a:prstGeom>
+          <a:ln>
+            <a:noFill/>
+          </a:ln>
+          <a:effectLst>
+            <a:outerShdw blurRad="76200" dist="38100" dir="7800000" algn="tl" rotWithShape="0">
+              <a:srgbClr val="000000">
+                <a:alpha val="40000"/>
+              </a:srgbClr>
+            </a:outerShdw>
+          </a:effectLst>
+          <a:scene3d>
+            <a:camera prst="orthographicFront"/>
+            <a:lightRig rig="contrasting" dir="t">
+              <a:rot lat="0" lon="0" rev="4200000"/>
+            </a:lightRig>
+          </a:scene3d>
+          <a:sp3d prstMaterial="plastic">
+            <a:bevelT w="381000" h="114300" prst="relaxedInset"/>
+            <a:contourClr>
+              <a:srgbClr val="969696"/>
+            </a:contourClr>
+          </a:sp3d>
+        </p:spPr>
+      </p:pic>
+      <p:sp>
+        <p:nvSpPr>
+          <p:cNvPr id="51" name="Flèche droite 50"/>
+          <p:cNvSpPr/>
+          <p:nvPr/>
+        </p:nvSpPr>
+        <p:spPr>
+          <a:xfrm>
+            <a:off x="5029200" y="533400"/>
+            <a:ext cx="1371600" cy="533400"/>
+          </a:xfrm>
+          <a:prstGeom prst="rightArrow">
+            <a:avLst/>
+          </a:prstGeom>
+        </p:spPr>
+        <p:style>
+          <a:lnRef idx="1">
+            <a:schemeClr val="accent5"/>
+          </a:lnRef>
+          <a:fillRef idx="3">
+            <a:schemeClr val="accent5"/>
+          </a:fillRef>
+          <a:effectRef idx="2">
+            <a:schemeClr val="accent5"/>
+          </a:effectRef>
+          <a:fontRef idx="minor">
+            <a:schemeClr val="lt1"/>
+          </a:fontRef>
+        </p:style>
+        <p:txBody>
+          <a:bodyPr rtlCol="0" anchor="ctr"/>
+          <a:lstStyle/>
+          <a:p>
+            <a:pPr algn="ctr"/>
+            <a:endParaRPr lang="en-US"/>
+          </a:p>
+        </p:txBody>
+      </p:sp>
+      <p:sp>
+        <p:nvSpPr>
+          <p:cNvPr id="52" name="Flèche droite 51"/>
+          <p:cNvSpPr/>
+          <p:nvPr/>
+        </p:nvSpPr>
+        <p:spPr>
+          <a:xfrm rot="5400000">
+            <a:off x="3810000" y="1752600"/>
+            <a:ext cx="1143000" cy="533400"/>
+          </a:xfrm>
+          <a:prstGeom prst="rightArrow">
+            <a:avLst/>
+          </a:prstGeom>
+        </p:spPr>
+        <p:style>
+          <a:lnRef idx="1">
+            <a:schemeClr val="accent5"/>
+          </a:lnRef>
+          <a:fillRef idx="3">
+            <a:schemeClr val="accent5"/>
+          </a:fillRef>
+          <a:effectRef idx="2">
+            <a:schemeClr val="accent5"/>
+          </a:effectRef>
+          <a:fontRef idx="minor">
+            <a:schemeClr val="lt1"/>
+          </a:fontRef>
+        </p:style>
+        <p:txBody>
+          <a:bodyPr rtlCol="0" anchor="ctr"/>
+          <a:lstStyle/>
+          <a:p>
+            <a:pPr algn="ctr"/>
+            <a:endParaRPr lang="en-US"/>
+          </a:p>
+        </p:txBody>
+      </p:sp>
+      <p:sp>
+        <p:nvSpPr>
+          <p:cNvPr id="56" name="Flèche droite 55"/>
+          <p:cNvSpPr/>
+          <p:nvPr/>
+        </p:nvSpPr>
+        <p:spPr>
+          <a:xfrm>
+            <a:off x="1828800" y="533400"/>
+            <a:ext cx="1981200" cy="533400"/>
+          </a:xfrm>
+          <a:prstGeom prst="rightArrow">
+            <a:avLst/>
+          </a:prstGeom>
+        </p:spPr>
+        <p:style>
+          <a:lnRef idx="1">
+            <a:schemeClr val="accent5"/>
+          </a:lnRef>
+          <a:fillRef idx="3">
+            <a:schemeClr val="accent5"/>
+          </a:fillRef>
+          <a:effectRef idx="2">
+            <a:schemeClr val="accent5"/>
+          </a:effectRef>
+          <a:fontRef idx="minor">
+            <a:schemeClr val="lt1"/>
+          </a:fontRef>
+        </p:style>
+        <p:txBody>
+          <a:bodyPr rtlCol="0" anchor="ctr"/>
+          <a:lstStyle/>
+          <a:p>
+            <a:pPr algn="ctr"/>
+            <a:endParaRPr lang="en-US"/>
+          </a:p>
+        </p:txBody>
+      </p:sp>
+      <p:sp>
+        <p:nvSpPr>
+          <p:cNvPr id="63" name="Flèche droite 62"/>
+          <p:cNvSpPr/>
+          <p:nvPr/>
+        </p:nvSpPr>
+        <p:spPr>
+          <a:xfrm>
+            <a:off x="7239000" y="533400"/>
+            <a:ext cx="609600" cy="533400"/>
+          </a:xfrm>
+          <a:prstGeom prst="rightArrow">
+            <a:avLst/>
+          </a:prstGeom>
+          <a:solidFill>
+            <a:srgbClr val="FFC000"/>
+          </a:solidFill>
+        </p:spPr>
+        <p:style>
+          <a:lnRef idx="1">
+            <a:schemeClr val="accent5"/>
+          </a:lnRef>
+          <a:fillRef idx="3">
+            <a:schemeClr val="accent5"/>
+          </a:fillRef>
+          <a:effectRef idx="2">
+            <a:schemeClr val="accent5"/>
+          </a:effectRef>
+          <a:fontRef idx="minor">
+            <a:schemeClr val="lt1"/>
+          </a:fontRef>
+        </p:style>
+        <p:txBody>
+          <a:bodyPr rtlCol="0" anchor="ctr"/>
+          <a:lstStyle/>
+          <a:p>
+            <a:pPr algn="ctr"/>
+            <a:endParaRPr lang="en-US"/>
+          </a:p>
+        </p:txBody>
+      </p:sp>
+      <p:sp>
+        <p:nvSpPr>
+          <p:cNvPr id="64" name="Flèche droite 63"/>
+          <p:cNvSpPr/>
+          <p:nvPr/>
+        </p:nvSpPr>
+        <p:spPr>
+          <a:xfrm>
+            <a:off x="7239000" y="1295400"/>
+            <a:ext cx="609600" cy="533400"/>
+          </a:xfrm>
+          <a:prstGeom prst="rightArrow">
+            <a:avLst/>
+          </a:prstGeom>
+          <a:solidFill>
+            <a:srgbClr val="FFC000"/>
+          </a:solidFill>
+        </p:spPr>
+        <p:style>
+          <a:lnRef idx="1">
+            <a:schemeClr val="accent5"/>
+          </a:lnRef>
+          <a:fillRef idx="3">
+            <a:schemeClr val="accent5"/>
+          </a:fillRef>
+          <a:effectRef idx="2">
+            <a:schemeClr val="accent5"/>
+          </a:effectRef>
+          <a:fontRef idx="minor">
+            <a:schemeClr val="lt1"/>
+          </a:fontRef>
+        </p:style>
+        <p:txBody>
+          <a:bodyPr rtlCol="0" anchor="ctr"/>
+          <a:lstStyle/>
+          <a:p>
+            <a:pPr algn="ctr"/>
+            <a:endParaRPr lang="en-US"/>
+          </a:p>
+        </p:txBody>
+      </p:sp>
+      <p:pic>
+        <p:nvPicPr>
+          <p:cNvPr id="2051" name="Picture 3"/>
+          <p:cNvPicPr>
+            <a:picLocks noChangeAspect="1" noChangeArrowheads="1"/>
+          </p:cNvPicPr>
+          <p:nvPr/>
+        </p:nvPicPr>
+        <p:blipFill>
+          <a:blip r:embed="rId6" cstate="print"/>
+          <a:srcRect/>
+          <a:stretch>
+            <a:fillRect/>
+          </a:stretch>
+        </p:blipFill>
+        <p:spPr bwMode="auto">
+          <a:xfrm>
+            <a:off x="4724400" y="3200400"/>
+            <a:ext cx="838200" cy="1436914"/>
+          </a:xfrm>
+          <a:prstGeom prst="roundRect">
+            <a:avLst>
+              <a:gd name="adj" fmla="val 4167"/>
+            </a:avLst>
+          </a:prstGeom>
+          <a:solidFill>
+            <a:srgbClr val="FFFFFF"/>
+          </a:solidFill>
+          <a:ln w="76200" cap="sq">
+            <a:solidFill>
+              <a:srgbClr val="292929"/>
+            </a:solidFill>
+            <a:miter lim="800000"/>
+          </a:ln>
+          <a:effectLst>
+            <a:reflection blurRad="12700" stA="28000" endPos="28000" dist="5000" dir="5400000" sy="-100000" algn="bl" rotWithShape="0"/>
+          </a:effectLst>
+          <a:scene3d>
+            <a:camera prst="orthographicFront"/>
+            <a:lightRig rig="threePt" dir="t">
+              <a:rot lat="0" lon="0" rev="2700000"/>
+            </a:lightRig>
+          </a:scene3d>
+          <a:sp3d>
+            <a:bevelT h="38100"/>
+            <a:contourClr>
+              <a:srgbClr val="C0C0C0"/>
+            </a:contourClr>
+          </a:sp3d>
+        </p:spPr>
+      </p:pic>
+      <p:sp>
+        <p:nvSpPr>
+          <p:cNvPr id="44" name="Rogner un rectangle à un seul coin 43"/>
+          <p:cNvSpPr/>
+          <p:nvPr/>
+        </p:nvSpPr>
+        <p:spPr>
+          <a:xfrm>
+            <a:off x="1371600" y="1219200"/>
+            <a:ext cx="1447800" cy="838200"/>
+          </a:xfrm>
+          <a:prstGeom prst="snip1Rect">
+            <a:avLst/>
+          </a:prstGeom>
+        </p:spPr>
+        <p:style>
+          <a:lnRef idx="1">
+            <a:schemeClr val="dk1"/>
+          </a:lnRef>
+          <a:fillRef idx="3">
+            <a:schemeClr val="dk1"/>
+          </a:fillRef>
+          <a:effectRef idx="2">
+            <a:schemeClr val="dk1"/>
+          </a:effectRef>
+          <a:fontRef idx="minor">
+            <a:schemeClr val="lt1"/>
+          </a:fontRef>
+        </p:style>
+        <p:txBody>
+          <a:bodyPr rtlCol="0" anchor="ctr"/>
+          <a:lstStyle/>
+          <a:p>
+            <a:r>
+              <a:rPr lang="en-US" sz="1200" b="1" dirty="0" smtClean="0">
+                <a:solidFill>
+                  <a:srgbClr val="00B050"/>
+                </a:solidFill>
+                <a:latin typeface="Consolas" pitchFamily="49" charset="0"/>
+              </a:rPr>
+              <a:t>#sho-script.py</a:t>
+            </a:r>
+            <a:br>
+              <a:rPr lang="en-US" sz="1200" b="1" dirty="0" smtClean="0">
+                <a:solidFill>
+                  <a:srgbClr val="00B050"/>
+                </a:solidFill>
+                <a:latin typeface="Consolas" pitchFamily="49" charset="0"/>
+              </a:rPr>
+            </a:br>
+            <a:r>
+              <a:rPr lang="en-US" sz="1200" b="1" dirty="0" smtClean="0">
+                <a:solidFill>
+                  <a:srgbClr val="00B050"/>
+                </a:solidFill>
+                <a:latin typeface="Consolas" pitchFamily="49" charset="0"/>
+              </a:rPr>
+              <a:t>TXT=‘blabla…’</a:t>
+            </a:r>
+          </a:p>
+          <a:p>
+            <a:r>
+              <a:rPr lang="en-US" sz="1200" b="1" dirty="0" smtClean="0">
+                <a:solidFill>
+                  <a:srgbClr val="00B050"/>
+                </a:solidFill>
+                <a:latin typeface="Consolas" pitchFamily="49" charset="0"/>
+              </a:rPr>
+              <a:t>IMG=‘bla.mp4’</a:t>
+            </a:r>
+            <a:br>
+              <a:rPr lang="en-US" sz="1200" b="1" dirty="0" smtClean="0">
+                <a:solidFill>
+                  <a:srgbClr val="00B050"/>
+                </a:solidFill>
+                <a:latin typeface="Consolas" pitchFamily="49" charset="0"/>
+              </a:rPr>
+            </a:br>
+            <a:r>
+              <a:rPr lang="en-US" sz="1200" b="1" dirty="0" smtClean="0">
+                <a:solidFill>
+                  <a:srgbClr val="00B050"/>
+                </a:solidFill>
+                <a:latin typeface="Consolas" pitchFamily="49" charset="0"/>
+              </a:rPr>
+              <a:t>…</a:t>
+            </a:r>
+            <a:endParaRPr lang="en-US" sz="1200" b="1" dirty="0">
+              <a:solidFill>
+                <a:srgbClr val="00B050"/>
+              </a:solidFill>
+              <a:latin typeface="Consolas" pitchFamily="49" charset="0"/>
+            </a:endParaRPr>
+          </a:p>
+        </p:txBody>
+      </p:sp>
+      <p:pic>
+        <p:nvPicPr>
+          <p:cNvPr id="2053" name="Picture 5"/>
+          <p:cNvPicPr>
+            <a:picLocks noChangeAspect="1" noChangeArrowheads="1"/>
+          </p:cNvPicPr>
+          <p:nvPr/>
+        </p:nvPicPr>
+        <p:blipFill>
+          <a:blip r:embed="rId7"/>
+          <a:srcRect/>
+          <a:stretch>
+            <a:fillRect/>
+          </a:stretch>
+        </p:blipFill>
+        <p:spPr bwMode="auto">
+          <a:xfrm>
+            <a:off x="8001000" y="1264920"/>
+            <a:ext cx="605945" cy="640080"/>
+          </a:xfrm>
+          <a:prstGeom prst="roundRect">
+            <a:avLst>
+              <a:gd name="adj" fmla="val 16667"/>
+            </a:avLst>
+          </a:prstGeom>
+          <a:ln>
+            <a:noFill/>
+          </a:ln>
+          <a:effectLst>
+            <a:outerShdw blurRad="76200" dist="38100" dir="7800000" algn="tl" rotWithShape="0">
+              <a:srgbClr val="000000">
+                <a:alpha val="40000"/>
+              </a:srgbClr>
+            </a:outerShdw>
+          </a:effectLst>
+          <a:scene3d>
+            <a:camera prst="orthographicFront"/>
+            <a:lightRig rig="contrasting" dir="t">
+              <a:rot lat="0" lon="0" rev="4200000"/>
+            </a:lightRig>
+          </a:scene3d>
+          <a:sp3d prstMaterial="plastic">
+            <a:bevelT w="381000" h="114300" prst="relaxedInset"/>
+            <a:contourClr>
+              <a:srgbClr val="969696"/>
+            </a:contourClr>
+          </a:sp3d>
+        </p:spPr>
+      </p:pic>
+      <p:pic>
+        <p:nvPicPr>
+          <p:cNvPr id="2055" name="Picture 7"/>
+          <p:cNvPicPr>
+            <a:picLocks noChangeAspect="1" noChangeArrowheads="1"/>
+          </p:cNvPicPr>
+          <p:nvPr/>
+        </p:nvPicPr>
+        <p:blipFill>
+          <a:blip r:embed="rId8" cstate="print"/>
+          <a:srcRect/>
+          <a:stretch>
+            <a:fillRect/>
+          </a:stretch>
+        </p:blipFill>
+        <p:spPr bwMode="auto">
+          <a:xfrm>
+            <a:off x="8001001" y="518160"/>
+            <a:ext cx="609599" cy="548640"/>
+          </a:xfrm>
+          <a:prstGeom prst="roundRect">
+            <a:avLst>
+              <a:gd name="adj" fmla="val 16667"/>
+            </a:avLst>
+          </a:prstGeom>
+          <a:ln>
+            <a:noFill/>
+          </a:ln>
+          <a:effectLst>
+            <a:outerShdw blurRad="76200" dist="38100" dir="7800000" algn="tl" rotWithShape="0">
+              <a:srgbClr val="000000">
+                <a:alpha val="40000"/>
+              </a:srgbClr>
+            </a:outerShdw>
+          </a:effectLst>
+          <a:scene3d>
+            <a:camera prst="orthographicFront"/>
+            <a:lightRig rig="contrasting" dir="t">
+              <a:rot lat="0" lon="0" rev="4200000"/>
+            </a:lightRig>
+          </a:scene3d>
+          <a:sp3d prstMaterial="plastic">
+            <a:bevelT w="381000" h="114300" prst="relaxedInset"/>
+            <a:contourClr>
+              <a:srgbClr val="969696"/>
+            </a:contourClr>
+          </a:sp3d>
+        </p:spPr>
+      </p:pic>
+      <p:pic>
+        <p:nvPicPr>
+          <p:cNvPr id="26" name="Picture 2"/>
+          <p:cNvPicPr>
+            <a:picLocks noChangeAspect="1" noChangeArrowheads="1"/>
+          </p:cNvPicPr>
+          <p:nvPr/>
+        </p:nvPicPr>
+        <p:blipFill>
+          <a:blip r:embed="rId9" cstate="print">
+            <a:duotone>
+              <a:schemeClr val="accent2">
+                <a:shade val="45000"/>
+                <a:satMod val="135000"/>
+              </a:schemeClr>
+              <a:prstClr val="white"/>
+            </a:duotone>
+          </a:blip>
+          <a:srcRect/>
+          <a:stretch>
+            <a:fillRect/>
+          </a:stretch>
+        </p:blipFill>
+        <p:spPr bwMode="auto">
+          <a:xfrm>
+            <a:off x="457201" y="4628771"/>
+            <a:ext cx="1066799" cy="1772029"/>
           </a:xfrm>
           <a:prstGeom prst="roundRect">
             <a:avLst>
@@ -5741,7 +7358,15 @@
           <p:nvPr/>
         </p:nvPicPr>
         <p:blipFill>
-          <a:blip r:embed="rId12" cstate="print"/>
+          <a:blip r:embed="rId10" cstate="print">
+            <a:duotone>
+              <a:schemeClr val="accent2">
+                <a:shade val="45000"/>
+                <a:satMod val="135000"/>
+              </a:schemeClr>
+              <a:prstClr val="white"/>
+            </a:duotone>
+          </a:blip>
           <a:stretch>
             <a:fillRect/>
           </a:stretch>
@@ -5760,16 +7385,142 @@
           </a:ln>
         </p:spPr>
       </p:pic>
+      <p:sp>
+        <p:nvSpPr>
+          <p:cNvPr id="25" name="Rectangle 24"/>
+          <p:cNvSpPr/>
+          <p:nvPr/>
+        </p:nvSpPr>
+        <p:spPr>
+          <a:xfrm>
+            <a:off x="9296400" y="533400"/>
+            <a:ext cx="609600" cy="609600"/>
+          </a:xfrm>
+          <a:prstGeom prst="rect">
+            <a:avLst/>
+          </a:prstGeom>
+          <a:solidFill>
+            <a:schemeClr val="accent2">
+              <a:lumMod val="60000"/>
+              <a:lumOff val="40000"/>
+            </a:schemeClr>
+          </a:solidFill>
+          <a:ln>
+            <a:solidFill>
+              <a:schemeClr val="tx1"/>
+            </a:solidFill>
+          </a:ln>
+        </p:spPr>
+        <p:style>
+          <a:lnRef idx="2">
+            <a:schemeClr val="accent1">
+              <a:shade val="50000"/>
+            </a:schemeClr>
+          </a:lnRef>
+          <a:fillRef idx="1">
+            <a:schemeClr val="accent1"/>
+          </a:fillRef>
+          <a:effectRef idx="0">
+            <a:schemeClr val="accent1"/>
+          </a:effectRef>
+          <a:fontRef idx="minor">
+            <a:schemeClr val="lt1"/>
+          </a:fontRef>
+        </p:style>
+        <p:txBody>
+          <a:bodyPr rtlCol="0" anchor="ctr"/>
+          <a:lstStyle/>
+          <a:p>
+            <a:pPr algn="ctr"/>
+            <a:r>
+              <a:rPr lang="en-US" sz="2000" b="1" dirty="0" smtClean="0">
+                <a:solidFill>
+                  <a:schemeClr val="tx1"/>
+                </a:solidFill>
+              </a:rPr>
+              <a:t>S</a:t>
+            </a:r>
+            <a:endParaRPr lang="en-US" sz="2000" b="1" dirty="0">
+              <a:solidFill>
+                <a:schemeClr val="tx1"/>
+              </a:solidFill>
+            </a:endParaRPr>
+          </a:p>
+        </p:txBody>
+      </p:sp>
+      <p:sp>
+        <p:nvSpPr>
+          <p:cNvPr id="28" name="Rectangle 27"/>
+          <p:cNvSpPr/>
+          <p:nvPr/>
+        </p:nvSpPr>
+        <p:spPr>
+          <a:xfrm>
+            <a:off x="9296400" y="1295400"/>
+            <a:ext cx="609600" cy="609600"/>
+          </a:xfrm>
+          <a:prstGeom prst="rect">
+            <a:avLst/>
+          </a:prstGeom>
+          <a:solidFill>
+            <a:schemeClr val="accent6">
+              <a:lumMod val="60000"/>
+              <a:lumOff val="40000"/>
+            </a:schemeClr>
+          </a:solidFill>
+          <a:ln>
+            <a:solidFill>
+              <a:schemeClr val="tx1"/>
+            </a:solidFill>
+          </a:ln>
+        </p:spPr>
+        <p:style>
+          <a:lnRef idx="2">
+            <a:schemeClr val="accent1">
+              <a:shade val="50000"/>
+            </a:schemeClr>
+          </a:lnRef>
+          <a:fillRef idx="1">
+            <a:schemeClr val="accent1"/>
+          </a:fillRef>
+          <a:effectRef idx="0">
+            <a:schemeClr val="accent1"/>
+          </a:effectRef>
+          <a:fontRef idx="minor">
+            <a:schemeClr val="lt1"/>
+          </a:fontRef>
+        </p:style>
+        <p:txBody>
+          <a:bodyPr rtlCol="0" anchor="ctr"/>
+          <a:lstStyle/>
+          <a:p>
+            <a:pPr algn="ctr"/>
+            <a:r>
+              <a:rPr lang="en-US" sz="2000" b="1" dirty="0" smtClean="0">
+                <a:solidFill>
+                  <a:schemeClr val="tx1"/>
+                </a:solidFill>
+              </a:rPr>
+              <a:t>A</a:t>
+            </a:r>
+            <a:endParaRPr lang="en-US" sz="2000" b="1" dirty="0">
+              <a:solidFill>
+                <a:schemeClr val="tx1"/>
+              </a:solidFill>
+            </a:endParaRPr>
+          </a:p>
+        </p:txBody>
+      </p:sp>
       <p:pic>
         <p:nvPicPr>
-          <p:cNvPr id="2056" name="Picture 8"/>
+          <p:cNvPr id="45" name="Picture 8"/>
           <p:cNvPicPr>
             <a:picLocks noChangeAspect="1" noChangeArrowheads="1"/>
           </p:cNvPicPr>
           <p:nvPr/>
         </p:nvPicPr>
         <p:blipFill>
-          <a:blip r:embed="rId13"/>
+          <a:blip r:embed="rId11"/>
           <a:srcRect/>
           <a:stretch>
             <a:fillRect/>
@@ -5793,11 +7544,1578 @@
           <a:effectLst/>
         </p:spPr>
       </p:pic>
+      <p:sp>
+        <p:nvSpPr>
+          <p:cNvPr id="46" name="Rectangle 45"/>
+          <p:cNvSpPr/>
+          <p:nvPr/>
+        </p:nvSpPr>
+        <p:spPr>
+          <a:xfrm>
+            <a:off x="2379493" y="6488668"/>
+            <a:ext cx="4476675" cy="369332"/>
+          </a:xfrm>
+          <a:prstGeom prst="rect">
+            <a:avLst/>
+          </a:prstGeom>
+        </p:spPr>
+        <p:txBody>
+          <a:bodyPr wrap="none">
+            <a:spAutoFit/>
+          </a:bodyPr>
+          <a:lstStyle/>
+          <a:p>
+            <a:r>
+              <a:rPr lang="en-US" b="1" dirty="0" smtClean="0"/>
+              <a:t>social-</a:t>
+            </a:r>
+            <a:r>
+              <a:rPr lang="en-US" b="1" dirty="0" err="1" smtClean="0"/>
+              <a:t>bot</a:t>
+            </a:r>
+            <a:r>
+              <a:rPr lang="en-US" b="1" dirty="0" smtClean="0"/>
+              <a:t>-@</a:t>
+            </a:r>
+            <a:r>
+              <a:rPr lang="en-US" b="1" dirty="0" err="1" smtClean="0"/>
+              <a:t>frimoussethecat</a:t>
+            </a:r>
+            <a:r>
+              <a:rPr lang="en-US" b="1" dirty="0" smtClean="0"/>
+              <a:t>-post-</a:t>
+            </a:r>
+            <a:r>
+              <a:rPr lang="en-US" b="1" dirty="0" err="1" smtClean="0"/>
+              <a:t>shorts.py</a:t>
+            </a:r>
+            <a:endParaRPr lang="en-US" b="1" dirty="0"/>
+          </a:p>
+        </p:txBody>
+      </p:sp>
     </p:spTree>
   </p:cSld>
   <p:clrMapOvr>
     <a:masterClrMapping/>
   </p:clrMapOvr>
+</p:sld>
+</file>
+
+<file path=ppt/slides/slide4.xml><?xml version="1.0" encoding="utf-8"?>
+<p:sld xmlns:a="http://schemas.openxmlformats.org/drawingml/2006/main" xmlns:r="http://schemas.openxmlformats.org/officeDocument/2006/relationships" xmlns:p="http://schemas.openxmlformats.org/presentationml/2006/main">
+  <p:cSld>
+    <p:spTree>
+      <p:nvGrpSpPr>
+        <p:cNvPr id="1" name=""/>
+        <p:cNvGrpSpPr/>
+        <p:nvPr/>
+      </p:nvGrpSpPr>
+      <p:grpSpPr>
+        <a:xfrm>
+          <a:off x="0" y="0"/>
+          <a:ext cx="0" cy="0"/>
+          <a:chOff x="0" y="0"/>
+          <a:chExt cx="0" cy="0"/>
+        </a:xfrm>
+      </p:grpSpPr>
+      <p:sp>
+        <p:nvSpPr>
+          <p:cNvPr id="24" name="Rectangle 23"/>
+          <p:cNvSpPr/>
+          <p:nvPr/>
+        </p:nvSpPr>
+        <p:spPr>
+          <a:xfrm>
+            <a:off x="316873" y="2686504"/>
+            <a:ext cx="8435340" cy="3485696"/>
+          </a:xfrm>
+          <a:prstGeom prst="rect">
+            <a:avLst/>
+          </a:prstGeom>
+          <a:noFill/>
+          <a:ln>
+            <a:solidFill>
+              <a:schemeClr val="bg1">
+                <a:lumMod val="75000"/>
+              </a:schemeClr>
+            </a:solidFill>
+            <a:prstDash val="dash"/>
+          </a:ln>
+        </p:spPr>
+        <p:style>
+          <a:lnRef idx="2">
+            <a:schemeClr val="accent1">
+              <a:shade val="50000"/>
+            </a:schemeClr>
+          </a:lnRef>
+          <a:fillRef idx="1">
+            <a:schemeClr val="accent1"/>
+          </a:fillRef>
+          <a:effectRef idx="0">
+            <a:schemeClr val="accent1"/>
+          </a:effectRef>
+          <a:fontRef idx="minor">
+            <a:schemeClr val="lt1"/>
+          </a:fontRef>
+        </p:style>
+        <p:txBody>
+          <a:bodyPr rtlCol="0" anchor="t"/>
+          <a:lstStyle/>
+          <a:p>
+            <a:r>
+              <a:rPr lang="en-US" b="1" dirty="0" smtClean="0">
+                <a:solidFill>
+                  <a:schemeClr val="tx1"/>
+                </a:solidFill>
+              </a:rPr>
+              <a:t>/platform</a:t>
+            </a:r>
+            <a:endParaRPr lang="en-US" b="1" dirty="0">
+              <a:solidFill>
+                <a:schemeClr val="tx1"/>
+              </a:solidFill>
+            </a:endParaRPr>
+          </a:p>
+        </p:txBody>
+      </p:sp>
+      <p:sp>
+        <p:nvSpPr>
+          <p:cNvPr id="4" name="Rectangle 3"/>
+          <p:cNvSpPr/>
+          <p:nvPr/>
+        </p:nvSpPr>
+        <p:spPr>
+          <a:xfrm>
+            <a:off x="316873" y="1371600"/>
+            <a:ext cx="8435340" cy="1320899"/>
+          </a:xfrm>
+          <a:prstGeom prst="rect">
+            <a:avLst/>
+          </a:prstGeom>
+          <a:noFill/>
+          <a:ln>
+            <a:solidFill>
+              <a:schemeClr val="bg1">
+                <a:lumMod val="75000"/>
+              </a:schemeClr>
+            </a:solidFill>
+            <a:prstDash val="dash"/>
+          </a:ln>
+        </p:spPr>
+        <p:style>
+          <a:lnRef idx="2">
+            <a:schemeClr val="accent1">
+              <a:shade val="50000"/>
+            </a:schemeClr>
+          </a:lnRef>
+          <a:fillRef idx="1">
+            <a:schemeClr val="accent1"/>
+          </a:fillRef>
+          <a:effectRef idx="0">
+            <a:schemeClr val="accent1"/>
+          </a:effectRef>
+          <a:fontRef idx="minor">
+            <a:schemeClr val="lt1"/>
+          </a:fontRef>
+        </p:style>
+        <p:txBody>
+          <a:bodyPr rtlCol="0" anchor="t"/>
+          <a:lstStyle/>
+          <a:p>
+            <a:r>
+              <a:rPr lang="en-US" b="1" dirty="0" smtClean="0">
+                <a:solidFill>
+                  <a:schemeClr val="tx1"/>
+                </a:solidFill>
+              </a:rPr>
+              <a:t>/standalone</a:t>
+            </a:r>
+            <a:endParaRPr lang="en-US" b="1" dirty="0">
+              <a:solidFill>
+                <a:schemeClr val="tx1"/>
+              </a:solidFill>
+            </a:endParaRPr>
+          </a:p>
+        </p:txBody>
+      </p:sp>
+      <p:sp>
+        <p:nvSpPr>
+          <p:cNvPr id="5" name="Rectangle 4"/>
+          <p:cNvSpPr/>
+          <p:nvPr/>
+        </p:nvSpPr>
+        <p:spPr>
+          <a:xfrm>
+            <a:off x="304800" y="274320"/>
+            <a:ext cx="8435340" cy="1097280"/>
+          </a:xfrm>
+          <a:prstGeom prst="rect">
+            <a:avLst/>
+          </a:prstGeom>
+          <a:noFill/>
+          <a:ln>
+            <a:solidFill>
+              <a:schemeClr val="bg1">
+                <a:lumMod val="75000"/>
+              </a:schemeClr>
+            </a:solidFill>
+            <a:prstDash val="dash"/>
+          </a:ln>
+        </p:spPr>
+        <p:style>
+          <a:lnRef idx="2">
+            <a:schemeClr val="accent1">
+              <a:shade val="50000"/>
+            </a:schemeClr>
+          </a:lnRef>
+          <a:fillRef idx="1">
+            <a:schemeClr val="accent1"/>
+          </a:fillRef>
+          <a:effectRef idx="0">
+            <a:schemeClr val="accent1"/>
+          </a:effectRef>
+          <a:fontRef idx="minor">
+            <a:schemeClr val="lt1"/>
+          </a:fontRef>
+        </p:style>
+        <p:txBody>
+          <a:bodyPr rtlCol="0" anchor="t"/>
+          <a:lstStyle/>
+          <a:p>
+            <a:r>
+              <a:rPr lang="en-US" b="1" dirty="0" smtClean="0">
+                <a:solidFill>
+                  <a:schemeClr val="tx1"/>
+                </a:solidFill>
+              </a:rPr>
+              <a:t>/runtime</a:t>
+            </a:r>
+            <a:endParaRPr lang="en-US" b="1" dirty="0">
+              <a:solidFill>
+                <a:schemeClr val="tx1"/>
+              </a:solidFill>
+            </a:endParaRPr>
+          </a:p>
+        </p:txBody>
+      </p:sp>
+      <p:sp>
+        <p:nvSpPr>
+          <p:cNvPr id="7" name="Rectangle 6"/>
+          <p:cNvSpPr/>
+          <p:nvPr/>
+        </p:nvSpPr>
+        <p:spPr>
+          <a:xfrm>
+            <a:off x="1650132" y="1752600"/>
+            <a:ext cx="1931268" cy="732910"/>
+          </a:xfrm>
+          <a:prstGeom prst="rect">
+            <a:avLst/>
+          </a:prstGeom>
+        </p:spPr>
+        <p:style>
+          <a:lnRef idx="2">
+            <a:schemeClr val="accent6">
+              <a:shade val="50000"/>
+            </a:schemeClr>
+          </a:lnRef>
+          <a:fillRef idx="1">
+            <a:schemeClr val="accent6"/>
+          </a:fillRef>
+          <a:effectRef idx="0">
+            <a:schemeClr val="accent6"/>
+          </a:effectRef>
+          <a:fontRef idx="minor">
+            <a:schemeClr val="lt1"/>
+          </a:fontRef>
+        </p:style>
+        <p:txBody>
+          <a:bodyPr rtlCol="0" anchor="ctr"/>
+          <a:lstStyle/>
+          <a:p>
+            <a:pPr algn="ctr"/>
+            <a:r>
+              <a:rPr lang="en-US" b="1" dirty="0" smtClean="0">
+                <a:solidFill>
+                  <a:schemeClr val="bg1"/>
+                </a:solidFill>
+              </a:rPr>
+              <a:t>social-</a:t>
+            </a:r>
+            <a:r>
+              <a:rPr lang="en-US" b="1" dirty="0" err="1" smtClean="0">
+                <a:solidFill>
+                  <a:schemeClr val="bg1"/>
+                </a:solidFill>
+              </a:rPr>
+              <a:t>bot</a:t>
+            </a:r>
+            <a:r>
+              <a:rPr lang="en-US" b="1" dirty="0" smtClean="0">
+                <a:solidFill>
+                  <a:schemeClr val="bg1"/>
+                </a:solidFill>
+              </a:rPr>
+              <a:t>-…-post-</a:t>
+            </a:r>
+            <a:r>
+              <a:rPr lang="en-US" b="1" dirty="0" err="1" smtClean="0">
+                <a:solidFill>
+                  <a:schemeClr val="bg1"/>
+                </a:solidFill>
+              </a:rPr>
+              <a:t>pics.py</a:t>
+            </a:r>
+            <a:endParaRPr lang="en-US" b="1" dirty="0" smtClean="0">
+              <a:solidFill>
+                <a:schemeClr val="bg1"/>
+              </a:solidFill>
+            </a:endParaRPr>
+          </a:p>
+        </p:txBody>
+      </p:sp>
+      <p:sp>
+        <p:nvSpPr>
+          <p:cNvPr id="17" name="Rectangle 16"/>
+          <p:cNvSpPr/>
+          <p:nvPr/>
+        </p:nvSpPr>
+        <p:spPr>
+          <a:xfrm>
+            <a:off x="1676400" y="457200"/>
+            <a:ext cx="6553200" cy="731520"/>
+          </a:xfrm>
+          <a:prstGeom prst="rect">
+            <a:avLst/>
+          </a:prstGeom>
+        </p:spPr>
+        <p:style>
+          <a:lnRef idx="2">
+            <a:schemeClr val="accent2">
+              <a:shade val="50000"/>
+            </a:schemeClr>
+          </a:lnRef>
+          <a:fillRef idx="1">
+            <a:schemeClr val="accent2"/>
+          </a:fillRef>
+          <a:effectRef idx="0">
+            <a:schemeClr val="accent2"/>
+          </a:effectRef>
+          <a:fontRef idx="minor">
+            <a:schemeClr val="lt1"/>
+          </a:fontRef>
+        </p:style>
+        <p:txBody>
+          <a:bodyPr rtlCol="0" anchor="ctr"/>
+          <a:lstStyle/>
+          <a:p>
+            <a:pPr algn="ctr"/>
+            <a:r>
+              <a:rPr lang="en-US" b="1" dirty="0" err="1" smtClean="0">
+                <a:solidFill>
+                  <a:schemeClr val="bg1"/>
+                </a:solidFill>
+              </a:rPr>
+              <a:t>SikulixIDE</a:t>
+            </a:r>
+            <a:endParaRPr lang="en-US" b="1" dirty="0">
+              <a:solidFill>
+                <a:schemeClr val="bg1"/>
+              </a:solidFill>
+            </a:endParaRPr>
+          </a:p>
+        </p:txBody>
+      </p:sp>
+      <p:sp>
+        <p:nvSpPr>
+          <p:cNvPr id="28" name="TextBox 27"/>
+          <p:cNvSpPr txBox="1"/>
+          <p:nvPr/>
+        </p:nvSpPr>
+        <p:spPr>
+          <a:xfrm>
+            <a:off x="2518761" y="6160653"/>
+            <a:ext cx="3965170" cy="369332"/>
+          </a:xfrm>
+          <a:prstGeom prst="rect">
+            <a:avLst/>
+          </a:prstGeom>
+          <a:noFill/>
+        </p:spPr>
+        <p:txBody>
+          <a:bodyPr wrap="square" rtlCol="0">
+            <a:spAutoFit/>
+          </a:bodyPr>
+          <a:lstStyle/>
+          <a:p>
+            <a:pPr algn="ctr"/>
+            <a:r>
+              <a:rPr lang="en-US" b="1" dirty="0" smtClean="0">
+                <a:solidFill>
+                  <a:schemeClr val="bg1"/>
+                </a:solidFill>
+              </a:rPr>
+              <a:t>Components Diagram</a:t>
+            </a:r>
+            <a:endParaRPr lang="en-US" b="1" dirty="0">
+              <a:solidFill>
+                <a:schemeClr val="bg1"/>
+              </a:solidFill>
+            </a:endParaRPr>
+          </a:p>
+        </p:txBody>
+      </p:sp>
+      <p:sp>
+        <p:nvSpPr>
+          <p:cNvPr id="41" name="Rectangle 40"/>
+          <p:cNvSpPr/>
+          <p:nvPr/>
+        </p:nvSpPr>
+        <p:spPr>
+          <a:xfrm>
+            <a:off x="609599" y="4800600"/>
+            <a:ext cx="7924801" cy="1143000"/>
+          </a:xfrm>
+          <a:prstGeom prst="rect">
+            <a:avLst/>
+          </a:prstGeom>
+          <a:noFill/>
+          <a:ln>
+            <a:solidFill>
+              <a:schemeClr val="bg1">
+                <a:lumMod val="75000"/>
+              </a:schemeClr>
+            </a:solidFill>
+            <a:prstDash val="dash"/>
+          </a:ln>
+        </p:spPr>
+        <p:style>
+          <a:lnRef idx="2">
+            <a:schemeClr val="accent1">
+              <a:shade val="50000"/>
+            </a:schemeClr>
+          </a:lnRef>
+          <a:fillRef idx="1">
+            <a:schemeClr val="accent1"/>
+          </a:fillRef>
+          <a:effectRef idx="0">
+            <a:schemeClr val="accent1"/>
+          </a:effectRef>
+          <a:fontRef idx="minor">
+            <a:schemeClr val="lt1"/>
+          </a:fontRef>
+        </p:style>
+        <p:txBody>
+          <a:bodyPr rtlCol="0" anchor="t"/>
+          <a:lstStyle/>
+          <a:p>
+            <a:r>
+              <a:rPr lang="en-US" b="1" dirty="0" smtClean="0">
+                <a:solidFill>
+                  <a:schemeClr val="tx1"/>
+                </a:solidFill>
+              </a:rPr>
+              <a:t>/ platform/*.</a:t>
+            </a:r>
+            <a:r>
+              <a:rPr lang="en-US" b="1" dirty="0" err="1" smtClean="0">
+                <a:solidFill>
+                  <a:schemeClr val="tx1"/>
+                </a:solidFill>
+              </a:rPr>
+              <a:t>sikuli</a:t>
+            </a:r>
+            <a:r>
+              <a:rPr lang="en-US" b="1" dirty="0" smtClean="0">
+                <a:solidFill>
+                  <a:schemeClr val="tx1"/>
+                </a:solidFill>
+              </a:rPr>
+              <a:t>/*</a:t>
+            </a:r>
+            <a:endParaRPr lang="en-US" b="1" dirty="0">
+              <a:solidFill>
+                <a:schemeClr val="tx1"/>
+              </a:solidFill>
+            </a:endParaRPr>
+          </a:p>
+        </p:txBody>
+      </p:sp>
+      <p:sp>
+        <p:nvSpPr>
+          <p:cNvPr id="36" name="Rectangle 35"/>
+          <p:cNvSpPr/>
+          <p:nvPr/>
+        </p:nvSpPr>
+        <p:spPr>
+          <a:xfrm>
+            <a:off x="2196780" y="5257800"/>
+            <a:ext cx="1689420" cy="471839"/>
+          </a:xfrm>
+          <a:prstGeom prst="rect">
+            <a:avLst/>
+          </a:prstGeom>
+        </p:spPr>
+        <p:style>
+          <a:lnRef idx="2">
+            <a:schemeClr val="accent2">
+              <a:shade val="50000"/>
+            </a:schemeClr>
+          </a:lnRef>
+          <a:fillRef idx="1">
+            <a:schemeClr val="accent2"/>
+          </a:fillRef>
+          <a:effectRef idx="0">
+            <a:schemeClr val="accent2"/>
+          </a:effectRef>
+          <a:fontRef idx="minor">
+            <a:schemeClr val="lt1"/>
+          </a:fontRef>
+        </p:style>
+        <p:txBody>
+          <a:bodyPr rtlCol="0" anchor="ctr"/>
+          <a:lstStyle/>
+          <a:p>
+            <a:pPr algn="ctr"/>
+            <a:r>
+              <a:rPr lang="en-US" sz="1600" b="1" dirty="0" smtClean="0">
+                <a:solidFill>
+                  <a:schemeClr val="bg1"/>
+                </a:solidFill>
+              </a:rPr>
+              <a:t>win-run-btn.png</a:t>
+            </a:r>
+            <a:endParaRPr lang="en-US" b="1" dirty="0">
+              <a:solidFill>
+                <a:schemeClr val="bg1"/>
+              </a:solidFill>
+            </a:endParaRPr>
+          </a:p>
+        </p:txBody>
+      </p:sp>
+      <p:sp>
+        <p:nvSpPr>
+          <p:cNvPr id="39" name="Rectangle 38"/>
+          <p:cNvSpPr/>
+          <p:nvPr/>
+        </p:nvSpPr>
+        <p:spPr>
+          <a:xfrm>
+            <a:off x="4648200" y="2971800"/>
+            <a:ext cx="1371600" cy="731520"/>
+          </a:xfrm>
+          <a:prstGeom prst="rect">
+            <a:avLst/>
+          </a:prstGeom>
+        </p:spPr>
+        <p:style>
+          <a:lnRef idx="2">
+            <a:schemeClr val="accent1">
+              <a:shade val="50000"/>
+            </a:schemeClr>
+          </a:lnRef>
+          <a:fillRef idx="1">
+            <a:schemeClr val="accent1"/>
+          </a:fillRef>
+          <a:effectRef idx="0">
+            <a:schemeClr val="accent1"/>
+          </a:effectRef>
+          <a:fontRef idx="minor">
+            <a:schemeClr val="lt1"/>
+          </a:fontRef>
+        </p:style>
+        <p:txBody>
+          <a:bodyPr rtlCol="0" anchor="ctr"/>
+          <a:lstStyle/>
+          <a:p>
+            <a:pPr algn="ctr"/>
+            <a:r>
+              <a:rPr lang="en-US" sz="1600" b="1" dirty="0" err="1" smtClean="0">
+                <a:solidFill>
+                  <a:schemeClr val="bg1"/>
+                </a:solidFill>
+              </a:rPr>
+              <a:t>tw</a:t>
+            </a:r>
+            <a:r>
+              <a:rPr lang="en-US" sz="1600" b="1" dirty="0" smtClean="0">
+                <a:solidFill>
+                  <a:schemeClr val="bg1"/>
+                </a:solidFill>
+              </a:rPr>
+              <a:t>-post-</a:t>
+            </a:r>
+            <a:r>
+              <a:rPr lang="en-US" sz="1600" b="1" dirty="0" err="1" smtClean="0">
+                <a:solidFill>
+                  <a:schemeClr val="bg1"/>
+                </a:solidFill>
+              </a:rPr>
+              <a:t>pic</a:t>
+            </a:r>
+            <a:endParaRPr lang="en-US" sz="1600" b="1" dirty="0">
+              <a:solidFill>
+                <a:schemeClr val="bg1"/>
+              </a:solidFill>
+            </a:endParaRPr>
+          </a:p>
+        </p:txBody>
+      </p:sp>
+      <p:sp>
+        <p:nvSpPr>
+          <p:cNvPr id="31" name="Rectangle 30"/>
+          <p:cNvSpPr/>
+          <p:nvPr/>
+        </p:nvSpPr>
+        <p:spPr>
+          <a:xfrm>
+            <a:off x="3974232" y="1752600"/>
+            <a:ext cx="1931268" cy="732910"/>
+          </a:xfrm>
+          <a:prstGeom prst="rect">
+            <a:avLst/>
+          </a:prstGeom>
+        </p:spPr>
+        <p:style>
+          <a:lnRef idx="2">
+            <a:schemeClr val="accent6">
+              <a:shade val="50000"/>
+            </a:schemeClr>
+          </a:lnRef>
+          <a:fillRef idx="1">
+            <a:schemeClr val="accent6"/>
+          </a:fillRef>
+          <a:effectRef idx="0">
+            <a:schemeClr val="accent6"/>
+          </a:effectRef>
+          <a:fontRef idx="minor">
+            <a:schemeClr val="lt1"/>
+          </a:fontRef>
+        </p:style>
+        <p:txBody>
+          <a:bodyPr rtlCol="0" anchor="ctr"/>
+          <a:lstStyle/>
+          <a:p>
+            <a:pPr algn="ctr"/>
+            <a:r>
+              <a:rPr lang="en-US" b="1" dirty="0" smtClean="0">
+                <a:solidFill>
+                  <a:schemeClr val="bg1"/>
+                </a:solidFill>
+              </a:rPr>
+              <a:t>social-</a:t>
+            </a:r>
+            <a:r>
+              <a:rPr lang="en-US" b="1" dirty="0" err="1" smtClean="0">
+                <a:solidFill>
+                  <a:schemeClr val="bg1"/>
+                </a:solidFill>
+              </a:rPr>
+              <a:t>bot</a:t>
+            </a:r>
+            <a:r>
+              <a:rPr lang="en-US" b="1" dirty="0" smtClean="0">
+                <a:solidFill>
+                  <a:schemeClr val="bg1"/>
+                </a:solidFill>
+              </a:rPr>
+              <a:t>-…-post-</a:t>
+            </a:r>
+            <a:r>
+              <a:rPr lang="en-US" b="1" dirty="0" err="1" smtClean="0">
+                <a:solidFill>
+                  <a:schemeClr val="bg1"/>
+                </a:solidFill>
+              </a:rPr>
+              <a:t>vids.py</a:t>
+            </a:r>
+            <a:endParaRPr lang="en-US" b="1" dirty="0" smtClean="0">
+              <a:solidFill>
+                <a:schemeClr val="bg1"/>
+              </a:solidFill>
+            </a:endParaRPr>
+          </a:p>
+        </p:txBody>
+      </p:sp>
+      <p:sp>
+        <p:nvSpPr>
+          <p:cNvPr id="43" name="Rectangle 42"/>
+          <p:cNvSpPr/>
+          <p:nvPr/>
+        </p:nvSpPr>
+        <p:spPr>
+          <a:xfrm>
+            <a:off x="6298332" y="1752600"/>
+            <a:ext cx="1931268" cy="732910"/>
+          </a:xfrm>
+          <a:prstGeom prst="rect">
+            <a:avLst/>
+          </a:prstGeom>
+        </p:spPr>
+        <p:style>
+          <a:lnRef idx="2">
+            <a:schemeClr val="accent6">
+              <a:shade val="50000"/>
+            </a:schemeClr>
+          </a:lnRef>
+          <a:fillRef idx="1">
+            <a:schemeClr val="accent6"/>
+          </a:fillRef>
+          <a:effectRef idx="0">
+            <a:schemeClr val="accent6"/>
+          </a:effectRef>
+          <a:fontRef idx="minor">
+            <a:schemeClr val="lt1"/>
+          </a:fontRef>
+        </p:style>
+        <p:txBody>
+          <a:bodyPr rtlCol="0" anchor="ctr"/>
+          <a:lstStyle/>
+          <a:p>
+            <a:pPr algn="ctr"/>
+            <a:r>
+              <a:rPr lang="en-US" b="1" dirty="0" smtClean="0">
+                <a:solidFill>
+                  <a:schemeClr val="bg1"/>
+                </a:solidFill>
+              </a:rPr>
+              <a:t>social-</a:t>
+            </a:r>
+            <a:r>
+              <a:rPr lang="en-US" b="1" dirty="0" err="1" smtClean="0">
+                <a:solidFill>
+                  <a:schemeClr val="bg1"/>
+                </a:solidFill>
+              </a:rPr>
+              <a:t>bot</a:t>
+            </a:r>
+            <a:r>
+              <a:rPr lang="en-US" b="1" dirty="0" smtClean="0">
+                <a:solidFill>
+                  <a:schemeClr val="bg1"/>
+                </a:solidFill>
+              </a:rPr>
+              <a:t>-…-post-</a:t>
+            </a:r>
+            <a:r>
+              <a:rPr lang="en-US" b="1" dirty="0" err="1" smtClean="0">
+                <a:solidFill>
+                  <a:schemeClr val="bg1"/>
+                </a:solidFill>
+              </a:rPr>
+              <a:t>shorts.py</a:t>
+            </a:r>
+            <a:endParaRPr lang="en-US" b="1" dirty="0" smtClean="0">
+              <a:solidFill>
+                <a:schemeClr val="bg1"/>
+              </a:solidFill>
+            </a:endParaRPr>
+          </a:p>
+        </p:txBody>
+      </p:sp>
+      <p:sp>
+        <p:nvSpPr>
+          <p:cNvPr id="46" name="Rectangle 45"/>
+          <p:cNvSpPr/>
+          <p:nvPr/>
+        </p:nvSpPr>
+        <p:spPr>
+          <a:xfrm>
+            <a:off x="1676400" y="3825240"/>
+            <a:ext cx="1341120" cy="731520"/>
+          </a:xfrm>
+          <a:prstGeom prst="rect">
+            <a:avLst/>
+          </a:prstGeom>
+        </p:spPr>
+        <p:style>
+          <a:lnRef idx="2">
+            <a:schemeClr val="accent1">
+              <a:shade val="50000"/>
+            </a:schemeClr>
+          </a:lnRef>
+          <a:fillRef idx="1">
+            <a:schemeClr val="accent1"/>
+          </a:fillRef>
+          <a:effectRef idx="0">
+            <a:schemeClr val="accent1"/>
+          </a:effectRef>
+          <a:fontRef idx="minor">
+            <a:schemeClr val="lt1"/>
+          </a:fontRef>
+        </p:style>
+        <p:txBody>
+          <a:bodyPr rtlCol="0" anchor="ctr"/>
+          <a:lstStyle/>
+          <a:p>
+            <a:pPr algn="ctr"/>
+            <a:r>
+              <a:rPr lang="en-US" sz="1600" b="1" dirty="0" smtClean="0">
+                <a:solidFill>
+                  <a:schemeClr val="bg1"/>
+                </a:solidFill>
+              </a:rPr>
+              <a:t>file-upload</a:t>
+            </a:r>
+            <a:endParaRPr lang="en-US" sz="1600" b="1" dirty="0">
+              <a:solidFill>
+                <a:schemeClr val="bg1"/>
+              </a:solidFill>
+            </a:endParaRPr>
+          </a:p>
+        </p:txBody>
+      </p:sp>
+      <p:sp>
+        <p:nvSpPr>
+          <p:cNvPr id="47" name="Rectangle 46"/>
+          <p:cNvSpPr/>
+          <p:nvPr/>
+        </p:nvSpPr>
+        <p:spPr>
+          <a:xfrm>
+            <a:off x="6172200" y="3825240"/>
+            <a:ext cx="1318260" cy="731520"/>
+          </a:xfrm>
+          <a:prstGeom prst="rect">
+            <a:avLst/>
+          </a:prstGeom>
+        </p:spPr>
+        <p:style>
+          <a:lnRef idx="2">
+            <a:schemeClr val="accent1">
+              <a:shade val="50000"/>
+            </a:schemeClr>
+          </a:lnRef>
+          <a:fillRef idx="1">
+            <a:schemeClr val="accent1"/>
+          </a:fillRef>
+          <a:effectRef idx="0">
+            <a:schemeClr val="accent1"/>
+          </a:effectRef>
+          <a:fontRef idx="minor">
+            <a:schemeClr val="lt1"/>
+          </a:fontRef>
+        </p:style>
+        <p:txBody>
+          <a:bodyPr rtlCol="0" anchor="ctr"/>
+          <a:lstStyle/>
+          <a:p>
+            <a:pPr algn="ctr"/>
+            <a:r>
+              <a:rPr lang="en-US" sz="1600" b="1" dirty="0" err="1" smtClean="0">
+                <a:solidFill>
+                  <a:schemeClr val="bg1"/>
+                </a:solidFill>
+              </a:rPr>
+              <a:t>fb</a:t>
+            </a:r>
+            <a:r>
+              <a:rPr lang="en-US" sz="1600" b="1" dirty="0" smtClean="0">
+                <a:solidFill>
+                  <a:schemeClr val="bg1"/>
+                </a:solidFill>
+              </a:rPr>
+              <a:t>-post-</a:t>
+            </a:r>
+            <a:r>
+              <a:rPr lang="en-US" sz="1600" b="1" dirty="0" err="1" smtClean="0">
+                <a:solidFill>
+                  <a:schemeClr val="bg1"/>
+                </a:solidFill>
+              </a:rPr>
+              <a:t>vid</a:t>
+            </a:r>
+            <a:endParaRPr lang="en-US" sz="1600" b="1" dirty="0">
+              <a:solidFill>
+                <a:schemeClr val="bg1"/>
+              </a:solidFill>
+            </a:endParaRPr>
+          </a:p>
+        </p:txBody>
+      </p:sp>
+      <p:sp>
+        <p:nvSpPr>
+          <p:cNvPr id="48" name="Rectangle 47"/>
+          <p:cNvSpPr/>
+          <p:nvPr/>
+        </p:nvSpPr>
+        <p:spPr>
+          <a:xfrm>
+            <a:off x="1676400" y="2971800"/>
+            <a:ext cx="1341120" cy="731520"/>
+          </a:xfrm>
+          <a:prstGeom prst="rect">
+            <a:avLst/>
+          </a:prstGeom>
+        </p:spPr>
+        <p:style>
+          <a:lnRef idx="2">
+            <a:schemeClr val="accent1">
+              <a:shade val="50000"/>
+            </a:schemeClr>
+          </a:lnRef>
+          <a:fillRef idx="1">
+            <a:schemeClr val="accent1"/>
+          </a:fillRef>
+          <a:effectRef idx="0">
+            <a:schemeClr val="accent1"/>
+          </a:effectRef>
+          <a:fontRef idx="minor">
+            <a:schemeClr val="lt1"/>
+          </a:fontRef>
+        </p:style>
+        <p:txBody>
+          <a:bodyPr rtlCol="0" anchor="ctr"/>
+          <a:lstStyle/>
+          <a:p>
+            <a:pPr algn="ctr"/>
+            <a:r>
+              <a:rPr lang="en-US" sz="1600" b="1" dirty="0" smtClean="0">
+                <a:solidFill>
+                  <a:schemeClr val="bg1"/>
+                </a:solidFill>
+              </a:rPr>
+              <a:t>app-start</a:t>
+            </a:r>
+            <a:endParaRPr lang="en-US" sz="1600" b="1" dirty="0">
+              <a:solidFill>
+                <a:schemeClr val="bg1"/>
+              </a:solidFill>
+            </a:endParaRPr>
+          </a:p>
+        </p:txBody>
+      </p:sp>
+      <p:sp>
+        <p:nvSpPr>
+          <p:cNvPr id="49" name="Rectangle 48"/>
+          <p:cNvSpPr/>
+          <p:nvPr/>
+        </p:nvSpPr>
+        <p:spPr>
+          <a:xfrm>
+            <a:off x="6172200" y="2971800"/>
+            <a:ext cx="1318260" cy="731520"/>
+          </a:xfrm>
+          <a:prstGeom prst="rect">
+            <a:avLst/>
+          </a:prstGeom>
+        </p:spPr>
+        <p:style>
+          <a:lnRef idx="2">
+            <a:schemeClr val="accent1">
+              <a:shade val="50000"/>
+            </a:schemeClr>
+          </a:lnRef>
+          <a:fillRef idx="1">
+            <a:schemeClr val="accent1"/>
+          </a:fillRef>
+          <a:effectRef idx="0">
+            <a:schemeClr val="accent1"/>
+          </a:effectRef>
+          <a:fontRef idx="minor">
+            <a:schemeClr val="lt1"/>
+          </a:fontRef>
+        </p:style>
+        <p:txBody>
+          <a:bodyPr rtlCol="0" anchor="ctr"/>
+          <a:lstStyle/>
+          <a:p>
+            <a:pPr algn="ctr"/>
+            <a:r>
+              <a:rPr lang="en-US" sz="1600" b="1" dirty="0" err="1" smtClean="0">
+                <a:solidFill>
+                  <a:schemeClr val="bg1"/>
+                </a:solidFill>
+              </a:rPr>
+              <a:t>fb</a:t>
+            </a:r>
+            <a:r>
+              <a:rPr lang="en-US" sz="1600" b="1" dirty="0" smtClean="0">
+                <a:solidFill>
+                  <a:schemeClr val="bg1"/>
+                </a:solidFill>
+              </a:rPr>
+              <a:t>-post-</a:t>
+            </a:r>
+            <a:r>
+              <a:rPr lang="en-US" sz="1600" b="1" dirty="0" err="1" smtClean="0">
+                <a:solidFill>
+                  <a:schemeClr val="bg1"/>
+                </a:solidFill>
+              </a:rPr>
+              <a:t>pic</a:t>
+            </a:r>
+            <a:endParaRPr lang="en-US" sz="1600" b="1" dirty="0">
+              <a:solidFill>
+                <a:schemeClr val="bg1"/>
+              </a:solidFill>
+            </a:endParaRPr>
+          </a:p>
+        </p:txBody>
+      </p:sp>
+      <p:sp>
+        <p:nvSpPr>
+          <p:cNvPr id="50" name="Rectangle 49"/>
+          <p:cNvSpPr/>
+          <p:nvPr/>
+        </p:nvSpPr>
+        <p:spPr>
+          <a:xfrm>
+            <a:off x="4648200" y="3825240"/>
+            <a:ext cx="1371600" cy="731520"/>
+          </a:xfrm>
+          <a:prstGeom prst="rect">
+            <a:avLst/>
+          </a:prstGeom>
+        </p:spPr>
+        <p:style>
+          <a:lnRef idx="2">
+            <a:schemeClr val="accent1">
+              <a:shade val="50000"/>
+            </a:schemeClr>
+          </a:lnRef>
+          <a:fillRef idx="1">
+            <a:schemeClr val="accent1"/>
+          </a:fillRef>
+          <a:effectRef idx="0">
+            <a:schemeClr val="accent1"/>
+          </a:effectRef>
+          <a:fontRef idx="minor">
+            <a:schemeClr val="lt1"/>
+          </a:fontRef>
+        </p:style>
+        <p:txBody>
+          <a:bodyPr rtlCol="0" anchor="ctr"/>
+          <a:lstStyle/>
+          <a:p>
+            <a:pPr algn="ctr"/>
+            <a:r>
+              <a:rPr lang="en-US" sz="1600" b="1" dirty="0" err="1" smtClean="0">
+                <a:solidFill>
+                  <a:schemeClr val="bg1"/>
+                </a:solidFill>
+              </a:rPr>
+              <a:t>tw</a:t>
+            </a:r>
+            <a:r>
+              <a:rPr lang="en-US" sz="1600" b="1" dirty="0" smtClean="0">
+                <a:solidFill>
+                  <a:schemeClr val="bg1"/>
+                </a:solidFill>
+              </a:rPr>
+              <a:t>-post-</a:t>
+            </a:r>
+            <a:r>
+              <a:rPr lang="en-US" sz="1600" b="1" dirty="0" err="1" smtClean="0">
+                <a:solidFill>
+                  <a:schemeClr val="bg1"/>
+                </a:solidFill>
+              </a:rPr>
+              <a:t>vid</a:t>
+            </a:r>
+            <a:endParaRPr lang="en-US" sz="1600" b="1" dirty="0">
+              <a:solidFill>
+                <a:schemeClr val="bg1"/>
+              </a:solidFill>
+            </a:endParaRPr>
+          </a:p>
+        </p:txBody>
+      </p:sp>
+      <p:sp>
+        <p:nvSpPr>
+          <p:cNvPr id="51" name="Rectangle 50"/>
+          <p:cNvSpPr/>
+          <p:nvPr/>
+        </p:nvSpPr>
+        <p:spPr>
+          <a:xfrm>
+            <a:off x="3124200" y="2971800"/>
+            <a:ext cx="1371600" cy="731520"/>
+          </a:xfrm>
+          <a:prstGeom prst="rect">
+            <a:avLst/>
+          </a:prstGeom>
+        </p:spPr>
+        <p:style>
+          <a:lnRef idx="2">
+            <a:schemeClr val="accent1">
+              <a:shade val="50000"/>
+            </a:schemeClr>
+          </a:lnRef>
+          <a:fillRef idx="1">
+            <a:schemeClr val="accent1"/>
+          </a:fillRef>
+          <a:effectRef idx="0">
+            <a:schemeClr val="accent1"/>
+          </a:effectRef>
+          <a:fontRef idx="minor">
+            <a:schemeClr val="lt1"/>
+          </a:fontRef>
+        </p:style>
+        <p:txBody>
+          <a:bodyPr rtlCol="0" anchor="ctr"/>
+          <a:lstStyle/>
+          <a:p>
+            <a:pPr algn="ctr"/>
+            <a:r>
+              <a:rPr lang="en-US" sz="1600" b="1" dirty="0" err="1" smtClean="0">
+                <a:solidFill>
+                  <a:schemeClr val="bg1"/>
+                </a:solidFill>
+              </a:rPr>
+              <a:t>insta</a:t>
+            </a:r>
+            <a:r>
+              <a:rPr lang="en-US" sz="1600" b="1" dirty="0" smtClean="0">
+                <a:solidFill>
+                  <a:schemeClr val="bg1"/>
+                </a:solidFill>
+              </a:rPr>
+              <a:t>-post-</a:t>
+            </a:r>
+            <a:r>
+              <a:rPr lang="en-US" sz="1600" b="1" dirty="0" err="1" smtClean="0">
+                <a:solidFill>
+                  <a:schemeClr val="bg1"/>
+                </a:solidFill>
+              </a:rPr>
+              <a:t>pic</a:t>
+            </a:r>
+            <a:endParaRPr lang="en-US" sz="1600" b="1" dirty="0">
+              <a:solidFill>
+                <a:schemeClr val="bg1"/>
+              </a:solidFill>
+            </a:endParaRPr>
+          </a:p>
+        </p:txBody>
+      </p:sp>
+      <p:sp>
+        <p:nvSpPr>
+          <p:cNvPr id="52" name="Rectangle 51"/>
+          <p:cNvSpPr/>
+          <p:nvPr/>
+        </p:nvSpPr>
+        <p:spPr>
+          <a:xfrm>
+            <a:off x="7597140" y="2971800"/>
+            <a:ext cx="632460" cy="731520"/>
+          </a:xfrm>
+          <a:prstGeom prst="rect">
+            <a:avLst/>
+          </a:prstGeom>
+        </p:spPr>
+        <p:style>
+          <a:lnRef idx="2">
+            <a:schemeClr val="accent1">
+              <a:shade val="50000"/>
+            </a:schemeClr>
+          </a:lnRef>
+          <a:fillRef idx="1">
+            <a:schemeClr val="accent1"/>
+          </a:fillRef>
+          <a:effectRef idx="0">
+            <a:schemeClr val="accent1"/>
+          </a:effectRef>
+          <a:fontRef idx="minor">
+            <a:schemeClr val="lt1"/>
+          </a:fontRef>
+        </p:style>
+        <p:txBody>
+          <a:bodyPr rtlCol="0" anchor="ctr"/>
+          <a:lstStyle/>
+          <a:p>
+            <a:pPr algn="ctr"/>
+            <a:r>
+              <a:rPr lang="en-US" sz="1600" b="1" dirty="0" smtClean="0">
+                <a:solidFill>
+                  <a:schemeClr val="bg1"/>
+                </a:solidFill>
+              </a:rPr>
+              <a:t>…</a:t>
+            </a:r>
+            <a:endParaRPr lang="en-US" sz="1600" b="1" dirty="0">
+              <a:solidFill>
+                <a:schemeClr val="bg1"/>
+              </a:solidFill>
+            </a:endParaRPr>
+          </a:p>
+        </p:txBody>
+      </p:sp>
+      <p:sp>
+        <p:nvSpPr>
+          <p:cNvPr id="53" name="Rectangle 52"/>
+          <p:cNvSpPr/>
+          <p:nvPr/>
+        </p:nvSpPr>
+        <p:spPr>
+          <a:xfrm>
+            <a:off x="7597140" y="3810000"/>
+            <a:ext cx="632460" cy="731520"/>
+          </a:xfrm>
+          <a:prstGeom prst="rect">
+            <a:avLst/>
+          </a:prstGeom>
+        </p:spPr>
+        <p:style>
+          <a:lnRef idx="2">
+            <a:schemeClr val="accent1">
+              <a:shade val="50000"/>
+            </a:schemeClr>
+          </a:lnRef>
+          <a:fillRef idx="1">
+            <a:schemeClr val="accent1"/>
+          </a:fillRef>
+          <a:effectRef idx="0">
+            <a:schemeClr val="accent1"/>
+          </a:effectRef>
+          <a:fontRef idx="minor">
+            <a:schemeClr val="lt1"/>
+          </a:fontRef>
+        </p:style>
+        <p:txBody>
+          <a:bodyPr rtlCol="0" anchor="ctr"/>
+          <a:lstStyle/>
+          <a:p>
+            <a:pPr algn="ctr"/>
+            <a:r>
+              <a:rPr lang="en-US" sz="1600" b="1" dirty="0" smtClean="0">
+                <a:solidFill>
+                  <a:schemeClr val="bg1"/>
+                </a:solidFill>
+              </a:rPr>
+              <a:t>…</a:t>
+            </a:r>
+            <a:endParaRPr lang="en-US" sz="1600" b="1" dirty="0">
+              <a:solidFill>
+                <a:schemeClr val="bg1"/>
+              </a:solidFill>
+            </a:endParaRPr>
+          </a:p>
+        </p:txBody>
+      </p:sp>
+      <p:sp>
+        <p:nvSpPr>
+          <p:cNvPr id="54" name="Flèche vers le bas 53"/>
+          <p:cNvSpPr/>
+          <p:nvPr/>
+        </p:nvSpPr>
+        <p:spPr>
+          <a:xfrm>
+            <a:off x="4648200" y="1219200"/>
+            <a:ext cx="381000" cy="304800"/>
+          </a:xfrm>
+          <a:prstGeom prst="downArrow">
+            <a:avLst/>
+          </a:prstGeom>
+          <a:solidFill>
+            <a:schemeClr val="bg1">
+              <a:lumMod val="50000"/>
+            </a:schemeClr>
+          </a:solidFill>
+          <a:ln>
+            <a:noFill/>
+          </a:ln>
+        </p:spPr>
+        <p:style>
+          <a:lnRef idx="1">
+            <a:schemeClr val="dk1"/>
+          </a:lnRef>
+          <a:fillRef idx="2">
+            <a:schemeClr val="dk1"/>
+          </a:fillRef>
+          <a:effectRef idx="1">
+            <a:schemeClr val="dk1"/>
+          </a:effectRef>
+          <a:fontRef idx="minor">
+            <a:schemeClr val="dk1"/>
+          </a:fontRef>
+        </p:style>
+        <p:txBody>
+          <a:bodyPr rtlCol="0" anchor="ctr"/>
+          <a:lstStyle/>
+          <a:p>
+            <a:pPr algn="ctr"/>
+            <a:endParaRPr lang="en-US" b="1">
+              <a:solidFill>
+                <a:schemeClr val="bg1"/>
+              </a:solidFill>
+            </a:endParaRPr>
+          </a:p>
+        </p:txBody>
+      </p:sp>
+      <p:sp>
+        <p:nvSpPr>
+          <p:cNvPr id="55" name="Flèche vers le bas 54"/>
+          <p:cNvSpPr/>
+          <p:nvPr/>
+        </p:nvSpPr>
+        <p:spPr>
+          <a:xfrm>
+            <a:off x="4648200" y="2514600"/>
+            <a:ext cx="381000" cy="304800"/>
+          </a:xfrm>
+          <a:prstGeom prst="downArrow">
+            <a:avLst/>
+          </a:prstGeom>
+          <a:solidFill>
+            <a:schemeClr val="bg1">
+              <a:lumMod val="50000"/>
+            </a:schemeClr>
+          </a:solidFill>
+          <a:ln>
+            <a:noFill/>
+          </a:ln>
+        </p:spPr>
+        <p:style>
+          <a:lnRef idx="1">
+            <a:schemeClr val="dk1"/>
+          </a:lnRef>
+          <a:fillRef idx="2">
+            <a:schemeClr val="dk1"/>
+          </a:fillRef>
+          <a:effectRef idx="1">
+            <a:schemeClr val="dk1"/>
+          </a:effectRef>
+          <a:fontRef idx="minor">
+            <a:schemeClr val="dk1"/>
+          </a:fontRef>
+        </p:style>
+        <p:txBody>
+          <a:bodyPr rtlCol="0" anchor="ctr"/>
+          <a:lstStyle/>
+          <a:p>
+            <a:pPr algn="ctr"/>
+            <a:endParaRPr lang="en-US" b="1">
+              <a:solidFill>
+                <a:schemeClr val="bg1"/>
+              </a:solidFill>
+            </a:endParaRPr>
+          </a:p>
+        </p:txBody>
+      </p:sp>
+      <p:sp>
+        <p:nvSpPr>
+          <p:cNvPr id="56" name="Flèche vers le bas 55"/>
+          <p:cNvSpPr/>
+          <p:nvPr/>
+        </p:nvSpPr>
+        <p:spPr>
+          <a:xfrm>
+            <a:off x="4648200" y="4648200"/>
+            <a:ext cx="381000" cy="304800"/>
+          </a:xfrm>
+          <a:prstGeom prst="downArrow">
+            <a:avLst/>
+          </a:prstGeom>
+          <a:solidFill>
+            <a:schemeClr val="bg1">
+              <a:lumMod val="50000"/>
+            </a:schemeClr>
+          </a:solidFill>
+          <a:ln>
+            <a:noFill/>
+          </a:ln>
+        </p:spPr>
+        <p:style>
+          <a:lnRef idx="1">
+            <a:schemeClr val="dk1"/>
+          </a:lnRef>
+          <a:fillRef idx="2">
+            <a:schemeClr val="dk1"/>
+          </a:fillRef>
+          <a:effectRef idx="1">
+            <a:schemeClr val="dk1"/>
+          </a:effectRef>
+          <a:fontRef idx="minor">
+            <a:schemeClr val="dk1"/>
+          </a:fontRef>
+        </p:style>
+        <p:txBody>
+          <a:bodyPr rtlCol="0" anchor="ctr"/>
+          <a:lstStyle/>
+          <a:p>
+            <a:pPr algn="ctr"/>
+            <a:endParaRPr lang="en-US" b="1">
+              <a:solidFill>
+                <a:schemeClr val="bg1"/>
+              </a:solidFill>
+            </a:endParaRPr>
+          </a:p>
+        </p:txBody>
+      </p:sp>
+      <p:sp>
+        <p:nvSpPr>
+          <p:cNvPr id="60" name="Rectangle 59"/>
+          <p:cNvSpPr/>
+          <p:nvPr/>
+        </p:nvSpPr>
+        <p:spPr>
+          <a:xfrm>
+            <a:off x="4025580" y="5257800"/>
+            <a:ext cx="1689420" cy="471839"/>
+          </a:xfrm>
+          <a:prstGeom prst="rect">
+            <a:avLst/>
+          </a:prstGeom>
+        </p:spPr>
+        <p:style>
+          <a:lnRef idx="2">
+            <a:schemeClr val="accent2">
+              <a:shade val="50000"/>
+            </a:schemeClr>
+          </a:lnRef>
+          <a:fillRef idx="1">
+            <a:schemeClr val="accent2"/>
+          </a:fillRef>
+          <a:effectRef idx="0">
+            <a:schemeClr val="accent2"/>
+          </a:effectRef>
+          <a:fontRef idx="minor">
+            <a:schemeClr val="lt1"/>
+          </a:fontRef>
+        </p:style>
+        <p:txBody>
+          <a:bodyPr rtlCol="0" anchor="ctr"/>
+          <a:lstStyle/>
+          <a:p>
+            <a:pPr algn="ctr"/>
+            <a:r>
+              <a:rPr lang="en-US" sz="1600" b="1" dirty="0" smtClean="0">
+                <a:solidFill>
+                  <a:schemeClr val="bg1"/>
+                </a:solidFill>
+              </a:rPr>
+              <a:t>fb-post-btn.png</a:t>
+            </a:r>
+            <a:endParaRPr lang="en-US" b="1" dirty="0">
+              <a:solidFill>
+                <a:schemeClr val="bg1"/>
+              </a:solidFill>
+            </a:endParaRPr>
+          </a:p>
+        </p:txBody>
+      </p:sp>
+      <p:sp>
+        <p:nvSpPr>
+          <p:cNvPr id="61" name="Rectangle 60"/>
+          <p:cNvSpPr/>
+          <p:nvPr/>
+        </p:nvSpPr>
+        <p:spPr>
+          <a:xfrm>
+            <a:off x="5791200" y="5257800"/>
+            <a:ext cx="1689420" cy="471839"/>
+          </a:xfrm>
+          <a:prstGeom prst="rect">
+            <a:avLst/>
+          </a:prstGeom>
+        </p:spPr>
+        <p:style>
+          <a:lnRef idx="2">
+            <a:schemeClr val="accent2">
+              <a:shade val="50000"/>
+            </a:schemeClr>
+          </a:lnRef>
+          <a:fillRef idx="1">
+            <a:schemeClr val="accent2"/>
+          </a:fillRef>
+          <a:effectRef idx="0">
+            <a:schemeClr val="accent2"/>
+          </a:effectRef>
+          <a:fontRef idx="minor">
+            <a:schemeClr val="lt1"/>
+          </a:fontRef>
+        </p:style>
+        <p:txBody>
+          <a:bodyPr rtlCol="0" anchor="ctr"/>
+          <a:lstStyle/>
+          <a:p>
+            <a:pPr algn="ctr"/>
+            <a:r>
+              <a:rPr lang="en-US" sz="1600" b="1" dirty="0" smtClean="0">
+                <a:solidFill>
+                  <a:schemeClr val="bg1"/>
+                </a:solidFill>
+              </a:rPr>
+              <a:t>tw-post-btn.png</a:t>
+            </a:r>
+            <a:endParaRPr lang="en-US" b="1" dirty="0">
+              <a:solidFill>
+                <a:schemeClr val="bg1"/>
+              </a:solidFill>
+            </a:endParaRPr>
+          </a:p>
+        </p:txBody>
+      </p:sp>
+      <p:sp>
+        <p:nvSpPr>
+          <p:cNvPr id="62" name="Rectangle 61"/>
+          <p:cNvSpPr/>
+          <p:nvPr/>
+        </p:nvSpPr>
+        <p:spPr>
+          <a:xfrm>
+            <a:off x="7620000" y="5257800"/>
+            <a:ext cx="622620" cy="471839"/>
+          </a:xfrm>
+          <a:prstGeom prst="rect">
+            <a:avLst/>
+          </a:prstGeom>
+        </p:spPr>
+        <p:style>
+          <a:lnRef idx="2">
+            <a:schemeClr val="accent2">
+              <a:shade val="50000"/>
+            </a:schemeClr>
+          </a:lnRef>
+          <a:fillRef idx="1">
+            <a:schemeClr val="accent2"/>
+          </a:fillRef>
+          <a:effectRef idx="0">
+            <a:schemeClr val="accent2"/>
+          </a:effectRef>
+          <a:fontRef idx="minor">
+            <a:schemeClr val="lt1"/>
+          </a:fontRef>
+        </p:style>
+        <p:txBody>
+          <a:bodyPr rtlCol="0" anchor="ctr"/>
+          <a:lstStyle/>
+          <a:p>
+            <a:pPr algn="ctr"/>
+            <a:r>
+              <a:rPr lang="en-US" sz="1600" b="1" dirty="0" smtClean="0">
+                <a:solidFill>
+                  <a:schemeClr val="bg1"/>
+                </a:solidFill>
+              </a:rPr>
+              <a:t>…</a:t>
+            </a:r>
+            <a:endParaRPr lang="en-US" b="1" dirty="0">
+              <a:solidFill>
+                <a:schemeClr val="bg1"/>
+              </a:solidFill>
+            </a:endParaRPr>
+          </a:p>
+        </p:txBody>
+      </p:sp>
+    </p:spTree>
+    <p:extLst>
+      <p:ext uri="{BB962C8B-B14F-4D97-AF65-F5344CB8AC3E}">
+        <p14:creationId xmlns:p14="http://schemas.microsoft.com/office/powerpoint/2010/main" xmlns="" val="521620976"/>
+      </p:ext>
+    </p:extLst>
+  </p:cSld>
+  <p:clrMapOvr>
+    <a:masterClrMapping/>
+  </p:clrMapOvr>
+  <p:timing>
+    <p:tnLst>
+      <p:par>
+        <p:cTn id="1" dur="indefinite" restart="never" nodeType="tmRoot"/>
+      </p:par>
+    </p:tnLst>
+  </p:timing>
 </p:sld>
 </file>
 

</xml_diff>